<commit_message>
sapl dashboard updated asset mapping / continuing with freespan module
</commit_message>
<xml_diff>
--- a/docs/Subsea System Dashboard Revised_20210423.pptx
+++ b/docs/Subsea System Dashboard Revised_20210423.pptx
@@ -482,7 +482,7 @@
           <a:p>
             <a:fld id="{64A93199-28B3-44DB-8081-BB00A933B0E4}" type="datetimeFigureOut">
               <a:rPr lang="en-PH" smtClean="0"/>
-              <a:t>22/04/2021</a:t>
+              <a:t>29/04/2021</a:t>
             </a:fld>
             <a:endParaRPr lang="en-PH"/>
           </a:p>
@@ -968,7 +968,7 @@
           <p:cNvPr id="2" name="Title 1">
             <a:extLst>
               <a:ext uri="{FF2B5EF4-FFF2-40B4-BE49-F238E27FC236}">
-                <a16:creationId xmlns:a16="http://schemas.microsoft.com/office/drawing/2014/main" xmlns="" id="{5A8BE693-C9A1-467B-9950-8215736808E3}"/>
+                <a16:creationId xmlns:a16="http://schemas.microsoft.com/office/drawing/2014/main" id="{5A8BE693-C9A1-467B-9950-8215736808E3}"/>
               </a:ext>
             </a:extLst>
           </p:cNvPr>
@@ -1005,7 +1005,7 @@
           <p:cNvPr id="3" name="Subtitle 2">
             <a:extLst>
               <a:ext uri="{FF2B5EF4-FFF2-40B4-BE49-F238E27FC236}">
-                <a16:creationId xmlns:a16="http://schemas.microsoft.com/office/drawing/2014/main" xmlns="" id="{EB15A62A-6D63-4C06-A14F-860F017DB0A4}"/>
+                <a16:creationId xmlns:a16="http://schemas.microsoft.com/office/drawing/2014/main" id="{EB15A62A-6D63-4C06-A14F-860F017DB0A4}"/>
               </a:ext>
             </a:extLst>
           </p:cNvPr>
@@ -1075,7 +1075,7 @@
           <p:cNvPr id="4" name="Date Placeholder 3">
             <a:extLst>
               <a:ext uri="{FF2B5EF4-FFF2-40B4-BE49-F238E27FC236}">
-                <a16:creationId xmlns:a16="http://schemas.microsoft.com/office/drawing/2014/main" xmlns="" id="{CA74EF96-4F0D-448E-A169-44301F321C2D}"/>
+                <a16:creationId xmlns:a16="http://schemas.microsoft.com/office/drawing/2014/main" id="{CA74EF96-4F0D-448E-A169-44301F321C2D}"/>
               </a:ext>
             </a:extLst>
           </p:cNvPr>
@@ -1093,7 +1093,7 @@
           <a:p>
             <a:fld id="{E2B7E7BF-E648-44D0-8C95-590A8081F280}" type="datetimeFigureOut">
               <a:rPr lang="en-US" smtClean="0"/>
-              <a:t>4/22/2021</a:t>
+              <a:t>4/29/2021</a:t>
             </a:fld>
             <a:endParaRPr lang="en-US"/>
           </a:p>
@@ -1104,7 +1104,7 @@
           <p:cNvPr id="5" name="Footer Placeholder 4">
             <a:extLst>
               <a:ext uri="{FF2B5EF4-FFF2-40B4-BE49-F238E27FC236}">
-                <a16:creationId xmlns:a16="http://schemas.microsoft.com/office/drawing/2014/main" xmlns="" id="{912D2A76-9F45-4C15-85C8-DD2D9AD6E2A0}"/>
+                <a16:creationId xmlns:a16="http://schemas.microsoft.com/office/drawing/2014/main" id="{912D2A76-9F45-4C15-85C8-DD2D9AD6E2A0}"/>
               </a:ext>
             </a:extLst>
           </p:cNvPr>
@@ -1129,7 +1129,7 @@
           <p:cNvPr id="6" name="Slide Number Placeholder 5">
             <a:extLst>
               <a:ext uri="{FF2B5EF4-FFF2-40B4-BE49-F238E27FC236}">
-                <a16:creationId xmlns:a16="http://schemas.microsoft.com/office/drawing/2014/main" xmlns="" id="{FC80D5E4-6F29-4543-BCB1-1CFCF9EB0122}"/>
+                <a16:creationId xmlns:a16="http://schemas.microsoft.com/office/drawing/2014/main" id="{FC80D5E4-6F29-4543-BCB1-1CFCF9EB0122}"/>
               </a:ext>
             </a:extLst>
           </p:cNvPr>
@@ -1188,7 +1188,7 @@
           <p:cNvPr id="2" name="Title 1">
             <a:extLst>
               <a:ext uri="{FF2B5EF4-FFF2-40B4-BE49-F238E27FC236}">
-                <a16:creationId xmlns:a16="http://schemas.microsoft.com/office/drawing/2014/main" xmlns="" id="{32ACA6C9-B7AE-4B6F-A6F9-F6B2F3F64AB7}"/>
+                <a16:creationId xmlns:a16="http://schemas.microsoft.com/office/drawing/2014/main" id="{32ACA6C9-B7AE-4B6F-A6F9-F6B2F3F64AB7}"/>
               </a:ext>
             </a:extLst>
           </p:cNvPr>
@@ -1216,7 +1216,7 @@
           <p:cNvPr id="3" name="Vertical Text Placeholder 2">
             <a:extLst>
               <a:ext uri="{FF2B5EF4-FFF2-40B4-BE49-F238E27FC236}">
-                <a16:creationId xmlns:a16="http://schemas.microsoft.com/office/drawing/2014/main" xmlns="" id="{66C9E398-2720-495E-BACA-6D277C0E5842}"/>
+                <a16:creationId xmlns:a16="http://schemas.microsoft.com/office/drawing/2014/main" id="{66C9E398-2720-495E-BACA-6D277C0E5842}"/>
               </a:ext>
             </a:extLst>
           </p:cNvPr>
@@ -1273,7 +1273,7 @@
           <p:cNvPr id="4" name="Date Placeholder 3">
             <a:extLst>
               <a:ext uri="{FF2B5EF4-FFF2-40B4-BE49-F238E27FC236}">
-                <a16:creationId xmlns:a16="http://schemas.microsoft.com/office/drawing/2014/main" xmlns="" id="{28A78485-F609-4774-A24A-6F1333F71D66}"/>
+                <a16:creationId xmlns:a16="http://schemas.microsoft.com/office/drawing/2014/main" id="{28A78485-F609-4774-A24A-6F1333F71D66}"/>
               </a:ext>
             </a:extLst>
           </p:cNvPr>
@@ -1291,7 +1291,7 @@
           <a:p>
             <a:fld id="{E2B7E7BF-E648-44D0-8C95-590A8081F280}" type="datetimeFigureOut">
               <a:rPr lang="en-US" smtClean="0"/>
-              <a:t>4/22/2021</a:t>
+              <a:t>4/29/2021</a:t>
             </a:fld>
             <a:endParaRPr lang="en-US"/>
           </a:p>
@@ -1302,7 +1302,7 @@
           <p:cNvPr id="5" name="Footer Placeholder 4">
             <a:extLst>
               <a:ext uri="{FF2B5EF4-FFF2-40B4-BE49-F238E27FC236}">
-                <a16:creationId xmlns:a16="http://schemas.microsoft.com/office/drawing/2014/main" xmlns="" id="{F2519296-04C3-47D7-AEB8-737FC79D6A09}"/>
+                <a16:creationId xmlns:a16="http://schemas.microsoft.com/office/drawing/2014/main" id="{F2519296-04C3-47D7-AEB8-737FC79D6A09}"/>
               </a:ext>
             </a:extLst>
           </p:cNvPr>
@@ -1327,7 +1327,7 @@
           <p:cNvPr id="6" name="Slide Number Placeholder 5">
             <a:extLst>
               <a:ext uri="{FF2B5EF4-FFF2-40B4-BE49-F238E27FC236}">
-                <a16:creationId xmlns:a16="http://schemas.microsoft.com/office/drawing/2014/main" xmlns="" id="{65C72B63-F617-4968-903E-FE3BA37D469C}"/>
+                <a16:creationId xmlns:a16="http://schemas.microsoft.com/office/drawing/2014/main" id="{65C72B63-F617-4968-903E-FE3BA37D469C}"/>
               </a:ext>
             </a:extLst>
           </p:cNvPr>
@@ -1386,7 +1386,7 @@
           <p:cNvPr id="2" name="Vertical Title 1">
             <a:extLst>
               <a:ext uri="{FF2B5EF4-FFF2-40B4-BE49-F238E27FC236}">
-                <a16:creationId xmlns:a16="http://schemas.microsoft.com/office/drawing/2014/main" xmlns="" id="{F2FFD4FA-DC82-4A2B-B6AD-998572C8E577}"/>
+                <a16:creationId xmlns:a16="http://schemas.microsoft.com/office/drawing/2014/main" id="{F2FFD4FA-DC82-4A2B-B6AD-998572C8E577}"/>
               </a:ext>
             </a:extLst>
           </p:cNvPr>
@@ -1419,7 +1419,7 @@
           <p:cNvPr id="3" name="Vertical Text Placeholder 2">
             <a:extLst>
               <a:ext uri="{FF2B5EF4-FFF2-40B4-BE49-F238E27FC236}">
-                <a16:creationId xmlns:a16="http://schemas.microsoft.com/office/drawing/2014/main" xmlns="" id="{9D18A1C7-1CF2-47DF-A551-F4885ED03426}"/>
+                <a16:creationId xmlns:a16="http://schemas.microsoft.com/office/drawing/2014/main" id="{9D18A1C7-1CF2-47DF-A551-F4885ED03426}"/>
               </a:ext>
             </a:extLst>
           </p:cNvPr>
@@ -1481,7 +1481,7 @@
           <p:cNvPr id="4" name="Date Placeholder 3">
             <a:extLst>
               <a:ext uri="{FF2B5EF4-FFF2-40B4-BE49-F238E27FC236}">
-                <a16:creationId xmlns:a16="http://schemas.microsoft.com/office/drawing/2014/main" xmlns="" id="{B8208D58-02C6-4438-B954-2458F1EBED7A}"/>
+                <a16:creationId xmlns:a16="http://schemas.microsoft.com/office/drawing/2014/main" id="{B8208D58-02C6-4438-B954-2458F1EBED7A}"/>
               </a:ext>
             </a:extLst>
           </p:cNvPr>
@@ -1499,7 +1499,7 @@
           <a:p>
             <a:fld id="{E2B7E7BF-E648-44D0-8C95-590A8081F280}" type="datetimeFigureOut">
               <a:rPr lang="en-US" smtClean="0"/>
-              <a:t>4/22/2021</a:t>
+              <a:t>4/29/2021</a:t>
             </a:fld>
             <a:endParaRPr lang="en-US"/>
           </a:p>
@@ -1510,7 +1510,7 @@
           <p:cNvPr id="5" name="Footer Placeholder 4">
             <a:extLst>
               <a:ext uri="{FF2B5EF4-FFF2-40B4-BE49-F238E27FC236}">
-                <a16:creationId xmlns:a16="http://schemas.microsoft.com/office/drawing/2014/main" xmlns="" id="{8B766C05-379A-451F-8BBB-5DC052EDD824}"/>
+                <a16:creationId xmlns:a16="http://schemas.microsoft.com/office/drawing/2014/main" id="{8B766C05-379A-451F-8BBB-5DC052EDD824}"/>
               </a:ext>
             </a:extLst>
           </p:cNvPr>
@@ -1535,7 +1535,7 @@
           <p:cNvPr id="6" name="Slide Number Placeholder 5">
             <a:extLst>
               <a:ext uri="{FF2B5EF4-FFF2-40B4-BE49-F238E27FC236}">
-                <a16:creationId xmlns:a16="http://schemas.microsoft.com/office/drawing/2014/main" xmlns="" id="{8FC87B10-2500-43C9-8D4F-A2102C27CC77}"/>
+                <a16:creationId xmlns:a16="http://schemas.microsoft.com/office/drawing/2014/main" id="{8FC87B10-2500-43C9-8D4F-A2102C27CC77}"/>
               </a:ext>
             </a:extLst>
           </p:cNvPr>
@@ -1594,7 +1594,7 @@
           <p:cNvPr id="2" name="Title 1">
             <a:extLst>
               <a:ext uri="{FF2B5EF4-FFF2-40B4-BE49-F238E27FC236}">
-                <a16:creationId xmlns:a16="http://schemas.microsoft.com/office/drawing/2014/main" xmlns="" id="{82C884C8-5A3C-447C-BC69-70DA80943319}"/>
+                <a16:creationId xmlns:a16="http://schemas.microsoft.com/office/drawing/2014/main" id="{82C884C8-5A3C-447C-BC69-70DA80943319}"/>
               </a:ext>
             </a:extLst>
           </p:cNvPr>
@@ -1622,7 +1622,7 @@
           <p:cNvPr id="3" name="Content Placeholder 2">
             <a:extLst>
               <a:ext uri="{FF2B5EF4-FFF2-40B4-BE49-F238E27FC236}">
-                <a16:creationId xmlns:a16="http://schemas.microsoft.com/office/drawing/2014/main" xmlns="" id="{97B5CD47-7B3F-4721-9522-25D5CA66541A}"/>
+                <a16:creationId xmlns:a16="http://schemas.microsoft.com/office/drawing/2014/main" id="{97B5CD47-7B3F-4721-9522-25D5CA66541A}"/>
               </a:ext>
             </a:extLst>
           </p:cNvPr>
@@ -1679,7 +1679,7 @@
           <p:cNvPr id="4" name="Date Placeholder 3">
             <a:extLst>
               <a:ext uri="{FF2B5EF4-FFF2-40B4-BE49-F238E27FC236}">
-                <a16:creationId xmlns:a16="http://schemas.microsoft.com/office/drawing/2014/main" xmlns="" id="{1C06EF1E-4BD7-4F43-809E-C5DD59DCA3E2}"/>
+                <a16:creationId xmlns:a16="http://schemas.microsoft.com/office/drawing/2014/main" id="{1C06EF1E-4BD7-4F43-809E-C5DD59DCA3E2}"/>
               </a:ext>
             </a:extLst>
           </p:cNvPr>
@@ -1697,7 +1697,7 @@
           <a:p>
             <a:fld id="{E2B7E7BF-E648-44D0-8C95-590A8081F280}" type="datetimeFigureOut">
               <a:rPr lang="en-US" smtClean="0"/>
-              <a:t>4/22/2021</a:t>
+              <a:t>4/29/2021</a:t>
             </a:fld>
             <a:endParaRPr lang="en-US"/>
           </a:p>
@@ -1708,7 +1708,7 @@
           <p:cNvPr id="5" name="Footer Placeholder 4">
             <a:extLst>
               <a:ext uri="{FF2B5EF4-FFF2-40B4-BE49-F238E27FC236}">
-                <a16:creationId xmlns:a16="http://schemas.microsoft.com/office/drawing/2014/main" xmlns="" id="{0021632D-42EE-48D3-BF90-63959CDDF6BA}"/>
+                <a16:creationId xmlns:a16="http://schemas.microsoft.com/office/drawing/2014/main" id="{0021632D-42EE-48D3-BF90-63959CDDF6BA}"/>
               </a:ext>
             </a:extLst>
           </p:cNvPr>
@@ -1733,7 +1733,7 @@
           <p:cNvPr id="6" name="Slide Number Placeholder 5">
             <a:extLst>
               <a:ext uri="{FF2B5EF4-FFF2-40B4-BE49-F238E27FC236}">
-                <a16:creationId xmlns:a16="http://schemas.microsoft.com/office/drawing/2014/main" xmlns="" id="{A5FB4654-C066-4DF3-9105-9EB6CCBE631D}"/>
+                <a16:creationId xmlns:a16="http://schemas.microsoft.com/office/drawing/2014/main" id="{A5FB4654-C066-4DF3-9105-9EB6CCBE631D}"/>
               </a:ext>
             </a:extLst>
           </p:cNvPr>
@@ -1792,7 +1792,7 @@
           <p:cNvPr id="2" name="Title 1">
             <a:extLst>
               <a:ext uri="{FF2B5EF4-FFF2-40B4-BE49-F238E27FC236}">
-                <a16:creationId xmlns:a16="http://schemas.microsoft.com/office/drawing/2014/main" xmlns="" id="{1E5C5315-2D1F-40AE-90C3-920EF53E61F8}"/>
+                <a16:creationId xmlns:a16="http://schemas.microsoft.com/office/drawing/2014/main" id="{1E5C5315-2D1F-40AE-90C3-920EF53E61F8}"/>
               </a:ext>
             </a:extLst>
           </p:cNvPr>
@@ -1829,7 +1829,7 @@
           <p:cNvPr id="3" name="Text Placeholder 2">
             <a:extLst>
               <a:ext uri="{FF2B5EF4-FFF2-40B4-BE49-F238E27FC236}">
-                <a16:creationId xmlns:a16="http://schemas.microsoft.com/office/drawing/2014/main" xmlns="" id="{AAFD32BF-40FC-42CC-9543-52AC1EE74CAA}"/>
+                <a16:creationId xmlns:a16="http://schemas.microsoft.com/office/drawing/2014/main" id="{AAFD32BF-40FC-42CC-9543-52AC1EE74CAA}"/>
               </a:ext>
             </a:extLst>
           </p:cNvPr>
@@ -1954,7 +1954,7 @@
           <p:cNvPr id="4" name="Date Placeholder 3">
             <a:extLst>
               <a:ext uri="{FF2B5EF4-FFF2-40B4-BE49-F238E27FC236}">
-                <a16:creationId xmlns:a16="http://schemas.microsoft.com/office/drawing/2014/main" xmlns="" id="{A41B9CAD-40C7-4EFC-AFFA-5056AD25FA11}"/>
+                <a16:creationId xmlns:a16="http://schemas.microsoft.com/office/drawing/2014/main" id="{A41B9CAD-40C7-4EFC-AFFA-5056AD25FA11}"/>
               </a:ext>
             </a:extLst>
           </p:cNvPr>
@@ -1972,7 +1972,7 @@
           <a:p>
             <a:fld id="{E2B7E7BF-E648-44D0-8C95-590A8081F280}" type="datetimeFigureOut">
               <a:rPr lang="en-US" smtClean="0"/>
-              <a:t>4/22/2021</a:t>
+              <a:t>4/29/2021</a:t>
             </a:fld>
             <a:endParaRPr lang="en-US"/>
           </a:p>
@@ -1983,7 +1983,7 @@
           <p:cNvPr id="5" name="Footer Placeholder 4">
             <a:extLst>
               <a:ext uri="{FF2B5EF4-FFF2-40B4-BE49-F238E27FC236}">
-                <a16:creationId xmlns:a16="http://schemas.microsoft.com/office/drawing/2014/main" xmlns="" id="{C005FD60-F0E4-4298-A0A8-0BE2A29E89D1}"/>
+                <a16:creationId xmlns:a16="http://schemas.microsoft.com/office/drawing/2014/main" id="{C005FD60-F0E4-4298-A0A8-0BE2A29E89D1}"/>
               </a:ext>
             </a:extLst>
           </p:cNvPr>
@@ -2008,7 +2008,7 @@
           <p:cNvPr id="6" name="Slide Number Placeholder 5">
             <a:extLst>
               <a:ext uri="{FF2B5EF4-FFF2-40B4-BE49-F238E27FC236}">
-                <a16:creationId xmlns:a16="http://schemas.microsoft.com/office/drawing/2014/main" xmlns="" id="{7BA8F703-ADC8-4A62-9F05-470D75FE4D13}"/>
+                <a16:creationId xmlns:a16="http://schemas.microsoft.com/office/drawing/2014/main" id="{7BA8F703-ADC8-4A62-9F05-470D75FE4D13}"/>
               </a:ext>
             </a:extLst>
           </p:cNvPr>
@@ -2067,7 +2067,7 @@
           <p:cNvPr id="2" name="Title 1">
             <a:extLst>
               <a:ext uri="{FF2B5EF4-FFF2-40B4-BE49-F238E27FC236}">
-                <a16:creationId xmlns:a16="http://schemas.microsoft.com/office/drawing/2014/main" xmlns="" id="{2A2277D7-0937-4A6E-91F9-764E6C6DAB6A}"/>
+                <a16:creationId xmlns:a16="http://schemas.microsoft.com/office/drawing/2014/main" id="{2A2277D7-0937-4A6E-91F9-764E6C6DAB6A}"/>
               </a:ext>
             </a:extLst>
           </p:cNvPr>
@@ -2095,7 +2095,7 @@
           <p:cNvPr id="3" name="Content Placeholder 2">
             <a:extLst>
               <a:ext uri="{FF2B5EF4-FFF2-40B4-BE49-F238E27FC236}">
-                <a16:creationId xmlns:a16="http://schemas.microsoft.com/office/drawing/2014/main" xmlns="" id="{2A5BD141-7335-40A0-9687-623FF1D3A6F2}"/>
+                <a16:creationId xmlns:a16="http://schemas.microsoft.com/office/drawing/2014/main" id="{2A5BD141-7335-40A0-9687-623FF1D3A6F2}"/>
               </a:ext>
             </a:extLst>
           </p:cNvPr>
@@ -2157,7 +2157,7 @@
           <p:cNvPr id="4" name="Content Placeholder 3">
             <a:extLst>
               <a:ext uri="{FF2B5EF4-FFF2-40B4-BE49-F238E27FC236}">
-                <a16:creationId xmlns:a16="http://schemas.microsoft.com/office/drawing/2014/main" xmlns="" id="{68AB06EE-9AB1-4927-BDA8-2DBD652C7F68}"/>
+                <a16:creationId xmlns:a16="http://schemas.microsoft.com/office/drawing/2014/main" id="{68AB06EE-9AB1-4927-BDA8-2DBD652C7F68}"/>
               </a:ext>
             </a:extLst>
           </p:cNvPr>
@@ -2219,7 +2219,7 @@
           <p:cNvPr id="5" name="Date Placeholder 4">
             <a:extLst>
               <a:ext uri="{FF2B5EF4-FFF2-40B4-BE49-F238E27FC236}">
-                <a16:creationId xmlns:a16="http://schemas.microsoft.com/office/drawing/2014/main" xmlns="" id="{1467F3DF-9A6E-40C6-83E0-00A614248934}"/>
+                <a16:creationId xmlns:a16="http://schemas.microsoft.com/office/drawing/2014/main" id="{1467F3DF-9A6E-40C6-83E0-00A614248934}"/>
               </a:ext>
             </a:extLst>
           </p:cNvPr>
@@ -2237,7 +2237,7 @@
           <a:p>
             <a:fld id="{E2B7E7BF-E648-44D0-8C95-590A8081F280}" type="datetimeFigureOut">
               <a:rPr lang="en-US" smtClean="0"/>
-              <a:t>4/22/2021</a:t>
+              <a:t>4/29/2021</a:t>
             </a:fld>
             <a:endParaRPr lang="en-US"/>
           </a:p>
@@ -2248,7 +2248,7 @@
           <p:cNvPr id="6" name="Footer Placeholder 5">
             <a:extLst>
               <a:ext uri="{FF2B5EF4-FFF2-40B4-BE49-F238E27FC236}">
-                <a16:creationId xmlns:a16="http://schemas.microsoft.com/office/drawing/2014/main" xmlns="" id="{06B00FD1-2C4E-43DB-8A1A-3541E2F610F7}"/>
+                <a16:creationId xmlns:a16="http://schemas.microsoft.com/office/drawing/2014/main" id="{06B00FD1-2C4E-43DB-8A1A-3541E2F610F7}"/>
               </a:ext>
             </a:extLst>
           </p:cNvPr>
@@ -2273,7 +2273,7 @@
           <p:cNvPr id="7" name="Slide Number Placeholder 6">
             <a:extLst>
               <a:ext uri="{FF2B5EF4-FFF2-40B4-BE49-F238E27FC236}">
-                <a16:creationId xmlns:a16="http://schemas.microsoft.com/office/drawing/2014/main" xmlns="" id="{FBAFC028-E466-45E0-8DF3-375B90510302}"/>
+                <a16:creationId xmlns:a16="http://schemas.microsoft.com/office/drawing/2014/main" id="{FBAFC028-E466-45E0-8DF3-375B90510302}"/>
               </a:ext>
             </a:extLst>
           </p:cNvPr>
@@ -2332,7 +2332,7 @@
           <p:cNvPr id="2" name="Title 1">
             <a:extLst>
               <a:ext uri="{FF2B5EF4-FFF2-40B4-BE49-F238E27FC236}">
-                <a16:creationId xmlns:a16="http://schemas.microsoft.com/office/drawing/2014/main" xmlns="" id="{F3852B5A-E71C-47BC-92B0-F0253386831F}"/>
+                <a16:creationId xmlns:a16="http://schemas.microsoft.com/office/drawing/2014/main" id="{F3852B5A-E71C-47BC-92B0-F0253386831F}"/>
               </a:ext>
             </a:extLst>
           </p:cNvPr>
@@ -2365,7 +2365,7 @@
           <p:cNvPr id="3" name="Text Placeholder 2">
             <a:extLst>
               <a:ext uri="{FF2B5EF4-FFF2-40B4-BE49-F238E27FC236}">
-                <a16:creationId xmlns:a16="http://schemas.microsoft.com/office/drawing/2014/main" xmlns="" id="{4912367A-D8EE-48C8-B980-702459FCA561}"/>
+                <a16:creationId xmlns:a16="http://schemas.microsoft.com/office/drawing/2014/main" id="{4912367A-D8EE-48C8-B980-702459FCA561}"/>
               </a:ext>
             </a:extLst>
           </p:cNvPr>
@@ -2436,7 +2436,7 @@
           <p:cNvPr id="4" name="Content Placeholder 3">
             <a:extLst>
               <a:ext uri="{FF2B5EF4-FFF2-40B4-BE49-F238E27FC236}">
-                <a16:creationId xmlns:a16="http://schemas.microsoft.com/office/drawing/2014/main" xmlns="" id="{E9FBD98F-9FD7-43E7-A57F-4FAC0D572A81}"/>
+                <a16:creationId xmlns:a16="http://schemas.microsoft.com/office/drawing/2014/main" id="{E9FBD98F-9FD7-43E7-A57F-4FAC0D572A81}"/>
               </a:ext>
             </a:extLst>
           </p:cNvPr>
@@ -2498,7 +2498,7 @@
           <p:cNvPr id="5" name="Text Placeholder 4">
             <a:extLst>
               <a:ext uri="{FF2B5EF4-FFF2-40B4-BE49-F238E27FC236}">
-                <a16:creationId xmlns:a16="http://schemas.microsoft.com/office/drawing/2014/main" xmlns="" id="{E590B16D-122A-4FC2-B692-CAC28EC855C0}"/>
+                <a16:creationId xmlns:a16="http://schemas.microsoft.com/office/drawing/2014/main" id="{E590B16D-122A-4FC2-B692-CAC28EC855C0}"/>
               </a:ext>
             </a:extLst>
           </p:cNvPr>
@@ -2569,7 +2569,7 @@
           <p:cNvPr id="6" name="Content Placeholder 5">
             <a:extLst>
               <a:ext uri="{FF2B5EF4-FFF2-40B4-BE49-F238E27FC236}">
-                <a16:creationId xmlns:a16="http://schemas.microsoft.com/office/drawing/2014/main" xmlns="" id="{EB51F8AF-CCE8-44F2-9D43-4543079D37A9}"/>
+                <a16:creationId xmlns:a16="http://schemas.microsoft.com/office/drawing/2014/main" id="{EB51F8AF-CCE8-44F2-9D43-4543079D37A9}"/>
               </a:ext>
             </a:extLst>
           </p:cNvPr>
@@ -2631,7 +2631,7 @@
           <p:cNvPr id="7" name="Date Placeholder 6">
             <a:extLst>
               <a:ext uri="{FF2B5EF4-FFF2-40B4-BE49-F238E27FC236}">
-                <a16:creationId xmlns:a16="http://schemas.microsoft.com/office/drawing/2014/main" xmlns="" id="{228D900C-848C-48E9-B4FF-21A2AE4729EA}"/>
+                <a16:creationId xmlns:a16="http://schemas.microsoft.com/office/drawing/2014/main" id="{228D900C-848C-48E9-B4FF-21A2AE4729EA}"/>
               </a:ext>
             </a:extLst>
           </p:cNvPr>
@@ -2649,7 +2649,7 @@
           <a:p>
             <a:fld id="{E2B7E7BF-E648-44D0-8C95-590A8081F280}" type="datetimeFigureOut">
               <a:rPr lang="en-US" smtClean="0"/>
-              <a:t>4/22/2021</a:t>
+              <a:t>4/29/2021</a:t>
             </a:fld>
             <a:endParaRPr lang="en-US"/>
           </a:p>
@@ -2660,7 +2660,7 @@
           <p:cNvPr id="8" name="Footer Placeholder 7">
             <a:extLst>
               <a:ext uri="{FF2B5EF4-FFF2-40B4-BE49-F238E27FC236}">
-                <a16:creationId xmlns:a16="http://schemas.microsoft.com/office/drawing/2014/main" xmlns="" id="{11A1D053-D90E-4C91-9C70-898CBB9D76EC}"/>
+                <a16:creationId xmlns:a16="http://schemas.microsoft.com/office/drawing/2014/main" id="{11A1D053-D90E-4C91-9C70-898CBB9D76EC}"/>
               </a:ext>
             </a:extLst>
           </p:cNvPr>
@@ -2685,7 +2685,7 @@
           <p:cNvPr id="9" name="Slide Number Placeholder 8">
             <a:extLst>
               <a:ext uri="{FF2B5EF4-FFF2-40B4-BE49-F238E27FC236}">
-                <a16:creationId xmlns:a16="http://schemas.microsoft.com/office/drawing/2014/main" xmlns="" id="{8AB8C875-9757-454A-B3BC-6555FAE3B104}"/>
+                <a16:creationId xmlns:a16="http://schemas.microsoft.com/office/drawing/2014/main" id="{8AB8C875-9757-454A-B3BC-6555FAE3B104}"/>
               </a:ext>
             </a:extLst>
           </p:cNvPr>
@@ -2744,7 +2744,7 @@
           <p:cNvPr id="2" name="Title 1">
             <a:extLst>
               <a:ext uri="{FF2B5EF4-FFF2-40B4-BE49-F238E27FC236}">
-                <a16:creationId xmlns:a16="http://schemas.microsoft.com/office/drawing/2014/main" xmlns="" id="{42B13E6D-21E8-4554-B6E2-1BEAE2F465A9}"/>
+                <a16:creationId xmlns:a16="http://schemas.microsoft.com/office/drawing/2014/main" id="{42B13E6D-21E8-4554-B6E2-1BEAE2F465A9}"/>
               </a:ext>
             </a:extLst>
           </p:cNvPr>
@@ -2772,7 +2772,7 @@
           <p:cNvPr id="3" name="Date Placeholder 2">
             <a:extLst>
               <a:ext uri="{FF2B5EF4-FFF2-40B4-BE49-F238E27FC236}">
-                <a16:creationId xmlns:a16="http://schemas.microsoft.com/office/drawing/2014/main" xmlns="" id="{86C95DC3-D24B-4AFF-8571-4B29F63F895B}"/>
+                <a16:creationId xmlns:a16="http://schemas.microsoft.com/office/drawing/2014/main" id="{86C95DC3-D24B-4AFF-8571-4B29F63F895B}"/>
               </a:ext>
             </a:extLst>
           </p:cNvPr>
@@ -2790,7 +2790,7 @@
           <a:p>
             <a:fld id="{E2B7E7BF-E648-44D0-8C95-590A8081F280}" type="datetimeFigureOut">
               <a:rPr lang="en-US" smtClean="0"/>
-              <a:t>4/22/2021</a:t>
+              <a:t>4/29/2021</a:t>
             </a:fld>
             <a:endParaRPr lang="en-US"/>
           </a:p>
@@ -2801,7 +2801,7 @@
           <p:cNvPr id="4" name="Footer Placeholder 3">
             <a:extLst>
               <a:ext uri="{FF2B5EF4-FFF2-40B4-BE49-F238E27FC236}">
-                <a16:creationId xmlns:a16="http://schemas.microsoft.com/office/drawing/2014/main" xmlns="" id="{25AB2DC5-6410-4BD8-95A3-80BDAAE2F433}"/>
+                <a16:creationId xmlns:a16="http://schemas.microsoft.com/office/drawing/2014/main" id="{25AB2DC5-6410-4BD8-95A3-80BDAAE2F433}"/>
               </a:ext>
             </a:extLst>
           </p:cNvPr>
@@ -2826,7 +2826,7 @@
           <p:cNvPr id="5" name="Slide Number Placeholder 4">
             <a:extLst>
               <a:ext uri="{FF2B5EF4-FFF2-40B4-BE49-F238E27FC236}">
-                <a16:creationId xmlns:a16="http://schemas.microsoft.com/office/drawing/2014/main" xmlns="" id="{D640DE5C-8B75-46D1-979C-A8EF22D25418}"/>
+                <a16:creationId xmlns:a16="http://schemas.microsoft.com/office/drawing/2014/main" id="{D640DE5C-8B75-46D1-979C-A8EF22D25418}"/>
               </a:ext>
             </a:extLst>
           </p:cNvPr>
@@ -2885,7 +2885,7 @@
           <p:cNvPr id="2" name="Date Placeholder 1">
             <a:extLst>
               <a:ext uri="{FF2B5EF4-FFF2-40B4-BE49-F238E27FC236}">
-                <a16:creationId xmlns:a16="http://schemas.microsoft.com/office/drawing/2014/main" xmlns="" id="{0B3D4CF6-422B-43C8-AFB8-89EBB0DB80D3}"/>
+                <a16:creationId xmlns:a16="http://schemas.microsoft.com/office/drawing/2014/main" id="{0B3D4CF6-422B-43C8-AFB8-89EBB0DB80D3}"/>
               </a:ext>
             </a:extLst>
           </p:cNvPr>
@@ -2903,7 +2903,7 @@
           <a:p>
             <a:fld id="{E2B7E7BF-E648-44D0-8C95-590A8081F280}" type="datetimeFigureOut">
               <a:rPr lang="en-US" smtClean="0"/>
-              <a:t>4/22/2021</a:t>
+              <a:t>4/29/2021</a:t>
             </a:fld>
             <a:endParaRPr lang="en-US"/>
           </a:p>
@@ -2914,7 +2914,7 @@
           <p:cNvPr id="3" name="Footer Placeholder 2">
             <a:extLst>
               <a:ext uri="{FF2B5EF4-FFF2-40B4-BE49-F238E27FC236}">
-                <a16:creationId xmlns:a16="http://schemas.microsoft.com/office/drawing/2014/main" xmlns="" id="{28478275-B09A-44AF-86DD-19495DC0E58B}"/>
+                <a16:creationId xmlns:a16="http://schemas.microsoft.com/office/drawing/2014/main" id="{28478275-B09A-44AF-86DD-19495DC0E58B}"/>
               </a:ext>
             </a:extLst>
           </p:cNvPr>
@@ -2939,7 +2939,7 @@
           <p:cNvPr id="4" name="Slide Number Placeholder 3">
             <a:extLst>
               <a:ext uri="{FF2B5EF4-FFF2-40B4-BE49-F238E27FC236}">
-                <a16:creationId xmlns:a16="http://schemas.microsoft.com/office/drawing/2014/main" xmlns="" id="{C33FB40D-3A8D-424B-9C04-FA07FE29BB26}"/>
+                <a16:creationId xmlns:a16="http://schemas.microsoft.com/office/drawing/2014/main" id="{C33FB40D-3A8D-424B-9C04-FA07FE29BB26}"/>
               </a:ext>
             </a:extLst>
           </p:cNvPr>
@@ -2998,7 +2998,7 @@
           <p:cNvPr id="2" name="Title 1">
             <a:extLst>
               <a:ext uri="{FF2B5EF4-FFF2-40B4-BE49-F238E27FC236}">
-                <a16:creationId xmlns:a16="http://schemas.microsoft.com/office/drawing/2014/main" xmlns="" id="{8B9E6F00-10B9-4A18-A349-6CCFBBA3F438}"/>
+                <a16:creationId xmlns:a16="http://schemas.microsoft.com/office/drawing/2014/main" id="{8B9E6F00-10B9-4A18-A349-6CCFBBA3F438}"/>
               </a:ext>
             </a:extLst>
           </p:cNvPr>
@@ -3035,7 +3035,7 @@
           <p:cNvPr id="3" name="Content Placeholder 2">
             <a:extLst>
               <a:ext uri="{FF2B5EF4-FFF2-40B4-BE49-F238E27FC236}">
-                <a16:creationId xmlns:a16="http://schemas.microsoft.com/office/drawing/2014/main" xmlns="" id="{8E83D0B1-5484-44CF-BBAB-50F20150C414}"/>
+                <a16:creationId xmlns:a16="http://schemas.microsoft.com/office/drawing/2014/main" id="{8E83D0B1-5484-44CF-BBAB-50F20150C414}"/>
               </a:ext>
             </a:extLst>
           </p:cNvPr>
@@ -3125,7 +3125,7 @@
           <p:cNvPr id="4" name="Text Placeholder 3">
             <a:extLst>
               <a:ext uri="{FF2B5EF4-FFF2-40B4-BE49-F238E27FC236}">
-                <a16:creationId xmlns:a16="http://schemas.microsoft.com/office/drawing/2014/main" xmlns="" id="{655B3463-0B40-43BF-9478-868FDF0DF0D1}"/>
+                <a16:creationId xmlns:a16="http://schemas.microsoft.com/office/drawing/2014/main" id="{655B3463-0B40-43BF-9478-868FDF0DF0D1}"/>
               </a:ext>
             </a:extLst>
           </p:cNvPr>
@@ -3196,7 +3196,7 @@
           <p:cNvPr id="5" name="Date Placeholder 4">
             <a:extLst>
               <a:ext uri="{FF2B5EF4-FFF2-40B4-BE49-F238E27FC236}">
-                <a16:creationId xmlns:a16="http://schemas.microsoft.com/office/drawing/2014/main" xmlns="" id="{AE71CEC0-482A-475D-9755-EB1EBC7325A0}"/>
+                <a16:creationId xmlns:a16="http://schemas.microsoft.com/office/drawing/2014/main" id="{AE71CEC0-482A-475D-9755-EB1EBC7325A0}"/>
               </a:ext>
             </a:extLst>
           </p:cNvPr>
@@ -3214,7 +3214,7 @@
           <a:p>
             <a:fld id="{E2B7E7BF-E648-44D0-8C95-590A8081F280}" type="datetimeFigureOut">
               <a:rPr lang="en-US" smtClean="0"/>
-              <a:t>4/22/2021</a:t>
+              <a:t>4/29/2021</a:t>
             </a:fld>
             <a:endParaRPr lang="en-US"/>
           </a:p>
@@ -3225,7 +3225,7 @@
           <p:cNvPr id="6" name="Footer Placeholder 5">
             <a:extLst>
               <a:ext uri="{FF2B5EF4-FFF2-40B4-BE49-F238E27FC236}">
-                <a16:creationId xmlns:a16="http://schemas.microsoft.com/office/drawing/2014/main" xmlns="" id="{70915CA5-1942-48C9-8E42-7EDAFD0DF82B}"/>
+                <a16:creationId xmlns:a16="http://schemas.microsoft.com/office/drawing/2014/main" id="{70915CA5-1942-48C9-8E42-7EDAFD0DF82B}"/>
               </a:ext>
             </a:extLst>
           </p:cNvPr>
@@ -3250,7 +3250,7 @@
           <p:cNvPr id="7" name="Slide Number Placeholder 6">
             <a:extLst>
               <a:ext uri="{FF2B5EF4-FFF2-40B4-BE49-F238E27FC236}">
-                <a16:creationId xmlns:a16="http://schemas.microsoft.com/office/drawing/2014/main" xmlns="" id="{F5BF40D1-A82D-45F3-96EA-58ACF291E359}"/>
+                <a16:creationId xmlns:a16="http://schemas.microsoft.com/office/drawing/2014/main" id="{F5BF40D1-A82D-45F3-96EA-58ACF291E359}"/>
               </a:ext>
             </a:extLst>
           </p:cNvPr>
@@ -3309,7 +3309,7 @@
           <p:cNvPr id="2" name="Title 1">
             <a:extLst>
               <a:ext uri="{FF2B5EF4-FFF2-40B4-BE49-F238E27FC236}">
-                <a16:creationId xmlns:a16="http://schemas.microsoft.com/office/drawing/2014/main" xmlns="" id="{A7919C8E-70A4-4CF4-B572-B10169236191}"/>
+                <a16:creationId xmlns:a16="http://schemas.microsoft.com/office/drawing/2014/main" id="{A7919C8E-70A4-4CF4-B572-B10169236191}"/>
               </a:ext>
             </a:extLst>
           </p:cNvPr>
@@ -3346,7 +3346,7 @@
           <p:cNvPr id="3" name="Picture Placeholder 2">
             <a:extLst>
               <a:ext uri="{FF2B5EF4-FFF2-40B4-BE49-F238E27FC236}">
-                <a16:creationId xmlns:a16="http://schemas.microsoft.com/office/drawing/2014/main" xmlns="" id="{E18393D1-9CC2-436B-8698-FDE463016794}"/>
+                <a16:creationId xmlns:a16="http://schemas.microsoft.com/office/drawing/2014/main" id="{E18393D1-9CC2-436B-8698-FDE463016794}"/>
               </a:ext>
             </a:extLst>
           </p:cNvPr>
@@ -3413,7 +3413,7 @@
           <p:cNvPr id="4" name="Text Placeholder 3">
             <a:extLst>
               <a:ext uri="{FF2B5EF4-FFF2-40B4-BE49-F238E27FC236}">
-                <a16:creationId xmlns:a16="http://schemas.microsoft.com/office/drawing/2014/main" xmlns="" id="{08AE0DDF-D950-4E2A-AA3D-3DFE0F23308E}"/>
+                <a16:creationId xmlns:a16="http://schemas.microsoft.com/office/drawing/2014/main" id="{08AE0DDF-D950-4E2A-AA3D-3DFE0F23308E}"/>
               </a:ext>
             </a:extLst>
           </p:cNvPr>
@@ -3484,7 +3484,7 @@
           <p:cNvPr id="5" name="Date Placeholder 4">
             <a:extLst>
               <a:ext uri="{FF2B5EF4-FFF2-40B4-BE49-F238E27FC236}">
-                <a16:creationId xmlns:a16="http://schemas.microsoft.com/office/drawing/2014/main" xmlns="" id="{F172CF79-81FB-4005-A402-4EC642382428}"/>
+                <a16:creationId xmlns:a16="http://schemas.microsoft.com/office/drawing/2014/main" id="{F172CF79-81FB-4005-A402-4EC642382428}"/>
               </a:ext>
             </a:extLst>
           </p:cNvPr>
@@ -3502,7 +3502,7 @@
           <a:p>
             <a:fld id="{E2B7E7BF-E648-44D0-8C95-590A8081F280}" type="datetimeFigureOut">
               <a:rPr lang="en-US" smtClean="0"/>
-              <a:t>4/22/2021</a:t>
+              <a:t>4/29/2021</a:t>
             </a:fld>
             <a:endParaRPr lang="en-US"/>
           </a:p>
@@ -3513,7 +3513,7 @@
           <p:cNvPr id="6" name="Footer Placeholder 5">
             <a:extLst>
               <a:ext uri="{FF2B5EF4-FFF2-40B4-BE49-F238E27FC236}">
-                <a16:creationId xmlns:a16="http://schemas.microsoft.com/office/drawing/2014/main" xmlns="" id="{869F9C4B-48FA-4D7E-A819-27D9E973C4AC}"/>
+                <a16:creationId xmlns:a16="http://schemas.microsoft.com/office/drawing/2014/main" id="{869F9C4B-48FA-4D7E-A819-27D9E973C4AC}"/>
               </a:ext>
             </a:extLst>
           </p:cNvPr>
@@ -3538,7 +3538,7 @@
           <p:cNvPr id="7" name="Slide Number Placeholder 6">
             <a:extLst>
               <a:ext uri="{FF2B5EF4-FFF2-40B4-BE49-F238E27FC236}">
-                <a16:creationId xmlns:a16="http://schemas.microsoft.com/office/drawing/2014/main" xmlns="" id="{50094332-D767-48E1-9DA9-7B92625DC293}"/>
+                <a16:creationId xmlns:a16="http://schemas.microsoft.com/office/drawing/2014/main" id="{50094332-D767-48E1-9DA9-7B92625DC293}"/>
               </a:ext>
             </a:extLst>
           </p:cNvPr>
@@ -3602,7 +3602,7 @@
           <p:cNvPr id="2" name="Title Placeholder 1">
             <a:extLst>
               <a:ext uri="{FF2B5EF4-FFF2-40B4-BE49-F238E27FC236}">
-                <a16:creationId xmlns:a16="http://schemas.microsoft.com/office/drawing/2014/main" xmlns="" id="{D9BFE41F-A4D4-4182-B1C5-2D6F0E6F7438}"/>
+                <a16:creationId xmlns:a16="http://schemas.microsoft.com/office/drawing/2014/main" id="{D9BFE41F-A4D4-4182-B1C5-2D6F0E6F7438}"/>
               </a:ext>
             </a:extLst>
           </p:cNvPr>
@@ -3640,7 +3640,7 @@
           <p:cNvPr id="3" name="Text Placeholder 2">
             <a:extLst>
               <a:ext uri="{FF2B5EF4-FFF2-40B4-BE49-F238E27FC236}">
-                <a16:creationId xmlns:a16="http://schemas.microsoft.com/office/drawing/2014/main" xmlns="" id="{06DB14C5-2567-4FD4-8944-174BCC20E00C}"/>
+                <a16:creationId xmlns:a16="http://schemas.microsoft.com/office/drawing/2014/main" id="{06DB14C5-2567-4FD4-8944-174BCC20E00C}"/>
               </a:ext>
             </a:extLst>
           </p:cNvPr>
@@ -3707,7 +3707,7 @@
           <p:cNvPr id="4" name="Date Placeholder 3">
             <a:extLst>
               <a:ext uri="{FF2B5EF4-FFF2-40B4-BE49-F238E27FC236}">
-                <a16:creationId xmlns:a16="http://schemas.microsoft.com/office/drawing/2014/main" xmlns="" id="{869CA8AE-FBF4-4B5C-BAF7-63B2487E758A}"/>
+                <a16:creationId xmlns:a16="http://schemas.microsoft.com/office/drawing/2014/main" id="{869CA8AE-FBF4-4B5C-BAF7-63B2487E758A}"/>
               </a:ext>
             </a:extLst>
           </p:cNvPr>
@@ -3743,7 +3743,7 @@
           <a:p>
             <a:fld id="{E2B7E7BF-E648-44D0-8C95-590A8081F280}" type="datetimeFigureOut">
               <a:rPr lang="en-US" smtClean="0"/>
-              <a:t>4/22/2021</a:t>
+              <a:t>4/29/2021</a:t>
             </a:fld>
             <a:endParaRPr lang="en-US"/>
           </a:p>
@@ -3754,7 +3754,7 @@
           <p:cNvPr id="5" name="Footer Placeholder 4">
             <a:extLst>
               <a:ext uri="{FF2B5EF4-FFF2-40B4-BE49-F238E27FC236}">
-                <a16:creationId xmlns:a16="http://schemas.microsoft.com/office/drawing/2014/main" xmlns="" id="{892E0C27-F3D5-44AC-B580-02AFC5B28B3E}"/>
+                <a16:creationId xmlns:a16="http://schemas.microsoft.com/office/drawing/2014/main" id="{892E0C27-F3D5-44AC-B580-02AFC5B28B3E}"/>
               </a:ext>
             </a:extLst>
           </p:cNvPr>
@@ -3797,7 +3797,7 @@
           <p:cNvPr id="6" name="Slide Number Placeholder 5">
             <a:extLst>
               <a:ext uri="{FF2B5EF4-FFF2-40B4-BE49-F238E27FC236}">
-                <a16:creationId xmlns:a16="http://schemas.microsoft.com/office/drawing/2014/main" xmlns="" id="{C3B4AA22-8D01-4C9D-BD7A-9726F0327C6E}"/>
+                <a16:creationId xmlns:a16="http://schemas.microsoft.com/office/drawing/2014/main" id="{C3B4AA22-8D01-4C9D-BD7A-9726F0327C6E}"/>
               </a:ext>
             </a:extLst>
           </p:cNvPr>
@@ -4179,7 +4179,7 @@
             <p:cNvPr id="138" name="Rectangle 137">
               <a:extLst>
                 <a:ext uri="{FF2B5EF4-FFF2-40B4-BE49-F238E27FC236}">
-                  <a16:creationId xmlns:a16="http://schemas.microsoft.com/office/drawing/2014/main" xmlns="" id="{B8BDB747-DB54-4603-9F15-4ACF08417009}"/>
+                  <a16:creationId xmlns:a16="http://schemas.microsoft.com/office/drawing/2014/main" id="{B8BDB747-DB54-4603-9F15-4ACF08417009}"/>
                 </a:ext>
               </a:extLst>
             </p:cNvPr>
@@ -4248,7 +4248,7 @@
               <p:cNvPr id="212" name="Rectangle 211">
                 <a:extLst>
                   <a:ext uri="{FF2B5EF4-FFF2-40B4-BE49-F238E27FC236}">
-                    <a16:creationId xmlns:a16="http://schemas.microsoft.com/office/drawing/2014/main" xmlns="" id="{65213324-AD47-4E21-A396-C767F748C6C9}"/>
+                    <a16:creationId xmlns:a16="http://schemas.microsoft.com/office/drawing/2014/main" id="{65213324-AD47-4E21-A396-C767F748C6C9}"/>
                   </a:ext>
                 </a:extLst>
               </p:cNvPr>
@@ -4308,7 +4308,7 @@
               <p:cNvPr id="124" name="Rectangle 123">
                 <a:extLst>
                   <a:ext uri="{FF2B5EF4-FFF2-40B4-BE49-F238E27FC236}">
-                    <a16:creationId xmlns:a16="http://schemas.microsoft.com/office/drawing/2014/main" xmlns="" id="{268CF0CF-8B9E-49C3-B441-CE5A5F4401CB}"/>
+                    <a16:creationId xmlns:a16="http://schemas.microsoft.com/office/drawing/2014/main" id="{268CF0CF-8B9E-49C3-B441-CE5A5F4401CB}"/>
                   </a:ext>
                 </a:extLst>
               </p:cNvPr>
@@ -4368,7 +4368,7 @@
               <p:cNvPr id="227" name="Rectangle 226">
                 <a:extLst>
                   <a:ext uri="{FF2B5EF4-FFF2-40B4-BE49-F238E27FC236}">
-                    <a16:creationId xmlns:a16="http://schemas.microsoft.com/office/drawing/2014/main" xmlns="" id="{A272D0FE-A97F-4CED-BD9D-A9F47E17C6F4}"/>
+                    <a16:creationId xmlns:a16="http://schemas.microsoft.com/office/drawing/2014/main" id="{A272D0FE-A97F-4CED-BD9D-A9F47E17C6F4}"/>
                   </a:ext>
                 </a:extLst>
               </p:cNvPr>
@@ -4429,7 +4429,7 @@
               <p:cNvPr id="210" name="Rectangle 209">
                 <a:extLst>
                   <a:ext uri="{FF2B5EF4-FFF2-40B4-BE49-F238E27FC236}">
-                    <a16:creationId xmlns:a16="http://schemas.microsoft.com/office/drawing/2014/main" xmlns="" id="{268CF0CF-8B9E-49C3-B441-CE5A5F4401CB}"/>
+                    <a16:creationId xmlns:a16="http://schemas.microsoft.com/office/drawing/2014/main" id="{268CF0CF-8B9E-49C3-B441-CE5A5F4401CB}"/>
                   </a:ext>
                 </a:extLst>
               </p:cNvPr>
@@ -4489,7 +4489,7 @@
               <p:cNvPr id="160" name="Rectangle 159">
                 <a:extLst>
                   <a:ext uri="{FF2B5EF4-FFF2-40B4-BE49-F238E27FC236}">
-                    <a16:creationId xmlns:a16="http://schemas.microsoft.com/office/drawing/2014/main" xmlns="" id="{7117050F-A2EE-4B2C-BFD0-4A6598BFE9C9}"/>
+                    <a16:creationId xmlns:a16="http://schemas.microsoft.com/office/drawing/2014/main" id="{7117050F-A2EE-4B2C-BFD0-4A6598BFE9C9}"/>
                   </a:ext>
                 </a:extLst>
               </p:cNvPr>
@@ -4546,7 +4546,7 @@
               <p:cNvPr id="161" name="Rectangle 160">
                 <a:extLst>
                   <a:ext uri="{FF2B5EF4-FFF2-40B4-BE49-F238E27FC236}">
-                    <a16:creationId xmlns:a16="http://schemas.microsoft.com/office/drawing/2014/main" xmlns="" id="{AF15E516-51FC-45AD-B02C-995018977EAD}"/>
+                    <a16:creationId xmlns:a16="http://schemas.microsoft.com/office/drawing/2014/main" id="{AF15E516-51FC-45AD-B02C-995018977EAD}"/>
                   </a:ext>
                 </a:extLst>
               </p:cNvPr>
@@ -4603,7 +4603,7 @@
               <p:cNvPr id="162" name="Rectangle 161">
                 <a:extLst>
                   <a:ext uri="{FF2B5EF4-FFF2-40B4-BE49-F238E27FC236}">
-                    <a16:creationId xmlns:a16="http://schemas.microsoft.com/office/drawing/2014/main" xmlns="" id="{F1BA82AF-F97D-42B4-AA06-2AC9D008BB78}"/>
+                    <a16:creationId xmlns:a16="http://schemas.microsoft.com/office/drawing/2014/main" id="{F1BA82AF-F97D-42B4-AA06-2AC9D008BB78}"/>
                   </a:ext>
                 </a:extLst>
               </p:cNvPr>
@@ -4660,7 +4660,7 @@
               <p:cNvPr id="189" name="Rectangle 188">
                 <a:extLst>
                   <a:ext uri="{FF2B5EF4-FFF2-40B4-BE49-F238E27FC236}">
-                    <a16:creationId xmlns:a16="http://schemas.microsoft.com/office/drawing/2014/main" xmlns="" id="{6A2636E8-0A45-4F73-831B-C9C565A3C3AC}"/>
+                    <a16:creationId xmlns:a16="http://schemas.microsoft.com/office/drawing/2014/main" id="{6A2636E8-0A45-4F73-831B-C9C565A3C3AC}"/>
                   </a:ext>
                 </a:extLst>
               </p:cNvPr>
@@ -4722,7 +4722,7 @@
               <p:cNvPr id="228" name="Rectangle 227">
                 <a:extLst>
                   <a:ext uri="{FF2B5EF4-FFF2-40B4-BE49-F238E27FC236}">
-                    <a16:creationId xmlns:a16="http://schemas.microsoft.com/office/drawing/2014/main" xmlns="" id="{7EF06410-4D22-4625-8D14-C0C56D86E832}"/>
+                    <a16:creationId xmlns:a16="http://schemas.microsoft.com/office/drawing/2014/main" id="{7EF06410-4D22-4625-8D14-C0C56D86E832}"/>
                   </a:ext>
                 </a:extLst>
               </p:cNvPr>
@@ -4779,7 +4779,7 @@
               <p:cNvPr id="229" name="Rectangle 228">
                 <a:extLst>
                   <a:ext uri="{FF2B5EF4-FFF2-40B4-BE49-F238E27FC236}">
-                    <a16:creationId xmlns:a16="http://schemas.microsoft.com/office/drawing/2014/main" xmlns="" id="{FF68E0FE-BA9B-4B69-A717-1006746AAF7F}"/>
+                    <a16:creationId xmlns:a16="http://schemas.microsoft.com/office/drawing/2014/main" id="{FF68E0FE-BA9B-4B69-A717-1006746AAF7F}"/>
                   </a:ext>
                 </a:extLst>
               </p:cNvPr>
@@ -4836,7 +4836,7 @@
               <p:cNvPr id="230" name="Rectangle 229">
                 <a:extLst>
                   <a:ext uri="{FF2B5EF4-FFF2-40B4-BE49-F238E27FC236}">
-                    <a16:creationId xmlns:a16="http://schemas.microsoft.com/office/drawing/2014/main" xmlns="" id="{3A186F86-183B-44D9-994F-09DC9E1CB888}"/>
+                    <a16:creationId xmlns:a16="http://schemas.microsoft.com/office/drawing/2014/main" id="{3A186F86-183B-44D9-994F-09DC9E1CB888}"/>
                   </a:ext>
                 </a:extLst>
               </p:cNvPr>
@@ -4893,7 +4893,7 @@
               <p:cNvPr id="231" name="Rectangle 230">
                 <a:extLst>
                   <a:ext uri="{FF2B5EF4-FFF2-40B4-BE49-F238E27FC236}">
-                    <a16:creationId xmlns:a16="http://schemas.microsoft.com/office/drawing/2014/main" xmlns="" id="{314B1CB2-9E77-4648-A554-EE2A883A4C3C}"/>
+                    <a16:creationId xmlns:a16="http://schemas.microsoft.com/office/drawing/2014/main" id="{314B1CB2-9E77-4648-A554-EE2A883A4C3C}"/>
                   </a:ext>
                 </a:extLst>
               </p:cNvPr>
@@ -4954,7 +4954,7 @@
               <p:cNvPr id="266" name="Rectangle 265">
                 <a:extLst>
                   <a:ext uri="{FF2B5EF4-FFF2-40B4-BE49-F238E27FC236}">
-                    <a16:creationId xmlns:a16="http://schemas.microsoft.com/office/drawing/2014/main" xmlns="" id="{62BDBCB1-3043-460A-8B13-2B0F557125F6}"/>
+                    <a16:creationId xmlns:a16="http://schemas.microsoft.com/office/drawing/2014/main" id="{62BDBCB1-3043-460A-8B13-2B0F557125F6}"/>
                   </a:ext>
                 </a:extLst>
               </p:cNvPr>
@@ -5015,7 +5015,7 @@
               <p:cNvPr id="267" name="Rectangle 266">
                 <a:extLst>
                   <a:ext uri="{FF2B5EF4-FFF2-40B4-BE49-F238E27FC236}">
-                    <a16:creationId xmlns:a16="http://schemas.microsoft.com/office/drawing/2014/main" xmlns="" id="{322C7DF9-5653-41CD-89D5-50AE4BEE8A5E}"/>
+                    <a16:creationId xmlns:a16="http://schemas.microsoft.com/office/drawing/2014/main" id="{322C7DF9-5653-41CD-89D5-50AE4BEE8A5E}"/>
                   </a:ext>
                 </a:extLst>
               </p:cNvPr>
@@ -5076,7 +5076,7 @@
               <p:cNvPr id="282" name="Connector: Elbow 281">
                 <a:extLst>
                   <a:ext uri="{FF2B5EF4-FFF2-40B4-BE49-F238E27FC236}">
-                    <a16:creationId xmlns:a16="http://schemas.microsoft.com/office/drawing/2014/main" xmlns="" id="{B6522D1A-2EEB-4DCB-9622-F584E4DB1EE9}"/>
+                    <a16:creationId xmlns:a16="http://schemas.microsoft.com/office/drawing/2014/main" id="{B6522D1A-2EEB-4DCB-9622-F584E4DB1EE9}"/>
                   </a:ext>
                 </a:extLst>
               </p:cNvPr>
@@ -5120,7 +5120,7 @@
               <p:cNvPr id="285" name="Rectangle 284">
                 <a:extLst>
                   <a:ext uri="{FF2B5EF4-FFF2-40B4-BE49-F238E27FC236}">
-                    <a16:creationId xmlns:a16="http://schemas.microsoft.com/office/drawing/2014/main" xmlns="" id="{6F75FE53-6A70-4F05-A4C2-349A82A49C78}"/>
+                    <a16:creationId xmlns:a16="http://schemas.microsoft.com/office/drawing/2014/main" id="{6F75FE53-6A70-4F05-A4C2-349A82A49C78}"/>
                   </a:ext>
                 </a:extLst>
               </p:cNvPr>
@@ -5177,7 +5177,7 @@
               <p:cNvPr id="291" name="Rectangle 290">
                 <a:extLst>
                   <a:ext uri="{FF2B5EF4-FFF2-40B4-BE49-F238E27FC236}">
-                    <a16:creationId xmlns:a16="http://schemas.microsoft.com/office/drawing/2014/main" xmlns="" id="{AC62CD37-69F6-4B18-B8E5-A42CDA4A2331}"/>
+                    <a16:creationId xmlns:a16="http://schemas.microsoft.com/office/drawing/2014/main" id="{AC62CD37-69F6-4B18-B8E5-A42CDA4A2331}"/>
                   </a:ext>
                 </a:extLst>
               </p:cNvPr>
@@ -5234,7 +5234,7 @@
               <p:cNvPr id="186" name="Rectangle 185">
                 <a:extLst>
                   <a:ext uri="{FF2B5EF4-FFF2-40B4-BE49-F238E27FC236}">
-                    <a16:creationId xmlns:a16="http://schemas.microsoft.com/office/drawing/2014/main" xmlns="" id="{61B0E387-B99B-477C-A708-6AC78B8EE1BE}"/>
+                    <a16:creationId xmlns:a16="http://schemas.microsoft.com/office/drawing/2014/main" id="{61B0E387-B99B-477C-A708-6AC78B8EE1BE}"/>
                   </a:ext>
                 </a:extLst>
               </p:cNvPr>
@@ -5291,7 +5291,7 @@
               <p:cNvPr id="187" name="Rectangle 186">
                 <a:extLst>
                   <a:ext uri="{FF2B5EF4-FFF2-40B4-BE49-F238E27FC236}">
-                    <a16:creationId xmlns:a16="http://schemas.microsoft.com/office/drawing/2014/main" xmlns="" id="{8A235B86-3E51-415B-9AB6-DB739C11D906}"/>
+                    <a16:creationId xmlns:a16="http://schemas.microsoft.com/office/drawing/2014/main" id="{8A235B86-3E51-415B-9AB6-DB739C11D906}"/>
                   </a:ext>
                 </a:extLst>
               </p:cNvPr>
@@ -5346,7 +5346,7 @@
               <p:cNvPr id="190" name="Rectangle 189">
                 <a:extLst>
                   <a:ext uri="{FF2B5EF4-FFF2-40B4-BE49-F238E27FC236}">
-                    <a16:creationId xmlns:a16="http://schemas.microsoft.com/office/drawing/2014/main" xmlns="" id="{E66C3D41-8283-452A-A537-6E9C275190CE}"/>
+                    <a16:creationId xmlns:a16="http://schemas.microsoft.com/office/drawing/2014/main" id="{E66C3D41-8283-452A-A537-6E9C275190CE}"/>
                   </a:ext>
                 </a:extLst>
               </p:cNvPr>
@@ -5401,7 +5401,7 @@
               <p:cNvPr id="192" name="Connector: Elbow 191">
                 <a:extLst>
                   <a:ext uri="{FF2B5EF4-FFF2-40B4-BE49-F238E27FC236}">
-                    <a16:creationId xmlns:a16="http://schemas.microsoft.com/office/drawing/2014/main" xmlns="" id="{CDE61E10-C12B-4522-B678-783926EDDC54}"/>
+                    <a16:creationId xmlns:a16="http://schemas.microsoft.com/office/drawing/2014/main" id="{CDE61E10-C12B-4522-B678-783926EDDC54}"/>
                   </a:ext>
                 </a:extLst>
               </p:cNvPr>
@@ -5445,7 +5445,7 @@
               <p:cNvPr id="195" name="Connector: Elbow 194">
                 <a:extLst>
                   <a:ext uri="{FF2B5EF4-FFF2-40B4-BE49-F238E27FC236}">
-                    <a16:creationId xmlns:a16="http://schemas.microsoft.com/office/drawing/2014/main" xmlns="" id="{3F8C8746-E275-430E-B078-BE38FECA7B5E}"/>
+                    <a16:creationId xmlns:a16="http://schemas.microsoft.com/office/drawing/2014/main" id="{3F8C8746-E275-430E-B078-BE38FECA7B5E}"/>
                   </a:ext>
                 </a:extLst>
               </p:cNvPr>
@@ -5491,7 +5491,7 @@
               <p:cNvPr id="199" name="Straight Connector 198">
                 <a:extLst>
                   <a:ext uri="{FF2B5EF4-FFF2-40B4-BE49-F238E27FC236}">
-                    <a16:creationId xmlns:a16="http://schemas.microsoft.com/office/drawing/2014/main" xmlns="" id="{9B37C0F6-C9C0-4453-BFEA-BC02505125CC}"/>
+                    <a16:creationId xmlns:a16="http://schemas.microsoft.com/office/drawing/2014/main" id="{9B37C0F6-C9C0-4453-BFEA-BC02505125CC}"/>
                   </a:ext>
                 </a:extLst>
               </p:cNvPr>
@@ -5534,7 +5534,7 @@
               <p:cNvPr id="201" name="Connector: Elbow 200">
                 <a:extLst>
                   <a:ext uri="{FF2B5EF4-FFF2-40B4-BE49-F238E27FC236}">
-                    <a16:creationId xmlns:a16="http://schemas.microsoft.com/office/drawing/2014/main" xmlns="" id="{A68371D3-9FCD-4C2A-9457-6069CACC2C30}"/>
+                    <a16:creationId xmlns:a16="http://schemas.microsoft.com/office/drawing/2014/main" id="{A68371D3-9FCD-4C2A-9457-6069CACC2C30}"/>
                   </a:ext>
                 </a:extLst>
               </p:cNvPr>
@@ -5578,7 +5578,7 @@
               <p:cNvPr id="188" name="Rectangle 187">
                 <a:extLst>
                   <a:ext uri="{FF2B5EF4-FFF2-40B4-BE49-F238E27FC236}">
-                    <a16:creationId xmlns:a16="http://schemas.microsoft.com/office/drawing/2014/main" xmlns="" id="{4BB99705-0FDA-4E9A-88D9-F375AF3C0AA9}"/>
+                    <a16:creationId xmlns:a16="http://schemas.microsoft.com/office/drawing/2014/main" id="{4BB99705-0FDA-4E9A-88D9-F375AF3C0AA9}"/>
                   </a:ext>
                 </a:extLst>
               </p:cNvPr>
@@ -5633,7 +5633,7 @@
               <p:cNvPr id="280" name="Rectangle 279">
                 <a:extLst>
                   <a:ext uri="{FF2B5EF4-FFF2-40B4-BE49-F238E27FC236}">
-                    <a16:creationId xmlns:a16="http://schemas.microsoft.com/office/drawing/2014/main" xmlns="" id="{138625F3-6989-4232-BADB-CE1AFD512F9A}"/>
+                    <a16:creationId xmlns:a16="http://schemas.microsoft.com/office/drawing/2014/main" id="{138625F3-6989-4232-BADB-CE1AFD512F9A}"/>
                   </a:ext>
                 </a:extLst>
               </p:cNvPr>
@@ -5688,7 +5688,7 @@
               <p:cNvPr id="110" name="Rectangle 109">
                 <a:extLst>
                   <a:ext uri="{FF2B5EF4-FFF2-40B4-BE49-F238E27FC236}">
-                    <a16:creationId xmlns:a16="http://schemas.microsoft.com/office/drawing/2014/main" xmlns="" id="{3D5A848A-7DDF-4E98-9203-74E4A3CB11B0}"/>
+                    <a16:creationId xmlns:a16="http://schemas.microsoft.com/office/drawing/2014/main" id="{3D5A848A-7DDF-4E98-9203-74E4A3CB11B0}"/>
                   </a:ext>
                 </a:extLst>
               </p:cNvPr>
@@ -5742,7 +5742,7 @@
               <p:cNvPr id="111" name="Rectangle 110">
                 <a:extLst>
                   <a:ext uri="{FF2B5EF4-FFF2-40B4-BE49-F238E27FC236}">
-                    <a16:creationId xmlns:a16="http://schemas.microsoft.com/office/drawing/2014/main" xmlns="" id="{D948357E-8B89-455A-B45A-725687B417D6}"/>
+                    <a16:creationId xmlns:a16="http://schemas.microsoft.com/office/drawing/2014/main" id="{D948357E-8B89-455A-B45A-725687B417D6}"/>
                   </a:ext>
                 </a:extLst>
               </p:cNvPr>
@@ -5796,7 +5796,7 @@
               <p:cNvPr id="112" name="Rectangle 111">
                 <a:extLst>
                   <a:ext uri="{FF2B5EF4-FFF2-40B4-BE49-F238E27FC236}">
-                    <a16:creationId xmlns:a16="http://schemas.microsoft.com/office/drawing/2014/main" xmlns="" id="{EFFA351A-B3E8-46C1-BFA6-792058AFB5AB}"/>
+                    <a16:creationId xmlns:a16="http://schemas.microsoft.com/office/drawing/2014/main" id="{EFFA351A-B3E8-46C1-BFA6-792058AFB5AB}"/>
                   </a:ext>
                 </a:extLst>
               </p:cNvPr>
@@ -5850,7 +5850,7 @@
               <p:cNvPr id="113" name="Rectangle 112">
                 <a:extLst>
                   <a:ext uri="{FF2B5EF4-FFF2-40B4-BE49-F238E27FC236}">
-                    <a16:creationId xmlns:a16="http://schemas.microsoft.com/office/drawing/2014/main" xmlns="" id="{E5D438F9-8A31-41D7-ACF3-964D853B2582}"/>
+                    <a16:creationId xmlns:a16="http://schemas.microsoft.com/office/drawing/2014/main" id="{E5D438F9-8A31-41D7-ACF3-964D853B2582}"/>
                   </a:ext>
                 </a:extLst>
               </p:cNvPr>
@@ -5904,7 +5904,7 @@
               <p:cNvPr id="114" name="Rectangle 113">
                 <a:extLst>
                   <a:ext uri="{FF2B5EF4-FFF2-40B4-BE49-F238E27FC236}">
-                    <a16:creationId xmlns:a16="http://schemas.microsoft.com/office/drawing/2014/main" xmlns="" id="{DF4EB9AD-8811-4CAA-B86C-FF0B4841A1BD}"/>
+                    <a16:creationId xmlns:a16="http://schemas.microsoft.com/office/drawing/2014/main" id="{DF4EB9AD-8811-4CAA-B86C-FF0B4841A1BD}"/>
                   </a:ext>
                 </a:extLst>
               </p:cNvPr>
@@ -5964,7 +5964,7 @@
               <p:cNvPr id="115" name="Rectangle 114">
                 <a:extLst>
                   <a:ext uri="{FF2B5EF4-FFF2-40B4-BE49-F238E27FC236}">
-                    <a16:creationId xmlns:a16="http://schemas.microsoft.com/office/drawing/2014/main" xmlns="" id="{E287870C-0686-412B-B7B7-E3EE89EF5F47}"/>
+                    <a16:creationId xmlns:a16="http://schemas.microsoft.com/office/drawing/2014/main" id="{E287870C-0686-412B-B7B7-E3EE89EF5F47}"/>
                   </a:ext>
                 </a:extLst>
               </p:cNvPr>
@@ -6018,7 +6018,7 @@
               <p:cNvPr id="116" name="Rectangle 115">
                 <a:extLst>
                   <a:ext uri="{FF2B5EF4-FFF2-40B4-BE49-F238E27FC236}">
-                    <a16:creationId xmlns:a16="http://schemas.microsoft.com/office/drawing/2014/main" xmlns="" id="{C577E244-F504-4E36-A4DE-0B1C1D9EE03C}"/>
+                    <a16:creationId xmlns:a16="http://schemas.microsoft.com/office/drawing/2014/main" id="{C577E244-F504-4E36-A4DE-0B1C1D9EE03C}"/>
                   </a:ext>
                 </a:extLst>
               </p:cNvPr>
@@ -6072,7 +6072,7 @@
               <p:cNvPr id="117" name="Rectangle 116">
                 <a:extLst>
                   <a:ext uri="{FF2B5EF4-FFF2-40B4-BE49-F238E27FC236}">
-                    <a16:creationId xmlns:a16="http://schemas.microsoft.com/office/drawing/2014/main" xmlns="" id="{6052DDAA-AFD2-4AF6-85C2-676892C26C77}"/>
+                    <a16:creationId xmlns:a16="http://schemas.microsoft.com/office/drawing/2014/main" id="{6052DDAA-AFD2-4AF6-85C2-676892C26C77}"/>
                   </a:ext>
                 </a:extLst>
               </p:cNvPr>
@@ -6126,7 +6126,7 @@
               <p:cNvPr id="118" name="Rectangle 117">
                 <a:extLst>
                   <a:ext uri="{FF2B5EF4-FFF2-40B4-BE49-F238E27FC236}">
-                    <a16:creationId xmlns:a16="http://schemas.microsoft.com/office/drawing/2014/main" xmlns="" id="{25CE3F0A-7FB4-4A9D-800A-186AF28921F2}"/>
+                    <a16:creationId xmlns:a16="http://schemas.microsoft.com/office/drawing/2014/main" id="{25CE3F0A-7FB4-4A9D-800A-186AF28921F2}"/>
                   </a:ext>
                 </a:extLst>
               </p:cNvPr>
@@ -6180,7 +6180,7 @@
               <p:cNvPr id="120" name="Rectangle 119">
                 <a:extLst>
                   <a:ext uri="{FF2B5EF4-FFF2-40B4-BE49-F238E27FC236}">
-                    <a16:creationId xmlns:a16="http://schemas.microsoft.com/office/drawing/2014/main" xmlns="" id="{9263DE6F-E2B3-40BC-8D30-EC1EE4C09E4F}"/>
+                    <a16:creationId xmlns:a16="http://schemas.microsoft.com/office/drawing/2014/main" id="{9263DE6F-E2B3-40BC-8D30-EC1EE4C09E4F}"/>
                   </a:ext>
                 </a:extLst>
               </p:cNvPr>
@@ -6237,7 +6237,7 @@
               <p:cNvPr id="123" name="Rectangle 122">
                 <a:extLst>
                   <a:ext uri="{FF2B5EF4-FFF2-40B4-BE49-F238E27FC236}">
-                    <a16:creationId xmlns:a16="http://schemas.microsoft.com/office/drawing/2014/main" xmlns="" id="{7389C7FE-8BE8-4C4A-BB9C-B5142D7F3BD1}"/>
+                    <a16:creationId xmlns:a16="http://schemas.microsoft.com/office/drawing/2014/main" id="{7389C7FE-8BE8-4C4A-BB9C-B5142D7F3BD1}"/>
                   </a:ext>
                 </a:extLst>
               </p:cNvPr>
@@ -6388,7 +6388,7 @@
               <p:cNvPr id="119" name="Rectangle 118">
                 <a:extLst>
                   <a:ext uri="{FF2B5EF4-FFF2-40B4-BE49-F238E27FC236}">
-                    <a16:creationId xmlns:a16="http://schemas.microsoft.com/office/drawing/2014/main" xmlns="" id="{94D814AF-83A7-4E32-9A6C-4546FB2CCA24}"/>
+                    <a16:creationId xmlns:a16="http://schemas.microsoft.com/office/drawing/2014/main" id="{94D814AF-83A7-4E32-9A6C-4546FB2CCA24}"/>
                   </a:ext>
                 </a:extLst>
               </p:cNvPr>
@@ -6445,7 +6445,7 @@
               <p:cNvPr id="121" name="Rectangle 120">
                 <a:extLst>
                   <a:ext uri="{FF2B5EF4-FFF2-40B4-BE49-F238E27FC236}">
-                    <a16:creationId xmlns:a16="http://schemas.microsoft.com/office/drawing/2014/main" xmlns="" id="{94D814AF-83A7-4E32-9A6C-4546FB2CCA24}"/>
+                    <a16:creationId xmlns:a16="http://schemas.microsoft.com/office/drawing/2014/main" id="{94D814AF-83A7-4E32-9A6C-4546FB2CCA24}"/>
                   </a:ext>
                 </a:extLst>
               </p:cNvPr>
@@ -6502,7 +6502,7 @@
               <p:cNvPr id="125" name="Rectangle 124">
                 <a:extLst>
                   <a:ext uri="{FF2B5EF4-FFF2-40B4-BE49-F238E27FC236}">
-                    <a16:creationId xmlns:a16="http://schemas.microsoft.com/office/drawing/2014/main" xmlns="" id="{94D814AF-83A7-4E32-9A6C-4546FB2CCA24}"/>
+                    <a16:creationId xmlns:a16="http://schemas.microsoft.com/office/drawing/2014/main" id="{94D814AF-83A7-4E32-9A6C-4546FB2CCA24}"/>
                   </a:ext>
                 </a:extLst>
               </p:cNvPr>
@@ -6559,7 +6559,7 @@
               <p:cNvPr id="97" name="Straight Connector 96">
                 <a:extLst>
                   <a:ext uri="{FF2B5EF4-FFF2-40B4-BE49-F238E27FC236}">
-                    <a16:creationId xmlns:a16="http://schemas.microsoft.com/office/drawing/2014/main" xmlns="" id="{D2D4152D-E445-44F7-9FFA-F801801657A4}"/>
+                    <a16:creationId xmlns:a16="http://schemas.microsoft.com/office/drawing/2014/main" id="{D2D4152D-E445-44F7-9FFA-F801801657A4}"/>
                   </a:ext>
                 </a:extLst>
               </p:cNvPr>
@@ -6602,7 +6602,7 @@
               <p:cNvPr id="43" name="Straight Connector 42">
                 <a:extLst>
                   <a:ext uri="{FF2B5EF4-FFF2-40B4-BE49-F238E27FC236}">
-                    <a16:creationId xmlns:a16="http://schemas.microsoft.com/office/drawing/2014/main" xmlns="" id="{7D418F97-72C5-4E5C-9F3A-DAA96B9694F5}"/>
+                    <a16:creationId xmlns:a16="http://schemas.microsoft.com/office/drawing/2014/main" id="{7D418F97-72C5-4E5C-9F3A-DAA96B9694F5}"/>
                   </a:ext>
                 </a:extLst>
               </p:cNvPr>
@@ -6645,7 +6645,7 @@
               <p:cNvPr id="46" name="Straight Connector 45">
                 <a:extLst>
                   <a:ext uri="{FF2B5EF4-FFF2-40B4-BE49-F238E27FC236}">
-                    <a16:creationId xmlns:a16="http://schemas.microsoft.com/office/drawing/2014/main" xmlns="" id="{668E4FBB-E5C7-4983-89D2-5C2DE622E0F2}"/>
+                    <a16:creationId xmlns:a16="http://schemas.microsoft.com/office/drawing/2014/main" id="{668E4FBB-E5C7-4983-89D2-5C2DE622E0F2}"/>
                   </a:ext>
                 </a:extLst>
               </p:cNvPr>
@@ -6688,7 +6688,7 @@
               <p:cNvPr id="50" name="Connector: Elbow 49">
                 <a:extLst>
                   <a:ext uri="{FF2B5EF4-FFF2-40B4-BE49-F238E27FC236}">
-                    <a16:creationId xmlns:a16="http://schemas.microsoft.com/office/drawing/2014/main" xmlns="" id="{7A7EBD10-FEA5-4F71-A6BB-253CBE1C2B5A}"/>
+                    <a16:creationId xmlns:a16="http://schemas.microsoft.com/office/drawing/2014/main" id="{7A7EBD10-FEA5-4F71-A6BB-253CBE1C2B5A}"/>
                   </a:ext>
                 </a:extLst>
               </p:cNvPr>
@@ -6733,7 +6733,7 @@
               <p:cNvPr id="56" name="Connector: Elbow 55">
                 <a:extLst>
                   <a:ext uri="{FF2B5EF4-FFF2-40B4-BE49-F238E27FC236}">
-                    <a16:creationId xmlns:a16="http://schemas.microsoft.com/office/drawing/2014/main" xmlns="" id="{3CB1AB71-E1BD-4F35-9BEF-ED11F9DBFB4E}"/>
+                    <a16:creationId xmlns:a16="http://schemas.microsoft.com/office/drawing/2014/main" id="{3CB1AB71-E1BD-4F35-9BEF-ED11F9DBFB4E}"/>
                   </a:ext>
                 </a:extLst>
               </p:cNvPr>
@@ -6779,7 +6779,7 @@
               <p:cNvPr id="59" name="Connector: Elbow 58">
                 <a:extLst>
                   <a:ext uri="{FF2B5EF4-FFF2-40B4-BE49-F238E27FC236}">
-                    <a16:creationId xmlns:a16="http://schemas.microsoft.com/office/drawing/2014/main" xmlns="" id="{0DF047BA-FC58-46B2-A8F5-3E6873F05133}"/>
+                    <a16:creationId xmlns:a16="http://schemas.microsoft.com/office/drawing/2014/main" id="{0DF047BA-FC58-46B2-A8F5-3E6873F05133}"/>
                   </a:ext>
                 </a:extLst>
               </p:cNvPr>
@@ -6825,7 +6825,7 @@
               <p:cNvPr id="61" name="Connector: Elbow 60">
                 <a:extLst>
                   <a:ext uri="{FF2B5EF4-FFF2-40B4-BE49-F238E27FC236}">
-                    <a16:creationId xmlns:a16="http://schemas.microsoft.com/office/drawing/2014/main" xmlns="" id="{CBC03679-7CD0-4722-A894-AB4719E5EB7D}"/>
+                    <a16:creationId xmlns:a16="http://schemas.microsoft.com/office/drawing/2014/main" id="{CBC03679-7CD0-4722-A894-AB4719E5EB7D}"/>
                   </a:ext>
                 </a:extLst>
               </p:cNvPr>
@@ -6871,7 +6871,7 @@
               <p:cNvPr id="73" name="Connector: Elbow 72">
                 <a:extLst>
                   <a:ext uri="{FF2B5EF4-FFF2-40B4-BE49-F238E27FC236}">
-                    <a16:creationId xmlns:a16="http://schemas.microsoft.com/office/drawing/2014/main" xmlns="" id="{65F5347D-FE86-462C-831E-722C68DADE04}"/>
+                    <a16:creationId xmlns:a16="http://schemas.microsoft.com/office/drawing/2014/main" id="{65F5347D-FE86-462C-831E-722C68DADE04}"/>
                   </a:ext>
                 </a:extLst>
               </p:cNvPr>
@@ -6916,7 +6916,7 @@
               <p:cNvPr id="74" name="Connector: Elbow 73">
                 <a:extLst>
                   <a:ext uri="{FF2B5EF4-FFF2-40B4-BE49-F238E27FC236}">
-                    <a16:creationId xmlns:a16="http://schemas.microsoft.com/office/drawing/2014/main" xmlns="" id="{B515E8BC-EF7F-4D9F-AC8F-0A5D256A5A43}"/>
+                    <a16:creationId xmlns:a16="http://schemas.microsoft.com/office/drawing/2014/main" id="{B515E8BC-EF7F-4D9F-AC8F-0A5D256A5A43}"/>
                   </a:ext>
                 </a:extLst>
               </p:cNvPr>
@@ -6961,7 +6961,7 @@
               <p:cNvPr id="78" name="Connector: Elbow 77">
                 <a:extLst>
                   <a:ext uri="{FF2B5EF4-FFF2-40B4-BE49-F238E27FC236}">
-                    <a16:creationId xmlns:a16="http://schemas.microsoft.com/office/drawing/2014/main" xmlns="" id="{0391FBF3-53A7-473D-8C54-D11AED47BA9A}"/>
+                    <a16:creationId xmlns:a16="http://schemas.microsoft.com/office/drawing/2014/main" id="{0391FBF3-53A7-473D-8C54-D11AED47BA9A}"/>
                   </a:ext>
                 </a:extLst>
               </p:cNvPr>
@@ -7006,7 +7006,7 @@
               <p:cNvPr id="79" name="Connector: Elbow 78">
                 <a:extLst>
                   <a:ext uri="{FF2B5EF4-FFF2-40B4-BE49-F238E27FC236}">
-                    <a16:creationId xmlns:a16="http://schemas.microsoft.com/office/drawing/2014/main" xmlns="" id="{53B7D16A-0951-4B73-9A87-4476A58781A7}"/>
+                    <a16:creationId xmlns:a16="http://schemas.microsoft.com/office/drawing/2014/main" id="{53B7D16A-0951-4B73-9A87-4476A58781A7}"/>
                   </a:ext>
                 </a:extLst>
               </p:cNvPr>
@@ -7051,7 +7051,7 @@
               <p:cNvPr id="170" name="Rectangle 169">
                 <a:extLst>
                   <a:ext uri="{FF2B5EF4-FFF2-40B4-BE49-F238E27FC236}">
-                    <a16:creationId xmlns:a16="http://schemas.microsoft.com/office/drawing/2014/main" xmlns="" id="{0A39FE7D-5E35-4CC8-929D-8426AC15A250}"/>
+                    <a16:creationId xmlns:a16="http://schemas.microsoft.com/office/drawing/2014/main" id="{0A39FE7D-5E35-4CC8-929D-8426AC15A250}"/>
                   </a:ext>
                 </a:extLst>
               </p:cNvPr>
@@ -7108,7 +7108,7 @@
               <p:cNvPr id="172" name="Straight Connector 171">
                 <a:extLst>
                   <a:ext uri="{FF2B5EF4-FFF2-40B4-BE49-F238E27FC236}">
-                    <a16:creationId xmlns:a16="http://schemas.microsoft.com/office/drawing/2014/main" xmlns="" id="{7DE850BD-3980-4137-B8F8-9CFB96C7BAD9}"/>
+                    <a16:creationId xmlns:a16="http://schemas.microsoft.com/office/drawing/2014/main" id="{7DE850BD-3980-4137-B8F8-9CFB96C7BAD9}"/>
                   </a:ext>
                 </a:extLst>
               </p:cNvPr>
@@ -7151,7 +7151,7 @@
               <p:cNvPr id="173" name="Straight Connector 172">
                 <a:extLst>
                   <a:ext uri="{FF2B5EF4-FFF2-40B4-BE49-F238E27FC236}">
-                    <a16:creationId xmlns:a16="http://schemas.microsoft.com/office/drawing/2014/main" xmlns="" id="{0BE95A8A-9FD8-4C43-BE89-1E610B81B3F9}"/>
+                    <a16:creationId xmlns:a16="http://schemas.microsoft.com/office/drawing/2014/main" id="{0BE95A8A-9FD8-4C43-BE89-1E610B81B3F9}"/>
                   </a:ext>
                 </a:extLst>
               </p:cNvPr>
@@ -7194,7 +7194,7 @@
               <p:cNvPr id="174" name="Straight Connector 173">
                 <a:extLst>
                   <a:ext uri="{FF2B5EF4-FFF2-40B4-BE49-F238E27FC236}">
-                    <a16:creationId xmlns:a16="http://schemas.microsoft.com/office/drawing/2014/main" xmlns="" id="{312488A4-4BF7-49B6-8A79-7F8D19369A66}"/>
+                    <a16:creationId xmlns:a16="http://schemas.microsoft.com/office/drawing/2014/main" id="{312488A4-4BF7-49B6-8A79-7F8D19369A66}"/>
                   </a:ext>
                 </a:extLst>
               </p:cNvPr>
@@ -7237,7 +7237,7 @@
               <p:cNvPr id="180" name="Straight Connector 179">
                 <a:extLst>
                   <a:ext uri="{FF2B5EF4-FFF2-40B4-BE49-F238E27FC236}">
-                    <a16:creationId xmlns:a16="http://schemas.microsoft.com/office/drawing/2014/main" xmlns="" id="{0C1C05D8-F57F-456E-8AAB-FB8D33CAF81E}"/>
+                    <a16:creationId xmlns:a16="http://schemas.microsoft.com/office/drawing/2014/main" id="{0C1C05D8-F57F-456E-8AAB-FB8D33CAF81E}"/>
                   </a:ext>
                 </a:extLst>
               </p:cNvPr>
@@ -7280,7 +7280,7 @@
               <p:cNvPr id="232" name="Rectangle 231">
                 <a:extLst>
                   <a:ext uri="{FF2B5EF4-FFF2-40B4-BE49-F238E27FC236}">
-                    <a16:creationId xmlns:a16="http://schemas.microsoft.com/office/drawing/2014/main" xmlns="" id="{F2C03604-FDD1-405E-AC66-1998640B1176}"/>
+                    <a16:creationId xmlns:a16="http://schemas.microsoft.com/office/drawing/2014/main" id="{F2C03604-FDD1-405E-AC66-1998640B1176}"/>
                   </a:ext>
                 </a:extLst>
               </p:cNvPr>
@@ -7341,7 +7341,7 @@
               <p:cNvPr id="237" name="Rectangle 236">
                 <a:extLst>
                   <a:ext uri="{FF2B5EF4-FFF2-40B4-BE49-F238E27FC236}">
-                    <a16:creationId xmlns:a16="http://schemas.microsoft.com/office/drawing/2014/main" xmlns="" id="{A9222955-4E35-4DF4-BDD0-30AB7970E2AF}"/>
+                    <a16:creationId xmlns:a16="http://schemas.microsoft.com/office/drawing/2014/main" id="{A9222955-4E35-4DF4-BDD0-30AB7970E2AF}"/>
                   </a:ext>
                 </a:extLst>
               </p:cNvPr>
@@ -7402,7 +7402,7 @@
               <p:cNvPr id="249" name="Rectangle 248">
                 <a:extLst>
                   <a:ext uri="{FF2B5EF4-FFF2-40B4-BE49-F238E27FC236}">
-                    <a16:creationId xmlns:a16="http://schemas.microsoft.com/office/drawing/2014/main" xmlns="" id="{05B33235-0756-4563-9CE7-E600D9743873}"/>
+                    <a16:creationId xmlns:a16="http://schemas.microsoft.com/office/drawing/2014/main" id="{05B33235-0756-4563-9CE7-E600D9743873}"/>
                   </a:ext>
                 </a:extLst>
               </p:cNvPr>
@@ -7463,7 +7463,7 @@
               <p:cNvPr id="250" name="Rectangle 249">
                 <a:extLst>
                   <a:ext uri="{FF2B5EF4-FFF2-40B4-BE49-F238E27FC236}">
-                    <a16:creationId xmlns:a16="http://schemas.microsoft.com/office/drawing/2014/main" xmlns="" id="{5C24CC4D-6A79-48B3-92A0-DD39A40C359D}"/>
+                    <a16:creationId xmlns:a16="http://schemas.microsoft.com/office/drawing/2014/main" id="{5C24CC4D-6A79-48B3-92A0-DD39A40C359D}"/>
                   </a:ext>
                 </a:extLst>
               </p:cNvPr>
@@ -7524,7 +7524,7 @@
               <p:cNvPr id="10" name="Rectangle 9">
                 <a:extLst>
                   <a:ext uri="{FF2B5EF4-FFF2-40B4-BE49-F238E27FC236}">
-                    <a16:creationId xmlns:a16="http://schemas.microsoft.com/office/drawing/2014/main" xmlns="" id="{08A137F5-FA4C-4F3B-B37B-4E10ACFF5472}"/>
+                    <a16:creationId xmlns:a16="http://schemas.microsoft.com/office/drawing/2014/main" id="{08A137F5-FA4C-4F3B-B37B-4E10ACFF5472}"/>
                   </a:ext>
                 </a:extLst>
               </p:cNvPr>
@@ -7585,7 +7585,7 @@
               <p:cNvPr id="98" name="Straight Connector 97">
                 <a:extLst>
                   <a:ext uri="{FF2B5EF4-FFF2-40B4-BE49-F238E27FC236}">
-                    <a16:creationId xmlns:a16="http://schemas.microsoft.com/office/drawing/2014/main" xmlns="" id="{4FAECFAD-E86D-4DE0-83E0-0AA95639170F}"/>
+                    <a16:creationId xmlns:a16="http://schemas.microsoft.com/office/drawing/2014/main" id="{4FAECFAD-E86D-4DE0-83E0-0AA95639170F}"/>
                   </a:ext>
                 </a:extLst>
               </p:cNvPr>
@@ -7628,7 +7628,7 @@
               <p:cNvPr id="99" name="Straight Connector 98">
                 <a:extLst>
                   <a:ext uri="{FF2B5EF4-FFF2-40B4-BE49-F238E27FC236}">
-                    <a16:creationId xmlns:a16="http://schemas.microsoft.com/office/drawing/2014/main" xmlns="" id="{37A049CD-523F-4E0E-BDCB-0D8F4060D88E}"/>
+                    <a16:creationId xmlns:a16="http://schemas.microsoft.com/office/drawing/2014/main" id="{37A049CD-523F-4E0E-BDCB-0D8F4060D88E}"/>
                   </a:ext>
                 </a:extLst>
               </p:cNvPr>
@@ -7671,7 +7671,7 @@
               <p:cNvPr id="14" name="Rectangle 13">
                 <a:extLst>
                   <a:ext uri="{FF2B5EF4-FFF2-40B4-BE49-F238E27FC236}">
-                    <a16:creationId xmlns:a16="http://schemas.microsoft.com/office/drawing/2014/main" xmlns="" id="{F4301EF9-A463-483B-8038-91C7DAD42396}"/>
+                    <a16:creationId xmlns:a16="http://schemas.microsoft.com/office/drawing/2014/main" id="{F4301EF9-A463-483B-8038-91C7DAD42396}"/>
                   </a:ext>
                 </a:extLst>
               </p:cNvPr>
@@ -7728,7 +7728,7 @@
               <p:cNvPr id="177" name="Rectangle 176">
                 <a:extLst>
                   <a:ext uri="{FF2B5EF4-FFF2-40B4-BE49-F238E27FC236}">
-                    <a16:creationId xmlns:a16="http://schemas.microsoft.com/office/drawing/2014/main" xmlns="" id="{2CA50F9A-8554-4EA1-A738-AEDB386057CF}"/>
+                    <a16:creationId xmlns:a16="http://schemas.microsoft.com/office/drawing/2014/main" id="{2CA50F9A-8554-4EA1-A738-AEDB386057CF}"/>
                   </a:ext>
                 </a:extLst>
               </p:cNvPr>
@@ -7789,7 +7789,7 @@
               <p:cNvPr id="179" name="Rectangle 178">
                 <a:extLst>
                   <a:ext uri="{FF2B5EF4-FFF2-40B4-BE49-F238E27FC236}">
-                    <a16:creationId xmlns:a16="http://schemas.microsoft.com/office/drawing/2014/main" xmlns="" id="{9252164B-3074-435F-B8FF-79820E24846F}"/>
+                    <a16:creationId xmlns:a16="http://schemas.microsoft.com/office/drawing/2014/main" id="{9252164B-3074-435F-B8FF-79820E24846F}"/>
                   </a:ext>
                 </a:extLst>
               </p:cNvPr>
@@ -7850,7 +7850,7 @@
               <p:cNvPr id="175" name="Rectangle 174">
                 <a:extLst>
                   <a:ext uri="{FF2B5EF4-FFF2-40B4-BE49-F238E27FC236}">
-                    <a16:creationId xmlns:a16="http://schemas.microsoft.com/office/drawing/2014/main" xmlns="" id="{15A5A695-C1C1-4F11-AF19-44645EA2373A}"/>
+                    <a16:creationId xmlns:a16="http://schemas.microsoft.com/office/drawing/2014/main" id="{15A5A695-C1C1-4F11-AF19-44645EA2373A}"/>
                   </a:ext>
                 </a:extLst>
               </p:cNvPr>
@@ -7907,7 +7907,7 @@
               <p:cNvPr id="103" name="Rectangle 102">
                 <a:extLst>
                   <a:ext uri="{FF2B5EF4-FFF2-40B4-BE49-F238E27FC236}">
-                    <a16:creationId xmlns:a16="http://schemas.microsoft.com/office/drawing/2014/main" xmlns="" id="{030A7595-D640-4E59-B463-AC847EA76C1A}"/>
+                    <a16:creationId xmlns:a16="http://schemas.microsoft.com/office/drawing/2014/main" id="{030A7595-D640-4E59-B463-AC847EA76C1A}"/>
                   </a:ext>
                 </a:extLst>
               </p:cNvPr>
@@ -7962,7 +7962,7 @@
               <p:cNvPr id="169" name="Rectangle 168">
                 <a:extLst>
                   <a:ext uri="{FF2B5EF4-FFF2-40B4-BE49-F238E27FC236}">
-                    <a16:creationId xmlns:a16="http://schemas.microsoft.com/office/drawing/2014/main" xmlns="" id="{58EF8757-308F-409C-86DB-5B7696700D53}"/>
+                    <a16:creationId xmlns:a16="http://schemas.microsoft.com/office/drawing/2014/main" id="{58EF8757-308F-409C-86DB-5B7696700D53}"/>
                   </a:ext>
                 </a:extLst>
               </p:cNvPr>
@@ -8019,7 +8019,7 @@
               <p:cNvPr id="122" name="Rectangle 121">
                 <a:extLst>
                   <a:ext uri="{FF2B5EF4-FFF2-40B4-BE49-F238E27FC236}">
-                    <a16:creationId xmlns:a16="http://schemas.microsoft.com/office/drawing/2014/main" xmlns="" id="{94D814AF-83A7-4E32-9A6C-4546FB2CCA24}"/>
+                    <a16:creationId xmlns:a16="http://schemas.microsoft.com/office/drawing/2014/main" id="{94D814AF-83A7-4E32-9A6C-4546FB2CCA24}"/>
                   </a:ext>
                 </a:extLst>
               </p:cNvPr>
@@ -8076,7 +8076,7 @@
               <p:cNvPr id="126" name="Rectangle 125">
                 <a:extLst>
                   <a:ext uri="{FF2B5EF4-FFF2-40B4-BE49-F238E27FC236}">
-                    <a16:creationId xmlns:a16="http://schemas.microsoft.com/office/drawing/2014/main" xmlns="" id="{94D814AF-83A7-4E32-9A6C-4546FB2CCA24}"/>
+                    <a16:creationId xmlns:a16="http://schemas.microsoft.com/office/drawing/2014/main" id="{94D814AF-83A7-4E32-9A6C-4546FB2CCA24}"/>
                   </a:ext>
                 </a:extLst>
               </p:cNvPr>
@@ -8133,7 +8133,7 @@
               <p:cNvPr id="127" name="Rectangle 126">
                 <a:extLst>
                   <a:ext uri="{FF2B5EF4-FFF2-40B4-BE49-F238E27FC236}">
-                    <a16:creationId xmlns:a16="http://schemas.microsoft.com/office/drawing/2014/main" xmlns="" id="{94D814AF-83A7-4E32-9A6C-4546FB2CCA24}"/>
+                    <a16:creationId xmlns:a16="http://schemas.microsoft.com/office/drawing/2014/main" id="{94D814AF-83A7-4E32-9A6C-4546FB2CCA24}"/>
                   </a:ext>
                 </a:extLst>
               </p:cNvPr>
@@ -8190,7 +8190,7 @@
               <p:cNvPr id="128" name="Rectangle 127">
                 <a:extLst>
                   <a:ext uri="{FF2B5EF4-FFF2-40B4-BE49-F238E27FC236}">
-                    <a16:creationId xmlns:a16="http://schemas.microsoft.com/office/drawing/2014/main" xmlns="" id="{94D814AF-83A7-4E32-9A6C-4546FB2CCA24}"/>
+                    <a16:creationId xmlns:a16="http://schemas.microsoft.com/office/drawing/2014/main" id="{94D814AF-83A7-4E32-9A6C-4546FB2CCA24}"/>
                   </a:ext>
                 </a:extLst>
               </p:cNvPr>
@@ -8247,7 +8247,7 @@
               <p:cNvPr id="129" name="Rectangle 128">
                 <a:extLst>
                   <a:ext uri="{FF2B5EF4-FFF2-40B4-BE49-F238E27FC236}">
-                    <a16:creationId xmlns:a16="http://schemas.microsoft.com/office/drawing/2014/main" xmlns="" id="{94D814AF-83A7-4E32-9A6C-4546FB2CCA24}"/>
+                    <a16:creationId xmlns:a16="http://schemas.microsoft.com/office/drawing/2014/main" id="{94D814AF-83A7-4E32-9A6C-4546FB2CCA24}"/>
                   </a:ext>
                 </a:extLst>
               </p:cNvPr>
@@ -8656,7 +8656,7 @@
               <p:cNvPr id="167" name="Rectangle 166">
                 <a:extLst>
                   <a:ext uri="{FF2B5EF4-FFF2-40B4-BE49-F238E27FC236}">
-                    <a16:creationId xmlns:a16="http://schemas.microsoft.com/office/drawing/2014/main" xmlns="" id="{94D814AF-83A7-4E32-9A6C-4546FB2CCA24}"/>
+                    <a16:creationId xmlns:a16="http://schemas.microsoft.com/office/drawing/2014/main" id="{94D814AF-83A7-4E32-9A6C-4546FB2CCA24}"/>
                   </a:ext>
                 </a:extLst>
               </p:cNvPr>
@@ -8717,7 +8717,7 @@
               <p:cNvPr id="140" name="Rectangle 139">
                 <a:extLst>
                   <a:ext uri="{FF2B5EF4-FFF2-40B4-BE49-F238E27FC236}">
-                    <a16:creationId xmlns:a16="http://schemas.microsoft.com/office/drawing/2014/main" xmlns="" id="{40DEB316-E730-4899-AC10-0C4F4E710769}"/>
+                    <a16:creationId xmlns:a16="http://schemas.microsoft.com/office/drawing/2014/main" id="{40DEB316-E730-4899-AC10-0C4F4E710769}"/>
                   </a:ext>
                 </a:extLst>
               </p:cNvPr>
@@ -8778,7 +8778,7 @@
               <p:cNvPr id="147" name="Rectangle 146">
                 <a:extLst>
                   <a:ext uri="{FF2B5EF4-FFF2-40B4-BE49-F238E27FC236}">
-                    <a16:creationId xmlns:a16="http://schemas.microsoft.com/office/drawing/2014/main" xmlns="" id="{7DCA0DBE-613F-4A74-9D28-A27F2AD8AE03}"/>
+                    <a16:creationId xmlns:a16="http://schemas.microsoft.com/office/drawing/2014/main" id="{7DCA0DBE-613F-4A74-9D28-A27F2AD8AE03}"/>
                   </a:ext>
                 </a:extLst>
               </p:cNvPr>
@@ -8839,7 +8839,7 @@
               <p:cNvPr id="148" name="Rectangle 147">
                 <a:extLst>
                   <a:ext uri="{FF2B5EF4-FFF2-40B4-BE49-F238E27FC236}">
-                    <a16:creationId xmlns:a16="http://schemas.microsoft.com/office/drawing/2014/main" xmlns="" id="{B00EF988-81A5-4CD8-B70A-E26E876AAD0D}"/>
+                    <a16:creationId xmlns:a16="http://schemas.microsoft.com/office/drawing/2014/main" id="{B00EF988-81A5-4CD8-B70A-E26E876AAD0D}"/>
                   </a:ext>
                 </a:extLst>
               </p:cNvPr>
@@ -8900,7 +8900,7 @@
               <p:cNvPr id="149" name="Rectangle 148">
                 <a:extLst>
                   <a:ext uri="{FF2B5EF4-FFF2-40B4-BE49-F238E27FC236}">
-                    <a16:creationId xmlns:a16="http://schemas.microsoft.com/office/drawing/2014/main" xmlns="" id="{40DEB316-E730-4899-AC10-0C4F4E710769}"/>
+                    <a16:creationId xmlns:a16="http://schemas.microsoft.com/office/drawing/2014/main" id="{40DEB316-E730-4899-AC10-0C4F4E710769}"/>
                   </a:ext>
                 </a:extLst>
               </p:cNvPr>
@@ -8962,7 +8962,7 @@
               <p:cNvPr id="258" name="Rectangle 257">
                 <a:extLst>
                   <a:ext uri="{FF2B5EF4-FFF2-40B4-BE49-F238E27FC236}">
-                    <a16:creationId xmlns:a16="http://schemas.microsoft.com/office/drawing/2014/main" xmlns="" id="{56D2F77C-C552-46B2-A723-F8D67927A308}"/>
+                    <a16:creationId xmlns:a16="http://schemas.microsoft.com/office/drawing/2014/main" id="{56D2F77C-C552-46B2-A723-F8D67927A308}"/>
                   </a:ext>
                 </a:extLst>
               </p:cNvPr>
@@ -9017,7 +9017,7 @@
               <p:cNvPr id="23" name="Rectangle 22">
                 <a:extLst>
                   <a:ext uri="{FF2B5EF4-FFF2-40B4-BE49-F238E27FC236}">
-                    <a16:creationId xmlns:a16="http://schemas.microsoft.com/office/drawing/2014/main" xmlns="" id="{A4A583A6-7AF1-4AAA-B02D-8F198CA01423}"/>
+                    <a16:creationId xmlns:a16="http://schemas.microsoft.com/office/drawing/2014/main" id="{A4A583A6-7AF1-4AAA-B02D-8F198CA01423}"/>
                   </a:ext>
                 </a:extLst>
               </p:cNvPr>
@@ -9078,7 +9078,7 @@
               <p:cNvPr id="193" name="Rectangle 192">
                 <a:extLst>
                   <a:ext uri="{FF2B5EF4-FFF2-40B4-BE49-F238E27FC236}">
-                    <a16:creationId xmlns:a16="http://schemas.microsoft.com/office/drawing/2014/main" xmlns="" id="{2CA50F9A-8554-4EA1-A738-AEDB386057CF}"/>
+                    <a16:creationId xmlns:a16="http://schemas.microsoft.com/office/drawing/2014/main" id="{2CA50F9A-8554-4EA1-A738-AEDB386057CF}"/>
                   </a:ext>
                 </a:extLst>
               </p:cNvPr>
@@ -9135,7 +9135,7 @@
               <p:cNvPr id="194" name="Rectangle 193">
                 <a:extLst>
                   <a:ext uri="{FF2B5EF4-FFF2-40B4-BE49-F238E27FC236}">
-                    <a16:creationId xmlns:a16="http://schemas.microsoft.com/office/drawing/2014/main" xmlns="" id="{2CA50F9A-8554-4EA1-A738-AEDB386057CF}"/>
+                    <a16:creationId xmlns:a16="http://schemas.microsoft.com/office/drawing/2014/main" id="{2CA50F9A-8554-4EA1-A738-AEDB386057CF}"/>
                   </a:ext>
                 </a:extLst>
               </p:cNvPr>
@@ -9192,7 +9192,7 @@
               <p:cNvPr id="196" name="Rectangle 195">
                 <a:extLst>
                   <a:ext uri="{FF2B5EF4-FFF2-40B4-BE49-F238E27FC236}">
-                    <a16:creationId xmlns:a16="http://schemas.microsoft.com/office/drawing/2014/main" xmlns="" id="{2CA50F9A-8554-4EA1-A738-AEDB386057CF}"/>
+                    <a16:creationId xmlns:a16="http://schemas.microsoft.com/office/drawing/2014/main" id="{2CA50F9A-8554-4EA1-A738-AEDB386057CF}"/>
                   </a:ext>
                 </a:extLst>
               </p:cNvPr>
@@ -9249,7 +9249,7 @@
               <p:cNvPr id="197" name="Rectangle 196">
                 <a:extLst>
                   <a:ext uri="{FF2B5EF4-FFF2-40B4-BE49-F238E27FC236}">
-                    <a16:creationId xmlns:a16="http://schemas.microsoft.com/office/drawing/2014/main" xmlns="" id="{2CA50F9A-8554-4EA1-A738-AEDB386057CF}"/>
+                    <a16:creationId xmlns:a16="http://schemas.microsoft.com/office/drawing/2014/main" id="{2CA50F9A-8554-4EA1-A738-AEDB386057CF}"/>
                   </a:ext>
                 </a:extLst>
               </p:cNvPr>
@@ -9306,7 +9306,7 @@
               <p:cNvPr id="198" name="Rectangle 197">
                 <a:extLst>
                   <a:ext uri="{FF2B5EF4-FFF2-40B4-BE49-F238E27FC236}">
-                    <a16:creationId xmlns:a16="http://schemas.microsoft.com/office/drawing/2014/main" xmlns="" id="{2CA50F9A-8554-4EA1-A738-AEDB386057CF}"/>
+                    <a16:creationId xmlns:a16="http://schemas.microsoft.com/office/drawing/2014/main" id="{2CA50F9A-8554-4EA1-A738-AEDB386057CF}"/>
                   </a:ext>
                 </a:extLst>
               </p:cNvPr>
@@ -9363,7 +9363,7 @@
               <p:cNvPr id="200" name="Rectangle 199">
                 <a:extLst>
                   <a:ext uri="{FF2B5EF4-FFF2-40B4-BE49-F238E27FC236}">
-                    <a16:creationId xmlns:a16="http://schemas.microsoft.com/office/drawing/2014/main" xmlns="" id="{2CA50F9A-8554-4EA1-A738-AEDB386057CF}"/>
+                    <a16:creationId xmlns:a16="http://schemas.microsoft.com/office/drawing/2014/main" id="{2CA50F9A-8554-4EA1-A738-AEDB386057CF}"/>
                   </a:ext>
                 </a:extLst>
               </p:cNvPr>
@@ -9420,7 +9420,7 @@
               <p:cNvPr id="202" name="Rectangle 201">
                 <a:extLst>
                   <a:ext uri="{FF2B5EF4-FFF2-40B4-BE49-F238E27FC236}">
-                    <a16:creationId xmlns:a16="http://schemas.microsoft.com/office/drawing/2014/main" xmlns="" id="{2CA50F9A-8554-4EA1-A738-AEDB386057CF}"/>
+                    <a16:creationId xmlns:a16="http://schemas.microsoft.com/office/drawing/2014/main" id="{2CA50F9A-8554-4EA1-A738-AEDB386057CF}"/>
                   </a:ext>
                 </a:extLst>
               </p:cNvPr>
@@ -9477,7 +9477,7 @@
               <p:cNvPr id="28" name="Rectangle 27">
                 <a:extLst>
                   <a:ext uri="{FF2B5EF4-FFF2-40B4-BE49-F238E27FC236}">
-                    <a16:creationId xmlns:a16="http://schemas.microsoft.com/office/drawing/2014/main" xmlns="" id="{761A63E8-7F28-4871-B0A9-247484364F74}"/>
+                    <a16:creationId xmlns:a16="http://schemas.microsoft.com/office/drawing/2014/main" id="{761A63E8-7F28-4871-B0A9-247484364F74}"/>
                   </a:ext>
                 </a:extLst>
               </p:cNvPr>
@@ -9532,7 +9532,7 @@
               <p:cNvPr id="29" name="Rectangle 28">
                 <a:extLst>
                   <a:ext uri="{FF2B5EF4-FFF2-40B4-BE49-F238E27FC236}">
-                    <a16:creationId xmlns:a16="http://schemas.microsoft.com/office/drawing/2014/main" xmlns="" id="{6146A208-4E3C-49DF-9229-F82357E8ED5E}"/>
+                    <a16:creationId xmlns:a16="http://schemas.microsoft.com/office/drawing/2014/main" id="{6146A208-4E3C-49DF-9229-F82357E8ED5E}"/>
                   </a:ext>
                 </a:extLst>
               </p:cNvPr>
@@ -9587,7 +9587,7 @@
               <p:cNvPr id="30" name="Rectangle 29">
                 <a:extLst>
                   <a:ext uri="{FF2B5EF4-FFF2-40B4-BE49-F238E27FC236}">
-                    <a16:creationId xmlns:a16="http://schemas.microsoft.com/office/drawing/2014/main" xmlns="" id="{82B7C559-B9D7-4F73-B498-984901FFBAF6}"/>
+                    <a16:creationId xmlns:a16="http://schemas.microsoft.com/office/drawing/2014/main" id="{82B7C559-B9D7-4F73-B498-984901FFBAF6}"/>
                   </a:ext>
                 </a:extLst>
               </p:cNvPr>
@@ -9642,7 +9642,7 @@
               <p:cNvPr id="245" name="Rectangle 244">
                 <a:extLst>
                   <a:ext uri="{FF2B5EF4-FFF2-40B4-BE49-F238E27FC236}">
-                    <a16:creationId xmlns:a16="http://schemas.microsoft.com/office/drawing/2014/main" xmlns="" id="{0824B7BE-E129-4743-8A46-4EDC97B06DB8}"/>
+                    <a16:creationId xmlns:a16="http://schemas.microsoft.com/office/drawing/2014/main" id="{0824B7BE-E129-4743-8A46-4EDC97B06DB8}"/>
                   </a:ext>
                 </a:extLst>
               </p:cNvPr>
@@ -9697,7 +9697,7 @@
               <p:cNvPr id="246" name="Rectangle 245">
                 <a:extLst>
                   <a:ext uri="{FF2B5EF4-FFF2-40B4-BE49-F238E27FC236}">
-                    <a16:creationId xmlns:a16="http://schemas.microsoft.com/office/drawing/2014/main" xmlns="" id="{D8676363-EE86-4893-A51D-E88C4B4BDD32}"/>
+                    <a16:creationId xmlns:a16="http://schemas.microsoft.com/office/drawing/2014/main" id="{D8676363-EE86-4893-A51D-E88C4B4BDD32}"/>
                   </a:ext>
                 </a:extLst>
               </p:cNvPr>
@@ -9752,7 +9752,7 @@
               <p:cNvPr id="247" name="Rectangle 246">
                 <a:extLst>
                   <a:ext uri="{FF2B5EF4-FFF2-40B4-BE49-F238E27FC236}">
-                    <a16:creationId xmlns:a16="http://schemas.microsoft.com/office/drawing/2014/main" xmlns="" id="{F1749F8C-021A-4EF6-8109-4E80598C2D76}"/>
+                    <a16:creationId xmlns:a16="http://schemas.microsoft.com/office/drawing/2014/main" id="{F1749F8C-021A-4EF6-8109-4E80598C2D76}"/>
                   </a:ext>
                 </a:extLst>
               </p:cNvPr>
@@ -9807,7 +9807,7 @@
               <p:cNvPr id="248" name="Rectangle 247">
                 <a:extLst>
                   <a:ext uri="{FF2B5EF4-FFF2-40B4-BE49-F238E27FC236}">
-                    <a16:creationId xmlns:a16="http://schemas.microsoft.com/office/drawing/2014/main" xmlns="" id="{D9CC6CEB-51C5-4B9D-AA0A-6B8606E73D77}"/>
+                    <a16:creationId xmlns:a16="http://schemas.microsoft.com/office/drawing/2014/main" id="{D9CC6CEB-51C5-4B9D-AA0A-6B8606E73D77}"/>
                   </a:ext>
                 </a:extLst>
               </p:cNvPr>
@@ -9862,7 +9862,7 @@
               <p:cNvPr id="27" name="Rectangle 26">
                 <a:extLst>
                   <a:ext uri="{FF2B5EF4-FFF2-40B4-BE49-F238E27FC236}">
-                    <a16:creationId xmlns:a16="http://schemas.microsoft.com/office/drawing/2014/main" xmlns="" id="{B929B1AE-1980-43CE-9118-1CF4ADE54EFD}"/>
+                    <a16:creationId xmlns:a16="http://schemas.microsoft.com/office/drawing/2014/main" id="{B929B1AE-1980-43CE-9118-1CF4ADE54EFD}"/>
                   </a:ext>
                 </a:extLst>
               </p:cNvPr>
@@ -9923,7 +9923,7 @@
               <p:cNvPr id="191" name="Rectangle 190">
                 <a:extLst>
                   <a:ext uri="{FF2B5EF4-FFF2-40B4-BE49-F238E27FC236}">
-                    <a16:creationId xmlns:a16="http://schemas.microsoft.com/office/drawing/2014/main" xmlns="" id="{DCED1CFE-AA27-4B7A-B82E-C5D00B631BEB}"/>
+                    <a16:creationId xmlns:a16="http://schemas.microsoft.com/office/drawing/2014/main" id="{DCED1CFE-AA27-4B7A-B82E-C5D00B631BEB}"/>
                   </a:ext>
                 </a:extLst>
               </p:cNvPr>
@@ -10029,7 +10029,7 @@
               <p:cNvPr id="136" name="Rectangle 135">
                 <a:extLst>
                   <a:ext uri="{FF2B5EF4-FFF2-40B4-BE49-F238E27FC236}">
-                    <a16:creationId xmlns:a16="http://schemas.microsoft.com/office/drawing/2014/main" xmlns="" id="{15A5A695-C1C1-4F11-AF19-44645EA2373A}"/>
+                    <a16:creationId xmlns:a16="http://schemas.microsoft.com/office/drawing/2014/main" id="{15A5A695-C1C1-4F11-AF19-44645EA2373A}"/>
                   </a:ext>
                 </a:extLst>
               </p:cNvPr>
@@ -10083,7 +10083,7 @@
               <p:cNvPr id="137" name="Rectangle 136">
                 <a:extLst>
                   <a:ext uri="{FF2B5EF4-FFF2-40B4-BE49-F238E27FC236}">
-                    <a16:creationId xmlns:a16="http://schemas.microsoft.com/office/drawing/2014/main" xmlns="" id="{15A5A695-C1C1-4F11-AF19-44645EA2373A}"/>
+                    <a16:creationId xmlns:a16="http://schemas.microsoft.com/office/drawing/2014/main" id="{15A5A695-C1C1-4F11-AF19-44645EA2373A}"/>
                   </a:ext>
                 </a:extLst>
               </p:cNvPr>
@@ -10137,7 +10137,7 @@
               <p:cNvPr id="141" name="Rectangle 140">
                 <a:extLst>
                   <a:ext uri="{FF2B5EF4-FFF2-40B4-BE49-F238E27FC236}">
-                    <a16:creationId xmlns:a16="http://schemas.microsoft.com/office/drawing/2014/main" xmlns="" id="{7DCA0DBE-613F-4A74-9D28-A27F2AD8AE03}"/>
+                    <a16:creationId xmlns:a16="http://schemas.microsoft.com/office/drawing/2014/main" id="{7DCA0DBE-613F-4A74-9D28-A27F2AD8AE03}"/>
                   </a:ext>
                 </a:extLst>
               </p:cNvPr>
@@ -10198,7 +10198,7 @@
               <p:cNvPr id="209" name="Rectangle 208">
                 <a:extLst>
                   <a:ext uri="{FF2B5EF4-FFF2-40B4-BE49-F238E27FC236}">
-                    <a16:creationId xmlns:a16="http://schemas.microsoft.com/office/drawing/2014/main" xmlns="" id="{7DCA0DBE-613F-4A74-9D28-A27F2AD8AE03}"/>
+                    <a16:creationId xmlns:a16="http://schemas.microsoft.com/office/drawing/2014/main" id="{7DCA0DBE-613F-4A74-9D28-A27F2AD8AE03}"/>
                   </a:ext>
                 </a:extLst>
               </p:cNvPr>
@@ -10259,7 +10259,7 @@
               <p:cNvPr id="102" name="Rectangle 101">
                 <a:extLst>
                   <a:ext uri="{FF2B5EF4-FFF2-40B4-BE49-F238E27FC236}">
-                    <a16:creationId xmlns:a16="http://schemas.microsoft.com/office/drawing/2014/main" xmlns="" id="{B00EF988-81A5-4CD8-B70A-E26E876AAD0D}"/>
+                    <a16:creationId xmlns:a16="http://schemas.microsoft.com/office/drawing/2014/main" id="{B00EF988-81A5-4CD8-B70A-E26E876AAD0D}"/>
                   </a:ext>
                 </a:extLst>
               </p:cNvPr>
@@ -10320,7 +10320,7 @@
               <p:cNvPr id="207" name="Rectangle 206">
                 <a:extLst>
                   <a:ext uri="{FF2B5EF4-FFF2-40B4-BE49-F238E27FC236}">
-                    <a16:creationId xmlns:a16="http://schemas.microsoft.com/office/drawing/2014/main" xmlns="" id="{40DEB316-E730-4899-AC10-0C4F4E710769}"/>
+                    <a16:creationId xmlns:a16="http://schemas.microsoft.com/office/drawing/2014/main" id="{40DEB316-E730-4899-AC10-0C4F4E710769}"/>
                   </a:ext>
                 </a:extLst>
               </p:cNvPr>
@@ -10375,7 +10375,7 @@
               <p:cNvPr id="145" name="Rectangle 144">
                 <a:extLst>
                   <a:ext uri="{FF2B5EF4-FFF2-40B4-BE49-F238E27FC236}">
-                    <a16:creationId xmlns:a16="http://schemas.microsoft.com/office/drawing/2014/main" xmlns="" id="{40DEB316-E730-4899-AC10-0C4F4E710769}"/>
+                    <a16:creationId xmlns:a16="http://schemas.microsoft.com/office/drawing/2014/main" id="{40DEB316-E730-4899-AC10-0C4F4E710769}"/>
                   </a:ext>
                 </a:extLst>
               </p:cNvPr>
@@ -10447,7 +10447,7 @@
               <p:cNvPr id="146" name="Rectangle 145">
                 <a:extLst>
                   <a:ext uri="{FF2B5EF4-FFF2-40B4-BE49-F238E27FC236}">
-                    <a16:creationId xmlns:a16="http://schemas.microsoft.com/office/drawing/2014/main" xmlns="" id="{40DEB316-E730-4899-AC10-0C4F4E710769}"/>
+                    <a16:creationId xmlns:a16="http://schemas.microsoft.com/office/drawing/2014/main" id="{40DEB316-E730-4899-AC10-0C4F4E710769}"/>
                   </a:ext>
                 </a:extLst>
               </p:cNvPr>
@@ -12022,10 +12022,9 @@
           <a:lstStyle/>
           <a:p>
             <a:r>
-              <a:rPr lang="en-US" sz="700" dirty="0" smtClean="0"/>
+              <a:rPr lang="en-US" sz="700" dirty="0"/>
               <a:t>AU.PRL.031-MJ-002</a:t>
             </a:r>
-            <a:endParaRPr lang="en-US" sz="700" dirty="0"/>
           </a:p>
         </p:txBody>
       </p:sp>
@@ -12088,10 +12087,9 @@
           <a:lstStyle/>
           <a:p>
             <a:r>
-              <a:rPr lang="en-US" sz="700" dirty="0" smtClean="0"/>
+              <a:rPr lang="en-US" sz="700" dirty="0"/>
               <a:t>AU.PRL.031-MJ-001</a:t>
             </a:r>
-            <a:endParaRPr lang="en-US" sz="700" dirty="0"/>
           </a:p>
         </p:txBody>
       </p:sp>
@@ -12552,10 +12550,9 @@
           <a:lstStyle/>
           <a:p>
             <a:r>
-              <a:rPr lang="en-US" sz="700" dirty="0" smtClean="0"/>
+              <a:rPr lang="en-US" sz="700" dirty="0"/>
               <a:t>AU.PRL.032-BT-402</a:t>
             </a:r>
-            <a:endParaRPr lang="en-US" sz="700" dirty="0"/>
           </a:p>
         </p:txBody>
       </p:sp>
@@ -12620,10 +12617,9 @@
           <a:lstStyle/>
           <a:p>
             <a:r>
-              <a:rPr lang="en-US" sz="700" dirty="0" smtClean="0"/>
+              <a:rPr lang="en-US" sz="700" dirty="0"/>
               <a:t>AU.PRL.032-BT-401</a:t>
             </a:r>
-            <a:endParaRPr lang="en-US" sz="700" dirty="0"/>
           </a:p>
         </p:txBody>
       </p:sp>
@@ -12686,10 +12682,9 @@
           <a:lstStyle/>
           <a:p>
             <a:r>
-              <a:rPr lang="en-US" sz="700" dirty="0" smtClean="0"/>
+              <a:rPr lang="en-US" sz="700" dirty="0"/>
               <a:t>AU.PRL.032-PAP-004</a:t>
             </a:r>
-            <a:endParaRPr lang="en-US" sz="700" dirty="0"/>
           </a:p>
         </p:txBody>
       </p:sp>
@@ -12888,10 +12883,9 @@
           <a:lstStyle/>
           <a:p>
             <a:r>
-              <a:rPr lang="en-US" sz="700" dirty="0" smtClean="0"/>
+              <a:rPr lang="en-US" sz="700" dirty="0"/>
               <a:t>AU.PRL.032-PAP-003</a:t>
             </a:r>
-            <a:endParaRPr lang="en-US" sz="700" dirty="0"/>
           </a:p>
         </p:txBody>
       </p:sp>
@@ -13155,10 +13149,9 @@
           <a:lstStyle/>
           <a:p>
             <a:r>
-              <a:rPr lang="en-US" sz="700" dirty="0" smtClean="0"/>
+              <a:rPr lang="en-US" sz="700" dirty="0"/>
               <a:t>AU.PRL.TWS.WH.W3    900</a:t>
             </a:r>
-            <a:endParaRPr lang="en-US" sz="700" dirty="0"/>
           </a:p>
         </p:txBody>
       </p:sp>
@@ -13945,7 +13938,6 @@
               <a:rPr lang="en-US" sz="700" dirty="0"/>
               <a:t>AU.PRL.032-FL-003</a:t>
             </a:r>
-            <a:endParaRPr lang="en-US" sz="700" dirty="0"/>
           </a:p>
         </p:txBody>
       </p:sp>
@@ -14523,10 +14515,9 @@
           <a:lstStyle/>
           <a:p>
             <a:r>
-              <a:rPr lang="en-US" sz="700" dirty="0" smtClean="0"/>
+              <a:rPr lang="en-US" sz="700" dirty="0"/>
               <a:t>AU.PRL.FLNG-UW-TU-VE-ASD      798</a:t>
             </a:r>
-            <a:endParaRPr lang="en-US" sz="700" dirty="0"/>
           </a:p>
         </p:txBody>
       </p:sp>
@@ -14591,10 +14582,9 @@
           <a:lstStyle/>
           <a:p>
             <a:r>
-              <a:rPr lang="en-US" sz="700" dirty="0" smtClean="0"/>
+              <a:rPr lang="en-US" sz="700" dirty="0"/>
               <a:t>AU.PRL.FLNG-TU-VE      781</a:t>
             </a:r>
-            <a:endParaRPr lang="en-US" sz="700" dirty="0"/>
           </a:p>
         </p:txBody>
       </p:sp>
@@ -14657,10 +14647,9 @@
           <a:lstStyle/>
           <a:p>
             <a:r>
-              <a:rPr lang="en-US" sz="700" dirty="0" smtClean="0"/>
+              <a:rPr lang="en-US" sz="700" dirty="0"/>
               <a:t>AU.PRL.B1111-U06100      255</a:t>
             </a:r>
-            <a:endParaRPr lang="en-US" sz="700" dirty="0"/>
           </a:p>
         </p:txBody>
       </p:sp>
@@ -14725,10 +14714,13 @@
           <a:lstStyle/>
           <a:p>
             <a:r>
-              <a:rPr lang="en-US" sz="700" dirty="0" smtClean="0"/>
+              <a:rPr lang="en-US" sz="700" dirty="0">
+                <a:solidFill>
+                  <a:srgbClr val="FF0000"/>
+                </a:solidFill>
+              </a:rPr>
               <a:t>AU.PRL.TWS      117</a:t>
             </a:r>
-            <a:endParaRPr lang="en-US" sz="700" dirty="0"/>
           </a:p>
         </p:txBody>
       </p:sp>
@@ -14791,10 +14783,9 @@
           <a:lstStyle/>
           <a:p>
             <a:r>
-              <a:rPr lang="en-US" sz="700" dirty="0" smtClean="0"/>
+              <a:rPr lang="en-US" sz="700" dirty="0"/>
               <a:t>AU.PRL.B1111-U04000      253</a:t>
             </a:r>
-            <a:endParaRPr lang="en-US" sz="700" dirty="0"/>
           </a:p>
         </p:txBody>
       </p:sp>
@@ -14857,10 +14848,9 @@
           <a:lstStyle/>
           <a:p>
             <a:r>
-              <a:rPr lang="en-US" sz="700" dirty="0" smtClean="0"/>
+              <a:rPr lang="en-US" sz="700" dirty="0"/>
               <a:t>AU.PRL.FLNG-TU-PI      780</a:t>
             </a:r>
-            <a:endParaRPr lang="en-US" sz="700" dirty="0"/>
           </a:p>
         </p:txBody>
       </p:sp>
@@ -14923,10 +14913,9 @@
           <a:lstStyle/>
           <a:p>
             <a:r>
-              <a:rPr lang="en-US" sz="700" dirty="0" smtClean="0"/>
+              <a:rPr lang="en-US" sz="700" dirty="0"/>
               <a:t>AU.PRL.A-04010      342</a:t>
             </a:r>
-            <a:endParaRPr lang="en-US" sz="700" dirty="0"/>
           </a:p>
         </p:txBody>
       </p:sp>
@@ -14991,10 +14980,9 @@
           <a:lstStyle/>
           <a:p>
             <a:r>
-              <a:rPr lang="en-US" sz="700" dirty="0" smtClean="0"/>
+              <a:rPr lang="en-US" sz="700" dirty="0"/>
               <a:t>AU.PRL.CER-MCS-01A      598</a:t>
             </a:r>
-            <a:endParaRPr lang="en-US" sz="700" dirty="0"/>
           </a:p>
         </p:txBody>
       </p:sp>
@@ -15059,10 +15047,9 @@
           <a:lstStyle/>
           <a:p>
             <a:r>
-              <a:rPr lang="en-US" sz="700" dirty="0" smtClean="0"/>
+              <a:rPr lang="en-US" sz="700" dirty="0"/>
               <a:t>AU.PRL.FLNG-UW-TU-SS     790</a:t>
             </a:r>
-            <a:endParaRPr lang="en-US" sz="700" dirty="0"/>
           </a:p>
         </p:txBody>
       </p:sp>
@@ -15125,10 +15112,9 @@
           <a:lstStyle/>
           <a:p>
             <a:r>
-              <a:rPr lang="en-US" sz="700" dirty="0" smtClean="0"/>
+              <a:rPr lang="en-US" sz="700" dirty="0"/>
               <a:t>AU.PRL.B1111-U05100     254</a:t>
             </a:r>
-            <a:endParaRPr lang="en-US" sz="700" dirty="0"/>
           </a:p>
         </p:txBody>
       </p:sp>
@@ -15193,10 +15179,13 @@
           <a:lstStyle/>
           <a:p>
             <a:r>
-              <a:rPr lang="en-US" sz="700" dirty="0" smtClean="0"/>
+              <a:rPr lang="en-US" sz="700" dirty="0">
+                <a:solidFill>
+                  <a:srgbClr val="FF0000"/>
+                </a:solidFill>
+              </a:rPr>
               <a:t>AU.PRL.TWS     842</a:t>
             </a:r>
-            <a:endParaRPr lang="en-US" sz="700" dirty="0"/>
           </a:p>
         </p:txBody>
       </p:sp>
@@ -15244,7 +15233,7 @@
         </p:nvCxnSpPr>
         <p:spPr>
           <a:xfrm flipH="1">
-            <a:off x="6086725" y="3921826"/>
+            <a:off x="6193851" y="3887585"/>
             <a:ext cx="1884652" cy="158298"/>
           </a:xfrm>
           <a:prstGeom prst="straightConnector1">
@@ -15295,10 +15284,9 @@
           <a:lstStyle/>
           <a:p>
             <a:r>
-              <a:rPr lang="en-US" sz="700" dirty="0" smtClean="0"/>
+              <a:rPr lang="en-US" sz="700" dirty="0"/>
               <a:t>AU.PRL.SDS.SDH     848</a:t>
             </a:r>
-            <a:endParaRPr lang="en-US" sz="700" dirty="0"/>
           </a:p>
         </p:txBody>
       </p:sp>
@@ -15435,10 +15423,9 @@
           <a:lstStyle/>
           <a:p>
             <a:r>
-              <a:rPr lang="en-US" sz="700" dirty="0" smtClean="0"/>
+              <a:rPr lang="en-US" sz="700" dirty="0"/>
               <a:t>AU.PRL.B1111-U02100      250</a:t>
             </a:r>
-            <a:endParaRPr lang="en-US" sz="700" dirty="0"/>
           </a:p>
         </p:txBody>
       </p:sp>
@@ -15478,6 +15465,547 @@
           </a:fontRef>
         </p:style>
       </p:cxnSp>
+      <p:sp>
+        <p:nvSpPr>
+          <p:cNvPr id="5" name="Oval 4">
+            <a:extLst>
+              <a:ext uri="{FF2B5EF4-FFF2-40B4-BE49-F238E27FC236}">
+                <a16:creationId xmlns:a16="http://schemas.microsoft.com/office/drawing/2014/main" id="{8977D048-4658-4F95-AD93-42EBDE5D6B2B}"/>
+              </a:ext>
+            </a:extLst>
+          </p:cNvPr>
+          <p:cNvSpPr/>
+          <p:nvPr/>
+        </p:nvSpPr>
+        <p:spPr>
+          <a:xfrm>
+            <a:off x="5552973" y="3704578"/>
+            <a:ext cx="3624077" cy="1078119"/>
+          </a:xfrm>
+          <a:prstGeom prst="ellipse">
+            <a:avLst/>
+          </a:prstGeom>
+          <a:noFill/>
+          <a:ln>
+            <a:solidFill>
+              <a:schemeClr val="accent2"/>
+            </a:solidFill>
+          </a:ln>
+        </p:spPr>
+        <p:style>
+          <a:lnRef idx="2">
+            <a:schemeClr val="accent1">
+              <a:shade val="50000"/>
+            </a:schemeClr>
+          </a:lnRef>
+          <a:fillRef idx="1">
+            <a:schemeClr val="accent1"/>
+          </a:fillRef>
+          <a:effectRef idx="0">
+            <a:schemeClr val="accent1"/>
+          </a:effectRef>
+          <a:fontRef idx="minor">
+            <a:schemeClr val="lt1"/>
+          </a:fontRef>
+        </p:style>
+        <p:txBody>
+          <a:bodyPr rtlCol="0" anchor="ctr"/>
+          <a:lstStyle/>
+          <a:p>
+            <a:pPr algn="ctr"/>
+            <a:endParaRPr lang="en-US"/>
+          </a:p>
+        </p:txBody>
+      </p:sp>
+      <p:sp>
+        <p:nvSpPr>
+          <p:cNvPr id="9" name="Oval 8">
+            <a:extLst>
+              <a:ext uri="{FF2B5EF4-FFF2-40B4-BE49-F238E27FC236}">
+                <a16:creationId xmlns:a16="http://schemas.microsoft.com/office/drawing/2014/main" id="{E3781463-4A09-437B-87F8-2DB9656E3285}"/>
+              </a:ext>
+            </a:extLst>
+          </p:cNvPr>
+          <p:cNvSpPr/>
+          <p:nvPr/>
+        </p:nvSpPr>
+        <p:spPr>
+          <a:xfrm>
+            <a:off x="5450566" y="5296087"/>
+            <a:ext cx="3811859" cy="915751"/>
+          </a:xfrm>
+          <a:prstGeom prst="ellipse">
+            <a:avLst/>
+          </a:prstGeom>
+          <a:noFill/>
+          <a:ln>
+            <a:solidFill>
+              <a:schemeClr val="accent2"/>
+            </a:solidFill>
+          </a:ln>
+        </p:spPr>
+        <p:style>
+          <a:lnRef idx="2">
+            <a:schemeClr val="accent1">
+              <a:shade val="50000"/>
+            </a:schemeClr>
+          </a:lnRef>
+          <a:fillRef idx="1">
+            <a:schemeClr val="accent1"/>
+          </a:fillRef>
+          <a:effectRef idx="0">
+            <a:schemeClr val="accent1"/>
+          </a:effectRef>
+          <a:fontRef idx="minor">
+            <a:schemeClr val="lt1"/>
+          </a:fontRef>
+        </p:style>
+        <p:txBody>
+          <a:bodyPr rtlCol="0" anchor="ctr"/>
+          <a:lstStyle/>
+          <a:p>
+            <a:pPr algn="ctr"/>
+            <a:endParaRPr lang="en-US"/>
+          </a:p>
+        </p:txBody>
+      </p:sp>
+      <p:sp>
+        <p:nvSpPr>
+          <p:cNvPr id="11" name="Oval 10">
+            <a:extLst>
+              <a:ext uri="{FF2B5EF4-FFF2-40B4-BE49-F238E27FC236}">
+                <a16:creationId xmlns:a16="http://schemas.microsoft.com/office/drawing/2014/main" id="{A231FE46-3963-4895-B7A0-F13AA177CE84}"/>
+              </a:ext>
+            </a:extLst>
+          </p:cNvPr>
+          <p:cNvSpPr/>
+          <p:nvPr/>
+        </p:nvSpPr>
+        <p:spPr>
+          <a:xfrm>
+            <a:off x="5977530" y="4727111"/>
+            <a:ext cx="2553132" cy="639090"/>
+          </a:xfrm>
+          <a:prstGeom prst="ellipse">
+            <a:avLst/>
+          </a:prstGeom>
+          <a:noFill/>
+          <a:ln>
+            <a:solidFill>
+              <a:schemeClr val="accent2"/>
+            </a:solidFill>
+          </a:ln>
+        </p:spPr>
+        <p:style>
+          <a:lnRef idx="2">
+            <a:schemeClr val="accent1">
+              <a:shade val="50000"/>
+            </a:schemeClr>
+          </a:lnRef>
+          <a:fillRef idx="1">
+            <a:schemeClr val="accent1"/>
+          </a:fillRef>
+          <a:effectRef idx="0">
+            <a:schemeClr val="accent1"/>
+          </a:effectRef>
+          <a:fontRef idx="minor">
+            <a:schemeClr val="lt1"/>
+          </a:fontRef>
+        </p:style>
+        <p:txBody>
+          <a:bodyPr rtlCol="0" anchor="ctr"/>
+          <a:lstStyle/>
+          <a:p>
+            <a:pPr algn="ctr"/>
+            <a:endParaRPr lang="en-US"/>
+          </a:p>
+        </p:txBody>
+      </p:sp>
+      <p:cxnSp>
+        <p:nvCxnSpPr>
+          <p:cNvPr id="338" name="Straight Arrow Connector 337">
+            <a:extLst>
+              <a:ext uri="{FF2B5EF4-FFF2-40B4-BE49-F238E27FC236}">
+                <a16:creationId xmlns:a16="http://schemas.microsoft.com/office/drawing/2014/main" id="{D3CFBDCC-A321-48BF-A8D6-BF36902A2A74}"/>
+              </a:ext>
+            </a:extLst>
+          </p:cNvPr>
+          <p:cNvCxnSpPr>
+            <a:cxnSpLocks/>
+          </p:cNvCxnSpPr>
+          <p:nvPr/>
+        </p:nvCxnSpPr>
+        <p:spPr>
+          <a:xfrm flipH="1">
+            <a:off x="8769609" y="3677149"/>
+            <a:ext cx="350623" cy="236595"/>
+          </a:xfrm>
+          <a:prstGeom prst="straightConnector1">
+            <a:avLst/>
+          </a:prstGeom>
+          <a:ln>
+            <a:solidFill>
+              <a:srgbClr val="FF0000"/>
+            </a:solidFill>
+            <a:tailEnd type="triangle"/>
+          </a:ln>
+        </p:spPr>
+        <p:style>
+          <a:lnRef idx="1">
+            <a:schemeClr val="accent1"/>
+          </a:lnRef>
+          <a:fillRef idx="0">
+            <a:schemeClr val="accent1"/>
+          </a:fillRef>
+          <a:effectRef idx="0">
+            <a:schemeClr val="accent1"/>
+          </a:effectRef>
+          <a:fontRef idx="minor">
+            <a:schemeClr val="tx1"/>
+          </a:fontRef>
+        </p:style>
+      </p:cxnSp>
+      <p:cxnSp>
+        <p:nvCxnSpPr>
+          <p:cNvPr id="339" name="Straight Arrow Connector 338">
+            <a:extLst>
+              <a:ext uri="{FF2B5EF4-FFF2-40B4-BE49-F238E27FC236}">
+                <a16:creationId xmlns:a16="http://schemas.microsoft.com/office/drawing/2014/main" id="{E7C8F102-D578-42B8-A6EC-AC7FBEC043B7}"/>
+              </a:ext>
+            </a:extLst>
+          </p:cNvPr>
+          <p:cNvCxnSpPr>
+            <a:cxnSpLocks/>
+          </p:cNvCxnSpPr>
+          <p:nvPr/>
+        </p:nvCxnSpPr>
+        <p:spPr>
+          <a:xfrm flipH="1">
+            <a:off x="8765517" y="5194590"/>
+            <a:ext cx="350623" cy="236595"/>
+          </a:xfrm>
+          <a:prstGeom prst="straightConnector1">
+            <a:avLst/>
+          </a:prstGeom>
+          <a:ln>
+            <a:solidFill>
+              <a:srgbClr val="FF0000"/>
+            </a:solidFill>
+            <a:tailEnd type="triangle"/>
+          </a:ln>
+        </p:spPr>
+        <p:style>
+          <a:lnRef idx="1">
+            <a:schemeClr val="accent1"/>
+          </a:lnRef>
+          <a:fillRef idx="0">
+            <a:schemeClr val="accent1"/>
+          </a:fillRef>
+          <a:effectRef idx="0">
+            <a:schemeClr val="accent1"/>
+          </a:effectRef>
+          <a:fontRef idx="minor">
+            <a:schemeClr val="tx1"/>
+          </a:fontRef>
+        </p:style>
+      </p:cxnSp>
+      <p:cxnSp>
+        <p:nvCxnSpPr>
+          <p:cNvPr id="340" name="Straight Arrow Connector 339">
+            <a:extLst>
+              <a:ext uri="{FF2B5EF4-FFF2-40B4-BE49-F238E27FC236}">
+                <a16:creationId xmlns:a16="http://schemas.microsoft.com/office/drawing/2014/main" id="{7FFA1519-C412-475F-A8AA-C4285FAEDCE7}"/>
+              </a:ext>
+            </a:extLst>
+          </p:cNvPr>
+          <p:cNvCxnSpPr>
+            <a:cxnSpLocks/>
+          </p:cNvCxnSpPr>
+          <p:nvPr/>
+        </p:nvCxnSpPr>
+        <p:spPr>
+          <a:xfrm flipH="1">
+            <a:off x="8504870" y="4776295"/>
+            <a:ext cx="350623" cy="236595"/>
+          </a:xfrm>
+          <a:prstGeom prst="straightConnector1">
+            <a:avLst/>
+          </a:prstGeom>
+          <a:ln>
+            <a:solidFill>
+              <a:srgbClr val="FF0000"/>
+            </a:solidFill>
+            <a:tailEnd type="triangle"/>
+          </a:ln>
+        </p:spPr>
+        <p:style>
+          <a:lnRef idx="1">
+            <a:schemeClr val="accent1"/>
+          </a:lnRef>
+          <a:fillRef idx="0">
+            <a:schemeClr val="accent1"/>
+          </a:fillRef>
+          <a:effectRef idx="0">
+            <a:schemeClr val="accent1"/>
+          </a:effectRef>
+          <a:fontRef idx="minor">
+            <a:schemeClr val="tx1"/>
+          </a:fontRef>
+        </p:style>
+      </p:cxnSp>
+      <p:sp>
+        <p:nvSpPr>
+          <p:cNvPr id="341" name="TextBox 340">
+            <a:extLst>
+              <a:ext uri="{FF2B5EF4-FFF2-40B4-BE49-F238E27FC236}">
+                <a16:creationId xmlns:a16="http://schemas.microsoft.com/office/drawing/2014/main" id="{D12F8739-A2A0-497C-9A83-846408E644E6}"/>
+              </a:ext>
+            </a:extLst>
+          </p:cNvPr>
+          <p:cNvSpPr txBox="1"/>
+          <p:nvPr/>
+        </p:nvSpPr>
+        <p:spPr>
+          <a:xfrm>
+            <a:off x="9056453" y="5046216"/>
+            <a:ext cx="1736433" cy="200055"/>
+          </a:xfrm>
+          <a:prstGeom prst="rect">
+            <a:avLst/>
+          </a:prstGeom>
+          <a:noFill/>
+        </p:spPr>
+        <p:txBody>
+          <a:bodyPr wrap="square" rtlCol="0">
+            <a:spAutoFit/>
+          </a:bodyPr>
+          <a:lstStyle/>
+          <a:p>
+            <a:r>
+              <a:rPr lang="en-US" sz="700" dirty="0">
+                <a:solidFill>
+                  <a:srgbClr val="FF0000"/>
+                </a:solidFill>
+              </a:rPr>
+              <a:t>MULTIPLE SYMBOLS - ONE IMSA ASSET</a:t>
+            </a:r>
+          </a:p>
+        </p:txBody>
+      </p:sp>
+      <p:sp>
+        <p:nvSpPr>
+          <p:cNvPr id="342" name="TextBox 341">
+            <a:extLst>
+              <a:ext uri="{FF2B5EF4-FFF2-40B4-BE49-F238E27FC236}">
+                <a16:creationId xmlns:a16="http://schemas.microsoft.com/office/drawing/2014/main" id="{7767FC9B-ED90-4422-8364-0B196307AE54}"/>
+              </a:ext>
+            </a:extLst>
+          </p:cNvPr>
+          <p:cNvSpPr txBox="1"/>
+          <p:nvPr/>
+        </p:nvSpPr>
+        <p:spPr>
+          <a:xfrm>
+            <a:off x="9045207" y="3549932"/>
+            <a:ext cx="1736433" cy="200055"/>
+          </a:xfrm>
+          <a:prstGeom prst="rect">
+            <a:avLst/>
+          </a:prstGeom>
+          <a:noFill/>
+        </p:spPr>
+        <p:txBody>
+          <a:bodyPr wrap="square" rtlCol="0">
+            <a:spAutoFit/>
+          </a:bodyPr>
+          <a:lstStyle/>
+          <a:p>
+            <a:r>
+              <a:rPr lang="en-US" sz="700" dirty="0">
+                <a:solidFill>
+                  <a:srgbClr val="FF0000"/>
+                </a:solidFill>
+              </a:rPr>
+              <a:t>MULTIPLE SYMBOLS - ONE IMSA ASSET</a:t>
+            </a:r>
+          </a:p>
+        </p:txBody>
+      </p:sp>
+      <p:sp>
+        <p:nvSpPr>
+          <p:cNvPr id="343" name="TextBox 342">
+            <a:extLst>
+              <a:ext uri="{FF2B5EF4-FFF2-40B4-BE49-F238E27FC236}">
+                <a16:creationId xmlns:a16="http://schemas.microsoft.com/office/drawing/2014/main" id="{7CE1D262-E7BD-4BF4-A6E7-A57995FF813F}"/>
+              </a:ext>
+            </a:extLst>
+          </p:cNvPr>
+          <p:cNvSpPr txBox="1"/>
+          <p:nvPr/>
+        </p:nvSpPr>
+        <p:spPr>
+          <a:xfrm>
+            <a:off x="8868463" y="4668853"/>
+            <a:ext cx="1736433" cy="200055"/>
+          </a:xfrm>
+          <a:prstGeom prst="rect">
+            <a:avLst/>
+          </a:prstGeom>
+          <a:noFill/>
+        </p:spPr>
+        <p:txBody>
+          <a:bodyPr wrap="square" rtlCol="0">
+            <a:spAutoFit/>
+          </a:bodyPr>
+          <a:lstStyle/>
+          <a:p>
+            <a:r>
+              <a:rPr lang="en-US" sz="700" dirty="0">
+                <a:solidFill>
+                  <a:srgbClr val="FF0000"/>
+                </a:solidFill>
+              </a:rPr>
+              <a:t>MULTIPLE IMSA ASSETS - ONE SYMBOL</a:t>
+            </a:r>
+          </a:p>
+        </p:txBody>
+      </p:sp>
+      <p:sp>
+        <p:nvSpPr>
+          <p:cNvPr id="344" name="Oval 343">
+            <a:extLst>
+              <a:ext uri="{FF2B5EF4-FFF2-40B4-BE49-F238E27FC236}">
+                <a16:creationId xmlns:a16="http://schemas.microsoft.com/office/drawing/2014/main" id="{F490A32C-1968-4CF2-82CD-28D657FE7C90}"/>
+              </a:ext>
+            </a:extLst>
+          </p:cNvPr>
+          <p:cNvSpPr/>
+          <p:nvPr/>
+        </p:nvSpPr>
+        <p:spPr>
+          <a:xfrm>
+            <a:off x="6171188" y="1693979"/>
+            <a:ext cx="1086648" cy="1950041"/>
+          </a:xfrm>
+          <a:prstGeom prst="ellipse">
+            <a:avLst/>
+          </a:prstGeom>
+          <a:noFill/>
+          <a:ln>
+            <a:solidFill>
+              <a:schemeClr val="accent2"/>
+            </a:solidFill>
+          </a:ln>
+        </p:spPr>
+        <p:style>
+          <a:lnRef idx="2">
+            <a:schemeClr val="accent1">
+              <a:shade val="50000"/>
+            </a:schemeClr>
+          </a:lnRef>
+          <a:fillRef idx="1">
+            <a:schemeClr val="accent1"/>
+          </a:fillRef>
+          <a:effectRef idx="0">
+            <a:schemeClr val="accent1"/>
+          </a:effectRef>
+          <a:fontRef idx="minor">
+            <a:schemeClr val="lt1"/>
+          </a:fontRef>
+        </p:style>
+        <p:txBody>
+          <a:bodyPr rtlCol="0" anchor="ctr"/>
+          <a:lstStyle/>
+          <a:p>
+            <a:pPr algn="ctr"/>
+            <a:endParaRPr lang="en-US"/>
+          </a:p>
+        </p:txBody>
+      </p:sp>
+      <p:cxnSp>
+        <p:nvCxnSpPr>
+          <p:cNvPr id="345" name="Straight Arrow Connector 344">
+            <a:extLst>
+              <a:ext uri="{FF2B5EF4-FFF2-40B4-BE49-F238E27FC236}">
+                <a16:creationId xmlns:a16="http://schemas.microsoft.com/office/drawing/2014/main" id="{A735BD43-CE4D-4FE7-8543-4A161E57A377}"/>
+              </a:ext>
+            </a:extLst>
+          </p:cNvPr>
+          <p:cNvCxnSpPr>
+            <a:cxnSpLocks/>
+            <a:endCxn id="19" idx="1"/>
+          </p:cNvCxnSpPr>
+          <p:nvPr/>
+        </p:nvCxnSpPr>
+        <p:spPr>
+          <a:xfrm flipH="1">
+            <a:off x="7238587" y="2155854"/>
+            <a:ext cx="1384258" cy="197256"/>
+          </a:xfrm>
+          <a:prstGeom prst="straightConnector1">
+            <a:avLst/>
+          </a:prstGeom>
+          <a:ln>
+            <a:solidFill>
+              <a:srgbClr val="FF0000"/>
+            </a:solidFill>
+            <a:tailEnd type="triangle"/>
+          </a:ln>
+        </p:spPr>
+        <p:style>
+          <a:lnRef idx="1">
+            <a:schemeClr val="accent1"/>
+          </a:lnRef>
+          <a:fillRef idx="0">
+            <a:schemeClr val="accent1"/>
+          </a:fillRef>
+          <a:effectRef idx="0">
+            <a:schemeClr val="accent1"/>
+          </a:effectRef>
+          <a:fontRef idx="minor">
+            <a:schemeClr val="tx1"/>
+          </a:fontRef>
+        </p:style>
+      </p:cxnSp>
+      <p:sp>
+        <p:nvSpPr>
+          <p:cNvPr id="346" name="TextBox 345">
+            <a:extLst>
+              <a:ext uri="{FF2B5EF4-FFF2-40B4-BE49-F238E27FC236}">
+                <a16:creationId xmlns:a16="http://schemas.microsoft.com/office/drawing/2014/main" id="{51FA197E-8901-48E8-8568-8FE6533073AB}"/>
+              </a:ext>
+            </a:extLst>
+          </p:cNvPr>
+          <p:cNvSpPr txBox="1"/>
+          <p:nvPr/>
+        </p:nvSpPr>
+        <p:spPr>
+          <a:xfrm>
+            <a:off x="8579735" y="2053648"/>
+            <a:ext cx="1736433" cy="200055"/>
+          </a:xfrm>
+          <a:prstGeom prst="rect">
+            <a:avLst/>
+          </a:prstGeom>
+          <a:noFill/>
+        </p:spPr>
+        <p:txBody>
+          <a:bodyPr wrap="square" rtlCol="0">
+            <a:spAutoFit/>
+          </a:bodyPr>
+          <a:lstStyle/>
+          <a:p>
+            <a:r>
+              <a:rPr lang="en-US" sz="700" dirty="0">
+                <a:solidFill>
+                  <a:srgbClr val="FF0000"/>
+                </a:solidFill>
+              </a:rPr>
+              <a:t>MULTIPLE SYMBOLS - ONE IMSA ASSET</a:t>
+            </a:r>
+          </a:p>
+        </p:txBody>
+      </p:sp>
     </p:spTree>
     <p:extLst>
       <p:ext uri="{BB962C8B-B14F-4D97-AF65-F5344CB8AC3E}">
@@ -15527,7 +16055,7 @@
             <p:cNvPr id="138" name="Rectangle 137">
               <a:extLst>
                 <a:ext uri="{FF2B5EF4-FFF2-40B4-BE49-F238E27FC236}">
-                  <a16:creationId xmlns:a16="http://schemas.microsoft.com/office/drawing/2014/main" xmlns="" id="{B8BDB747-DB54-4603-9F15-4ACF08417009}"/>
+                  <a16:creationId xmlns:a16="http://schemas.microsoft.com/office/drawing/2014/main" id="{B8BDB747-DB54-4603-9F15-4ACF08417009}"/>
                 </a:ext>
               </a:extLst>
             </p:cNvPr>
@@ -15596,7 +16124,7 @@
               <p:cNvPr id="212" name="Rectangle 211">
                 <a:extLst>
                   <a:ext uri="{FF2B5EF4-FFF2-40B4-BE49-F238E27FC236}">
-                    <a16:creationId xmlns:a16="http://schemas.microsoft.com/office/drawing/2014/main" xmlns="" id="{65213324-AD47-4E21-A396-C767F748C6C9}"/>
+                    <a16:creationId xmlns:a16="http://schemas.microsoft.com/office/drawing/2014/main" id="{65213324-AD47-4E21-A396-C767F748C6C9}"/>
                   </a:ext>
                 </a:extLst>
               </p:cNvPr>
@@ -15656,7 +16184,7 @@
               <p:cNvPr id="124" name="Rectangle 123">
                 <a:extLst>
                   <a:ext uri="{FF2B5EF4-FFF2-40B4-BE49-F238E27FC236}">
-                    <a16:creationId xmlns:a16="http://schemas.microsoft.com/office/drawing/2014/main" xmlns="" id="{268CF0CF-8B9E-49C3-B441-CE5A5F4401CB}"/>
+                    <a16:creationId xmlns:a16="http://schemas.microsoft.com/office/drawing/2014/main" id="{268CF0CF-8B9E-49C3-B441-CE5A5F4401CB}"/>
                   </a:ext>
                 </a:extLst>
               </p:cNvPr>
@@ -15716,7 +16244,7 @@
               <p:cNvPr id="227" name="Rectangle 226">
                 <a:extLst>
                   <a:ext uri="{FF2B5EF4-FFF2-40B4-BE49-F238E27FC236}">
-                    <a16:creationId xmlns:a16="http://schemas.microsoft.com/office/drawing/2014/main" xmlns="" id="{A272D0FE-A97F-4CED-BD9D-A9F47E17C6F4}"/>
+                    <a16:creationId xmlns:a16="http://schemas.microsoft.com/office/drawing/2014/main" id="{A272D0FE-A97F-4CED-BD9D-A9F47E17C6F4}"/>
                   </a:ext>
                 </a:extLst>
               </p:cNvPr>
@@ -15777,7 +16305,7 @@
               <p:cNvPr id="210" name="Rectangle 209">
                 <a:extLst>
                   <a:ext uri="{FF2B5EF4-FFF2-40B4-BE49-F238E27FC236}">
-                    <a16:creationId xmlns:a16="http://schemas.microsoft.com/office/drawing/2014/main" xmlns="" id="{268CF0CF-8B9E-49C3-B441-CE5A5F4401CB}"/>
+                    <a16:creationId xmlns:a16="http://schemas.microsoft.com/office/drawing/2014/main" id="{268CF0CF-8B9E-49C3-B441-CE5A5F4401CB}"/>
                   </a:ext>
                 </a:extLst>
               </p:cNvPr>
@@ -15837,7 +16365,7 @@
               <p:cNvPr id="160" name="Rectangle 159">
                 <a:extLst>
                   <a:ext uri="{FF2B5EF4-FFF2-40B4-BE49-F238E27FC236}">
-                    <a16:creationId xmlns:a16="http://schemas.microsoft.com/office/drawing/2014/main" xmlns="" id="{7117050F-A2EE-4B2C-BFD0-4A6598BFE9C9}"/>
+                    <a16:creationId xmlns:a16="http://schemas.microsoft.com/office/drawing/2014/main" id="{7117050F-A2EE-4B2C-BFD0-4A6598BFE9C9}"/>
                   </a:ext>
                 </a:extLst>
               </p:cNvPr>
@@ -15894,7 +16422,7 @@
               <p:cNvPr id="161" name="Rectangle 160">
                 <a:extLst>
                   <a:ext uri="{FF2B5EF4-FFF2-40B4-BE49-F238E27FC236}">
-                    <a16:creationId xmlns:a16="http://schemas.microsoft.com/office/drawing/2014/main" xmlns="" id="{AF15E516-51FC-45AD-B02C-995018977EAD}"/>
+                    <a16:creationId xmlns:a16="http://schemas.microsoft.com/office/drawing/2014/main" id="{AF15E516-51FC-45AD-B02C-995018977EAD}"/>
                   </a:ext>
                 </a:extLst>
               </p:cNvPr>
@@ -15951,7 +16479,7 @@
               <p:cNvPr id="162" name="Rectangle 161">
                 <a:extLst>
                   <a:ext uri="{FF2B5EF4-FFF2-40B4-BE49-F238E27FC236}">
-                    <a16:creationId xmlns:a16="http://schemas.microsoft.com/office/drawing/2014/main" xmlns="" id="{F1BA82AF-F97D-42B4-AA06-2AC9D008BB78}"/>
+                    <a16:creationId xmlns:a16="http://schemas.microsoft.com/office/drawing/2014/main" id="{F1BA82AF-F97D-42B4-AA06-2AC9D008BB78}"/>
                   </a:ext>
                 </a:extLst>
               </p:cNvPr>
@@ -16008,7 +16536,7 @@
               <p:cNvPr id="189" name="Rectangle 188">
                 <a:extLst>
                   <a:ext uri="{FF2B5EF4-FFF2-40B4-BE49-F238E27FC236}">
-                    <a16:creationId xmlns:a16="http://schemas.microsoft.com/office/drawing/2014/main" xmlns="" id="{6A2636E8-0A45-4F73-831B-C9C565A3C3AC}"/>
+                    <a16:creationId xmlns:a16="http://schemas.microsoft.com/office/drawing/2014/main" id="{6A2636E8-0A45-4F73-831B-C9C565A3C3AC}"/>
                   </a:ext>
                 </a:extLst>
               </p:cNvPr>
@@ -16070,7 +16598,7 @@
               <p:cNvPr id="228" name="Rectangle 227">
                 <a:extLst>
                   <a:ext uri="{FF2B5EF4-FFF2-40B4-BE49-F238E27FC236}">
-                    <a16:creationId xmlns:a16="http://schemas.microsoft.com/office/drawing/2014/main" xmlns="" id="{7EF06410-4D22-4625-8D14-C0C56D86E832}"/>
+                    <a16:creationId xmlns:a16="http://schemas.microsoft.com/office/drawing/2014/main" id="{7EF06410-4D22-4625-8D14-C0C56D86E832}"/>
                   </a:ext>
                 </a:extLst>
               </p:cNvPr>
@@ -16127,7 +16655,7 @@
               <p:cNvPr id="229" name="Rectangle 228">
                 <a:extLst>
                   <a:ext uri="{FF2B5EF4-FFF2-40B4-BE49-F238E27FC236}">
-                    <a16:creationId xmlns:a16="http://schemas.microsoft.com/office/drawing/2014/main" xmlns="" id="{FF68E0FE-BA9B-4B69-A717-1006746AAF7F}"/>
+                    <a16:creationId xmlns:a16="http://schemas.microsoft.com/office/drawing/2014/main" id="{FF68E0FE-BA9B-4B69-A717-1006746AAF7F}"/>
                   </a:ext>
                 </a:extLst>
               </p:cNvPr>
@@ -16184,7 +16712,7 @@
               <p:cNvPr id="230" name="Rectangle 229">
                 <a:extLst>
                   <a:ext uri="{FF2B5EF4-FFF2-40B4-BE49-F238E27FC236}">
-                    <a16:creationId xmlns:a16="http://schemas.microsoft.com/office/drawing/2014/main" xmlns="" id="{3A186F86-183B-44D9-994F-09DC9E1CB888}"/>
+                    <a16:creationId xmlns:a16="http://schemas.microsoft.com/office/drawing/2014/main" id="{3A186F86-183B-44D9-994F-09DC9E1CB888}"/>
                   </a:ext>
                 </a:extLst>
               </p:cNvPr>
@@ -16241,7 +16769,7 @@
               <p:cNvPr id="231" name="Rectangle 230">
                 <a:extLst>
                   <a:ext uri="{FF2B5EF4-FFF2-40B4-BE49-F238E27FC236}">
-                    <a16:creationId xmlns:a16="http://schemas.microsoft.com/office/drawing/2014/main" xmlns="" id="{314B1CB2-9E77-4648-A554-EE2A883A4C3C}"/>
+                    <a16:creationId xmlns:a16="http://schemas.microsoft.com/office/drawing/2014/main" id="{314B1CB2-9E77-4648-A554-EE2A883A4C3C}"/>
                   </a:ext>
                 </a:extLst>
               </p:cNvPr>
@@ -16302,7 +16830,7 @@
               <p:cNvPr id="266" name="Rectangle 265">
                 <a:extLst>
                   <a:ext uri="{FF2B5EF4-FFF2-40B4-BE49-F238E27FC236}">
-                    <a16:creationId xmlns:a16="http://schemas.microsoft.com/office/drawing/2014/main" xmlns="" id="{62BDBCB1-3043-460A-8B13-2B0F557125F6}"/>
+                    <a16:creationId xmlns:a16="http://schemas.microsoft.com/office/drawing/2014/main" id="{62BDBCB1-3043-460A-8B13-2B0F557125F6}"/>
                   </a:ext>
                 </a:extLst>
               </p:cNvPr>
@@ -16363,7 +16891,7 @@
               <p:cNvPr id="267" name="Rectangle 266">
                 <a:extLst>
                   <a:ext uri="{FF2B5EF4-FFF2-40B4-BE49-F238E27FC236}">
-                    <a16:creationId xmlns:a16="http://schemas.microsoft.com/office/drawing/2014/main" xmlns="" id="{322C7DF9-5653-41CD-89D5-50AE4BEE8A5E}"/>
+                    <a16:creationId xmlns:a16="http://schemas.microsoft.com/office/drawing/2014/main" id="{322C7DF9-5653-41CD-89D5-50AE4BEE8A5E}"/>
                   </a:ext>
                 </a:extLst>
               </p:cNvPr>
@@ -16424,7 +16952,7 @@
               <p:cNvPr id="282" name="Connector: Elbow 281">
                 <a:extLst>
                   <a:ext uri="{FF2B5EF4-FFF2-40B4-BE49-F238E27FC236}">
-                    <a16:creationId xmlns:a16="http://schemas.microsoft.com/office/drawing/2014/main" xmlns="" id="{B6522D1A-2EEB-4DCB-9622-F584E4DB1EE9}"/>
+                    <a16:creationId xmlns:a16="http://schemas.microsoft.com/office/drawing/2014/main" id="{B6522D1A-2EEB-4DCB-9622-F584E4DB1EE9}"/>
                   </a:ext>
                 </a:extLst>
               </p:cNvPr>
@@ -16468,7 +16996,7 @@
               <p:cNvPr id="285" name="Rectangle 284">
                 <a:extLst>
                   <a:ext uri="{FF2B5EF4-FFF2-40B4-BE49-F238E27FC236}">
-                    <a16:creationId xmlns:a16="http://schemas.microsoft.com/office/drawing/2014/main" xmlns="" id="{6F75FE53-6A70-4F05-A4C2-349A82A49C78}"/>
+                    <a16:creationId xmlns:a16="http://schemas.microsoft.com/office/drawing/2014/main" id="{6F75FE53-6A70-4F05-A4C2-349A82A49C78}"/>
                   </a:ext>
                 </a:extLst>
               </p:cNvPr>
@@ -16525,7 +17053,7 @@
               <p:cNvPr id="291" name="Rectangle 290">
                 <a:extLst>
                   <a:ext uri="{FF2B5EF4-FFF2-40B4-BE49-F238E27FC236}">
-                    <a16:creationId xmlns:a16="http://schemas.microsoft.com/office/drawing/2014/main" xmlns="" id="{AC62CD37-69F6-4B18-B8E5-A42CDA4A2331}"/>
+                    <a16:creationId xmlns:a16="http://schemas.microsoft.com/office/drawing/2014/main" id="{AC62CD37-69F6-4B18-B8E5-A42CDA4A2331}"/>
                   </a:ext>
                 </a:extLst>
               </p:cNvPr>
@@ -16582,7 +17110,7 @@
               <p:cNvPr id="186" name="Rectangle 185">
                 <a:extLst>
                   <a:ext uri="{FF2B5EF4-FFF2-40B4-BE49-F238E27FC236}">
-                    <a16:creationId xmlns:a16="http://schemas.microsoft.com/office/drawing/2014/main" xmlns="" id="{61B0E387-B99B-477C-A708-6AC78B8EE1BE}"/>
+                    <a16:creationId xmlns:a16="http://schemas.microsoft.com/office/drawing/2014/main" id="{61B0E387-B99B-477C-A708-6AC78B8EE1BE}"/>
                   </a:ext>
                 </a:extLst>
               </p:cNvPr>
@@ -16639,7 +17167,7 @@
               <p:cNvPr id="187" name="Rectangle 186">
                 <a:extLst>
                   <a:ext uri="{FF2B5EF4-FFF2-40B4-BE49-F238E27FC236}">
-                    <a16:creationId xmlns:a16="http://schemas.microsoft.com/office/drawing/2014/main" xmlns="" id="{8A235B86-3E51-415B-9AB6-DB739C11D906}"/>
+                    <a16:creationId xmlns:a16="http://schemas.microsoft.com/office/drawing/2014/main" id="{8A235B86-3E51-415B-9AB6-DB739C11D906}"/>
                   </a:ext>
                 </a:extLst>
               </p:cNvPr>
@@ -16694,7 +17222,7 @@
               <p:cNvPr id="190" name="Rectangle 189">
                 <a:extLst>
                   <a:ext uri="{FF2B5EF4-FFF2-40B4-BE49-F238E27FC236}">
-                    <a16:creationId xmlns:a16="http://schemas.microsoft.com/office/drawing/2014/main" xmlns="" id="{E66C3D41-8283-452A-A537-6E9C275190CE}"/>
+                    <a16:creationId xmlns:a16="http://schemas.microsoft.com/office/drawing/2014/main" id="{E66C3D41-8283-452A-A537-6E9C275190CE}"/>
                   </a:ext>
                 </a:extLst>
               </p:cNvPr>
@@ -16749,7 +17277,7 @@
               <p:cNvPr id="192" name="Connector: Elbow 191">
                 <a:extLst>
                   <a:ext uri="{FF2B5EF4-FFF2-40B4-BE49-F238E27FC236}">
-                    <a16:creationId xmlns:a16="http://schemas.microsoft.com/office/drawing/2014/main" xmlns="" id="{CDE61E10-C12B-4522-B678-783926EDDC54}"/>
+                    <a16:creationId xmlns:a16="http://schemas.microsoft.com/office/drawing/2014/main" id="{CDE61E10-C12B-4522-B678-783926EDDC54}"/>
                   </a:ext>
                 </a:extLst>
               </p:cNvPr>
@@ -16793,7 +17321,7 @@
               <p:cNvPr id="195" name="Connector: Elbow 194">
                 <a:extLst>
                   <a:ext uri="{FF2B5EF4-FFF2-40B4-BE49-F238E27FC236}">
-                    <a16:creationId xmlns:a16="http://schemas.microsoft.com/office/drawing/2014/main" xmlns="" id="{3F8C8746-E275-430E-B078-BE38FECA7B5E}"/>
+                    <a16:creationId xmlns:a16="http://schemas.microsoft.com/office/drawing/2014/main" id="{3F8C8746-E275-430E-B078-BE38FECA7B5E}"/>
                   </a:ext>
                 </a:extLst>
               </p:cNvPr>
@@ -16839,7 +17367,7 @@
               <p:cNvPr id="199" name="Straight Connector 198">
                 <a:extLst>
                   <a:ext uri="{FF2B5EF4-FFF2-40B4-BE49-F238E27FC236}">
-                    <a16:creationId xmlns:a16="http://schemas.microsoft.com/office/drawing/2014/main" xmlns="" id="{9B37C0F6-C9C0-4453-BFEA-BC02505125CC}"/>
+                    <a16:creationId xmlns:a16="http://schemas.microsoft.com/office/drawing/2014/main" id="{9B37C0F6-C9C0-4453-BFEA-BC02505125CC}"/>
                   </a:ext>
                 </a:extLst>
               </p:cNvPr>
@@ -16882,7 +17410,7 @@
               <p:cNvPr id="201" name="Connector: Elbow 200">
                 <a:extLst>
                   <a:ext uri="{FF2B5EF4-FFF2-40B4-BE49-F238E27FC236}">
-                    <a16:creationId xmlns:a16="http://schemas.microsoft.com/office/drawing/2014/main" xmlns="" id="{A68371D3-9FCD-4C2A-9457-6069CACC2C30}"/>
+                    <a16:creationId xmlns:a16="http://schemas.microsoft.com/office/drawing/2014/main" id="{A68371D3-9FCD-4C2A-9457-6069CACC2C30}"/>
                   </a:ext>
                 </a:extLst>
               </p:cNvPr>
@@ -16926,7 +17454,7 @@
               <p:cNvPr id="188" name="Rectangle 187">
                 <a:extLst>
                   <a:ext uri="{FF2B5EF4-FFF2-40B4-BE49-F238E27FC236}">
-                    <a16:creationId xmlns:a16="http://schemas.microsoft.com/office/drawing/2014/main" xmlns="" id="{4BB99705-0FDA-4E9A-88D9-F375AF3C0AA9}"/>
+                    <a16:creationId xmlns:a16="http://schemas.microsoft.com/office/drawing/2014/main" id="{4BB99705-0FDA-4E9A-88D9-F375AF3C0AA9}"/>
                   </a:ext>
                 </a:extLst>
               </p:cNvPr>
@@ -16981,7 +17509,7 @@
               <p:cNvPr id="280" name="Rectangle 279">
                 <a:extLst>
                   <a:ext uri="{FF2B5EF4-FFF2-40B4-BE49-F238E27FC236}">
-                    <a16:creationId xmlns:a16="http://schemas.microsoft.com/office/drawing/2014/main" xmlns="" id="{138625F3-6989-4232-BADB-CE1AFD512F9A}"/>
+                    <a16:creationId xmlns:a16="http://schemas.microsoft.com/office/drawing/2014/main" id="{138625F3-6989-4232-BADB-CE1AFD512F9A}"/>
                   </a:ext>
                 </a:extLst>
               </p:cNvPr>
@@ -17036,7 +17564,7 @@
               <p:cNvPr id="110" name="Rectangle 109">
                 <a:extLst>
                   <a:ext uri="{FF2B5EF4-FFF2-40B4-BE49-F238E27FC236}">
-                    <a16:creationId xmlns:a16="http://schemas.microsoft.com/office/drawing/2014/main" xmlns="" id="{3D5A848A-7DDF-4E98-9203-74E4A3CB11B0}"/>
+                    <a16:creationId xmlns:a16="http://schemas.microsoft.com/office/drawing/2014/main" id="{3D5A848A-7DDF-4E98-9203-74E4A3CB11B0}"/>
                   </a:ext>
                 </a:extLst>
               </p:cNvPr>
@@ -17090,7 +17618,7 @@
               <p:cNvPr id="111" name="Rectangle 110">
                 <a:extLst>
                   <a:ext uri="{FF2B5EF4-FFF2-40B4-BE49-F238E27FC236}">
-                    <a16:creationId xmlns:a16="http://schemas.microsoft.com/office/drawing/2014/main" xmlns="" id="{D948357E-8B89-455A-B45A-725687B417D6}"/>
+                    <a16:creationId xmlns:a16="http://schemas.microsoft.com/office/drawing/2014/main" id="{D948357E-8B89-455A-B45A-725687B417D6}"/>
                   </a:ext>
                 </a:extLst>
               </p:cNvPr>
@@ -17144,7 +17672,7 @@
               <p:cNvPr id="112" name="Rectangle 111">
                 <a:extLst>
                   <a:ext uri="{FF2B5EF4-FFF2-40B4-BE49-F238E27FC236}">
-                    <a16:creationId xmlns:a16="http://schemas.microsoft.com/office/drawing/2014/main" xmlns="" id="{EFFA351A-B3E8-46C1-BFA6-792058AFB5AB}"/>
+                    <a16:creationId xmlns:a16="http://schemas.microsoft.com/office/drawing/2014/main" id="{EFFA351A-B3E8-46C1-BFA6-792058AFB5AB}"/>
                   </a:ext>
                 </a:extLst>
               </p:cNvPr>
@@ -17198,7 +17726,7 @@
               <p:cNvPr id="113" name="Rectangle 112">
                 <a:extLst>
                   <a:ext uri="{FF2B5EF4-FFF2-40B4-BE49-F238E27FC236}">
-                    <a16:creationId xmlns:a16="http://schemas.microsoft.com/office/drawing/2014/main" xmlns="" id="{E5D438F9-8A31-41D7-ACF3-964D853B2582}"/>
+                    <a16:creationId xmlns:a16="http://schemas.microsoft.com/office/drawing/2014/main" id="{E5D438F9-8A31-41D7-ACF3-964D853B2582}"/>
                   </a:ext>
                 </a:extLst>
               </p:cNvPr>
@@ -17252,7 +17780,7 @@
               <p:cNvPr id="114" name="Rectangle 113">
                 <a:extLst>
                   <a:ext uri="{FF2B5EF4-FFF2-40B4-BE49-F238E27FC236}">
-                    <a16:creationId xmlns:a16="http://schemas.microsoft.com/office/drawing/2014/main" xmlns="" id="{DF4EB9AD-8811-4CAA-B86C-FF0B4841A1BD}"/>
+                    <a16:creationId xmlns:a16="http://schemas.microsoft.com/office/drawing/2014/main" id="{DF4EB9AD-8811-4CAA-B86C-FF0B4841A1BD}"/>
                   </a:ext>
                 </a:extLst>
               </p:cNvPr>
@@ -17312,7 +17840,7 @@
               <p:cNvPr id="115" name="Rectangle 114">
                 <a:extLst>
                   <a:ext uri="{FF2B5EF4-FFF2-40B4-BE49-F238E27FC236}">
-                    <a16:creationId xmlns:a16="http://schemas.microsoft.com/office/drawing/2014/main" xmlns="" id="{E287870C-0686-412B-B7B7-E3EE89EF5F47}"/>
+                    <a16:creationId xmlns:a16="http://schemas.microsoft.com/office/drawing/2014/main" id="{E287870C-0686-412B-B7B7-E3EE89EF5F47}"/>
                   </a:ext>
                 </a:extLst>
               </p:cNvPr>
@@ -17366,7 +17894,7 @@
               <p:cNvPr id="116" name="Rectangle 115">
                 <a:extLst>
                   <a:ext uri="{FF2B5EF4-FFF2-40B4-BE49-F238E27FC236}">
-                    <a16:creationId xmlns:a16="http://schemas.microsoft.com/office/drawing/2014/main" xmlns="" id="{C577E244-F504-4E36-A4DE-0B1C1D9EE03C}"/>
+                    <a16:creationId xmlns:a16="http://schemas.microsoft.com/office/drawing/2014/main" id="{C577E244-F504-4E36-A4DE-0B1C1D9EE03C}"/>
                   </a:ext>
                 </a:extLst>
               </p:cNvPr>
@@ -17420,7 +17948,7 @@
               <p:cNvPr id="117" name="Rectangle 116">
                 <a:extLst>
                   <a:ext uri="{FF2B5EF4-FFF2-40B4-BE49-F238E27FC236}">
-                    <a16:creationId xmlns:a16="http://schemas.microsoft.com/office/drawing/2014/main" xmlns="" id="{6052DDAA-AFD2-4AF6-85C2-676892C26C77}"/>
+                    <a16:creationId xmlns:a16="http://schemas.microsoft.com/office/drawing/2014/main" id="{6052DDAA-AFD2-4AF6-85C2-676892C26C77}"/>
                   </a:ext>
                 </a:extLst>
               </p:cNvPr>
@@ -17474,7 +18002,7 @@
               <p:cNvPr id="118" name="Rectangle 117">
                 <a:extLst>
                   <a:ext uri="{FF2B5EF4-FFF2-40B4-BE49-F238E27FC236}">
-                    <a16:creationId xmlns:a16="http://schemas.microsoft.com/office/drawing/2014/main" xmlns="" id="{25CE3F0A-7FB4-4A9D-800A-186AF28921F2}"/>
+                    <a16:creationId xmlns:a16="http://schemas.microsoft.com/office/drawing/2014/main" id="{25CE3F0A-7FB4-4A9D-800A-186AF28921F2}"/>
                   </a:ext>
                 </a:extLst>
               </p:cNvPr>
@@ -17528,7 +18056,7 @@
               <p:cNvPr id="120" name="Rectangle 119">
                 <a:extLst>
                   <a:ext uri="{FF2B5EF4-FFF2-40B4-BE49-F238E27FC236}">
-                    <a16:creationId xmlns:a16="http://schemas.microsoft.com/office/drawing/2014/main" xmlns="" id="{9263DE6F-E2B3-40BC-8D30-EC1EE4C09E4F}"/>
+                    <a16:creationId xmlns:a16="http://schemas.microsoft.com/office/drawing/2014/main" id="{9263DE6F-E2B3-40BC-8D30-EC1EE4C09E4F}"/>
                   </a:ext>
                 </a:extLst>
               </p:cNvPr>
@@ -17585,7 +18113,7 @@
               <p:cNvPr id="123" name="Rectangle 122">
                 <a:extLst>
                   <a:ext uri="{FF2B5EF4-FFF2-40B4-BE49-F238E27FC236}">
-                    <a16:creationId xmlns:a16="http://schemas.microsoft.com/office/drawing/2014/main" xmlns="" id="{7389C7FE-8BE8-4C4A-BB9C-B5142D7F3BD1}"/>
+                    <a16:creationId xmlns:a16="http://schemas.microsoft.com/office/drawing/2014/main" id="{7389C7FE-8BE8-4C4A-BB9C-B5142D7F3BD1}"/>
                   </a:ext>
                 </a:extLst>
               </p:cNvPr>
@@ -17736,7 +18264,7 @@
               <p:cNvPr id="119" name="Rectangle 118">
                 <a:extLst>
                   <a:ext uri="{FF2B5EF4-FFF2-40B4-BE49-F238E27FC236}">
-                    <a16:creationId xmlns:a16="http://schemas.microsoft.com/office/drawing/2014/main" xmlns="" id="{94D814AF-83A7-4E32-9A6C-4546FB2CCA24}"/>
+                    <a16:creationId xmlns:a16="http://schemas.microsoft.com/office/drawing/2014/main" id="{94D814AF-83A7-4E32-9A6C-4546FB2CCA24}"/>
                   </a:ext>
                 </a:extLst>
               </p:cNvPr>
@@ -17793,7 +18321,7 @@
               <p:cNvPr id="121" name="Rectangle 120">
                 <a:extLst>
                   <a:ext uri="{FF2B5EF4-FFF2-40B4-BE49-F238E27FC236}">
-                    <a16:creationId xmlns:a16="http://schemas.microsoft.com/office/drawing/2014/main" xmlns="" id="{94D814AF-83A7-4E32-9A6C-4546FB2CCA24}"/>
+                    <a16:creationId xmlns:a16="http://schemas.microsoft.com/office/drawing/2014/main" id="{94D814AF-83A7-4E32-9A6C-4546FB2CCA24}"/>
                   </a:ext>
                 </a:extLst>
               </p:cNvPr>
@@ -17850,7 +18378,7 @@
               <p:cNvPr id="125" name="Rectangle 124">
                 <a:extLst>
                   <a:ext uri="{FF2B5EF4-FFF2-40B4-BE49-F238E27FC236}">
-                    <a16:creationId xmlns:a16="http://schemas.microsoft.com/office/drawing/2014/main" xmlns="" id="{94D814AF-83A7-4E32-9A6C-4546FB2CCA24}"/>
+                    <a16:creationId xmlns:a16="http://schemas.microsoft.com/office/drawing/2014/main" id="{94D814AF-83A7-4E32-9A6C-4546FB2CCA24}"/>
                   </a:ext>
                 </a:extLst>
               </p:cNvPr>
@@ -17907,7 +18435,7 @@
               <p:cNvPr id="97" name="Straight Connector 96">
                 <a:extLst>
                   <a:ext uri="{FF2B5EF4-FFF2-40B4-BE49-F238E27FC236}">
-                    <a16:creationId xmlns:a16="http://schemas.microsoft.com/office/drawing/2014/main" xmlns="" id="{D2D4152D-E445-44F7-9FFA-F801801657A4}"/>
+                    <a16:creationId xmlns:a16="http://schemas.microsoft.com/office/drawing/2014/main" id="{D2D4152D-E445-44F7-9FFA-F801801657A4}"/>
                   </a:ext>
                 </a:extLst>
               </p:cNvPr>
@@ -17950,7 +18478,7 @@
               <p:cNvPr id="43" name="Straight Connector 42">
                 <a:extLst>
                   <a:ext uri="{FF2B5EF4-FFF2-40B4-BE49-F238E27FC236}">
-                    <a16:creationId xmlns:a16="http://schemas.microsoft.com/office/drawing/2014/main" xmlns="" id="{7D418F97-72C5-4E5C-9F3A-DAA96B9694F5}"/>
+                    <a16:creationId xmlns:a16="http://schemas.microsoft.com/office/drawing/2014/main" id="{7D418F97-72C5-4E5C-9F3A-DAA96B9694F5}"/>
                   </a:ext>
                 </a:extLst>
               </p:cNvPr>
@@ -17993,7 +18521,7 @@
               <p:cNvPr id="46" name="Straight Connector 45">
                 <a:extLst>
                   <a:ext uri="{FF2B5EF4-FFF2-40B4-BE49-F238E27FC236}">
-                    <a16:creationId xmlns:a16="http://schemas.microsoft.com/office/drawing/2014/main" xmlns="" id="{668E4FBB-E5C7-4983-89D2-5C2DE622E0F2}"/>
+                    <a16:creationId xmlns:a16="http://schemas.microsoft.com/office/drawing/2014/main" id="{668E4FBB-E5C7-4983-89D2-5C2DE622E0F2}"/>
                   </a:ext>
                 </a:extLst>
               </p:cNvPr>
@@ -18036,7 +18564,7 @@
               <p:cNvPr id="50" name="Connector: Elbow 49">
                 <a:extLst>
                   <a:ext uri="{FF2B5EF4-FFF2-40B4-BE49-F238E27FC236}">
-                    <a16:creationId xmlns:a16="http://schemas.microsoft.com/office/drawing/2014/main" xmlns="" id="{7A7EBD10-FEA5-4F71-A6BB-253CBE1C2B5A}"/>
+                    <a16:creationId xmlns:a16="http://schemas.microsoft.com/office/drawing/2014/main" id="{7A7EBD10-FEA5-4F71-A6BB-253CBE1C2B5A}"/>
                   </a:ext>
                 </a:extLst>
               </p:cNvPr>
@@ -18081,7 +18609,7 @@
               <p:cNvPr id="56" name="Connector: Elbow 55">
                 <a:extLst>
                   <a:ext uri="{FF2B5EF4-FFF2-40B4-BE49-F238E27FC236}">
-                    <a16:creationId xmlns:a16="http://schemas.microsoft.com/office/drawing/2014/main" xmlns="" id="{3CB1AB71-E1BD-4F35-9BEF-ED11F9DBFB4E}"/>
+                    <a16:creationId xmlns:a16="http://schemas.microsoft.com/office/drawing/2014/main" id="{3CB1AB71-E1BD-4F35-9BEF-ED11F9DBFB4E}"/>
                   </a:ext>
                 </a:extLst>
               </p:cNvPr>
@@ -18127,7 +18655,7 @@
               <p:cNvPr id="59" name="Connector: Elbow 58">
                 <a:extLst>
                   <a:ext uri="{FF2B5EF4-FFF2-40B4-BE49-F238E27FC236}">
-                    <a16:creationId xmlns:a16="http://schemas.microsoft.com/office/drawing/2014/main" xmlns="" id="{0DF047BA-FC58-46B2-A8F5-3E6873F05133}"/>
+                    <a16:creationId xmlns:a16="http://schemas.microsoft.com/office/drawing/2014/main" id="{0DF047BA-FC58-46B2-A8F5-3E6873F05133}"/>
                   </a:ext>
                 </a:extLst>
               </p:cNvPr>
@@ -18173,7 +18701,7 @@
               <p:cNvPr id="61" name="Connector: Elbow 60">
                 <a:extLst>
                   <a:ext uri="{FF2B5EF4-FFF2-40B4-BE49-F238E27FC236}">
-                    <a16:creationId xmlns:a16="http://schemas.microsoft.com/office/drawing/2014/main" xmlns="" id="{CBC03679-7CD0-4722-A894-AB4719E5EB7D}"/>
+                    <a16:creationId xmlns:a16="http://schemas.microsoft.com/office/drawing/2014/main" id="{CBC03679-7CD0-4722-A894-AB4719E5EB7D}"/>
                   </a:ext>
                 </a:extLst>
               </p:cNvPr>
@@ -18219,7 +18747,7 @@
               <p:cNvPr id="73" name="Connector: Elbow 72">
                 <a:extLst>
                   <a:ext uri="{FF2B5EF4-FFF2-40B4-BE49-F238E27FC236}">
-                    <a16:creationId xmlns:a16="http://schemas.microsoft.com/office/drawing/2014/main" xmlns="" id="{65F5347D-FE86-462C-831E-722C68DADE04}"/>
+                    <a16:creationId xmlns:a16="http://schemas.microsoft.com/office/drawing/2014/main" id="{65F5347D-FE86-462C-831E-722C68DADE04}"/>
                   </a:ext>
                 </a:extLst>
               </p:cNvPr>
@@ -18264,7 +18792,7 @@
               <p:cNvPr id="74" name="Connector: Elbow 73">
                 <a:extLst>
                   <a:ext uri="{FF2B5EF4-FFF2-40B4-BE49-F238E27FC236}">
-                    <a16:creationId xmlns:a16="http://schemas.microsoft.com/office/drawing/2014/main" xmlns="" id="{B515E8BC-EF7F-4D9F-AC8F-0A5D256A5A43}"/>
+                    <a16:creationId xmlns:a16="http://schemas.microsoft.com/office/drawing/2014/main" id="{B515E8BC-EF7F-4D9F-AC8F-0A5D256A5A43}"/>
                   </a:ext>
                 </a:extLst>
               </p:cNvPr>
@@ -18309,7 +18837,7 @@
               <p:cNvPr id="78" name="Connector: Elbow 77">
                 <a:extLst>
                   <a:ext uri="{FF2B5EF4-FFF2-40B4-BE49-F238E27FC236}">
-                    <a16:creationId xmlns:a16="http://schemas.microsoft.com/office/drawing/2014/main" xmlns="" id="{0391FBF3-53A7-473D-8C54-D11AED47BA9A}"/>
+                    <a16:creationId xmlns:a16="http://schemas.microsoft.com/office/drawing/2014/main" id="{0391FBF3-53A7-473D-8C54-D11AED47BA9A}"/>
                   </a:ext>
                 </a:extLst>
               </p:cNvPr>
@@ -18354,7 +18882,7 @@
               <p:cNvPr id="79" name="Connector: Elbow 78">
                 <a:extLst>
                   <a:ext uri="{FF2B5EF4-FFF2-40B4-BE49-F238E27FC236}">
-                    <a16:creationId xmlns:a16="http://schemas.microsoft.com/office/drawing/2014/main" xmlns="" id="{53B7D16A-0951-4B73-9A87-4476A58781A7}"/>
+                    <a16:creationId xmlns:a16="http://schemas.microsoft.com/office/drawing/2014/main" id="{53B7D16A-0951-4B73-9A87-4476A58781A7}"/>
                   </a:ext>
                 </a:extLst>
               </p:cNvPr>
@@ -18399,7 +18927,7 @@
               <p:cNvPr id="170" name="Rectangle 169">
                 <a:extLst>
                   <a:ext uri="{FF2B5EF4-FFF2-40B4-BE49-F238E27FC236}">
-                    <a16:creationId xmlns:a16="http://schemas.microsoft.com/office/drawing/2014/main" xmlns="" id="{0A39FE7D-5E35-4CC8-929D-8426AC15A250}"/>
+                    <a16:creationId xmlns:a16="http://schemas.microsoft.com/office/drawing/2014/main" id="{0A39FE7D-5E35-4CC8-929D-8426AC15A250}"/>
                   </a:ext>
                 </a:extLst>
               </p:cNvPr>
@@ -18456,7 +18984,7 @@
               <p:cNvPr id="172" name="Straight Connector 171">
                 <a:extLst>
                   <a:ext uri="{FF2B5EF4-FFF2-40B4-BE49-F238E27FC236}">
-                    <a16:creationId xmlns:a16="http://schemas.microsoft.com/office/drawing/2014/main" xmlns="" id="{7DE850BD-3980-4137-B8F8-9CFB96C7BAD9}"/>
+                    <a16:creationId xmlns:a16="http://schemas.microsoft.com/office/drawing/2014/main" id="{7DE850BD-3980-4137-B8F8-9CFB96C7BAD9}"/>
                   </a:ext>
                 </a:extLst>
               </p:cNvPr>
@@ -18499,7 +19027,7 @@
               <p:cNvPr id="173" name="Straight Connector 172">
                 <a:extLst>
                   <a:ext uri="{FF2B5EF4-FFF2-40B4-BE49-F238E27FC236}">
-                    <a16:creationId xmlns:a16="http://schemas.microsoft.com/office/drawing/2014/main" xmlns="" id="{0BE95A8A-9FD8-4C43-BE89-1E610B81B3F9}"/>
+                    <a16:creationId xmlns:a16="http://schemas.microsoft.com/office/drawing/2014/main" id="{0BE95A8A-9FD8-4C43-BE89-1E610B81B3F9}"/>
                   </a:ext>
                 </a:extLst>
               </p:cNvPr>
@@ -18542,7 +19070,7 @@
               <p:cNvPr id="174" name="Straight Connector 173">
                 <a:extLst>
                   <a:ext uri="{FF2B5EF4-FFF2-40B4-BE49-F238E27FC236}">
-                    <a16:creationId xmlns:a16="http://schemas.microsoft.com/office/drawing/2014/main" xmlns="" id="{312488A4-4BF7-49B6-8A79-7F8D19369A66}"/>
+                    <a16:creationId xmlns:a16="http://schemas.microsoft.com/office/drawing/2014/main" id="{312488A4-4BF7-49B6-8A79-7F8D19369A66}"/>
                   </a:ext>
                 </a:extLst>
               </p:cNvPr>
@@ -18585,7 +19113,7 @@
               <p:cNvPr id="180" name="Straight Connector 179">
                 <a:extLst>
                   <a:ext uri="{FF2B5EF4-FFF2-40B4-BE49-F238E27FC236}">
-                    <a16:creationId xmlns:a16="http://schemas.microsoft.com/office/drawing/2014/main" xmlns="" id="{0C1C05D8-F57F-456E-8AAB-FB8D33CAF81E}"/>
+                    <a16:creationId xmlns:a16="http://schemas.microsoft.com/office/drawing/2014/main" id="{0C1C05D8-F57F-456E-8AAB-FB8D33CAF81E}"/>
                   </a:ext>
                 </a:extLst>
               </p:cNvPr>
@@ -18628,7 +19156,7 @@
               <p:cNvPr id="232" name="Rectangle 231">
                 <a:extLst>
                   <a:ext uri="{FF2B5EF4-FFF2-40B4-BE49-F238E27FC236}">
-                    <a16:creationId xmlns:a16="http://schemas.microsoft.com/office/drawing/2014/main" xmlns="" id="{F2C03604-FDD1-405E-AC66-1998640B1176}"/>
+                    <a16:creationId xmlns:a16="http://schemas.microsoft.com/office/drawing/2014/main" id="{F2C03604-FDD1-405E-AC66-1998640B1176}"/>
                   </a:ext>
                 </a:extLst>
               </p:cNvPr>
@@ -18689,7 +19217,7 @@
               <p:cNvPr id="237" name="Rectangle 236">
                 <a:extLst>
                   <a:ext uri="{FF2B5EF4-FFF2-40B4-BE49-F238E27FC236}">
-                    <a16:creationId xmlns:a16="http://schemas.microsoft.com/office/drawing/2014/main" xmlns="" id="{A9222955-4E35-4DF4-BDD0-30AB7970E2AF}"/>
+                    <a16:creationId xmlns:a16="http://schemas.microsoft.com/office/drawing/2014/main" id="{A9222955-4E35-4DF4-BDD0-30AB7970E2AF}"/>
                   </a:ext>
                 </a:extLst>
               </p:cNvPr>
@@ -18750,7 +19278,7 @@
               <p:cNvPr id="249" name="Rectangle 248">
                 <a:extLst>
                   <a:ext uri="{FF2B5EF4-FFF2-40B4-BE49-F238E27FC236}">
-                    <a16:creationId xmlns:a16="http://schemas.microsoft.com/office/drawing/2014/main" xmlns="" id="{05B33235-0756-4563-9CE7-E600D9743873}"/>
+                    <a16:creationId xmlns:a16="http://schemas.microsoft.com/office/drawing/2014/main" id="{05B33235-0756-4563-9CE7-E600D9743873}"/>
                   </a:ext>
                 </a:extLst>
               </p:cNvPr>
@@ -18811,7 +19339,7 @@
               <p:cNvPr id="250" name="Rectangle 249">
                 <a:extLst>
                   <a:ext uri="{FF2B5EF4-FFF2-40B4-BE49-F238E27FC236}">
-                    <a16:creationId xmlns:a16="http://schemas.microsoft.com/office/drawing/2014/main" xmlns="" id="{5C24CC4D-6A79-48B3-92A0-DD39A40C359D}"/>
+                    <a16:creationId xmlns:a16="http://schemas.microsoft.com/office/drawing/2014/main" id="{5C24CC4D-6A79-48B3-92A0-DD39A40C359D}"/>
                   </a:ext>
                 </a:extLst>
               </p:cNvPr>
@@ -18872,7 +19400,7 @@
               <p:cNvPr id="10" name="Rectangle 9">
                 <a:extLst>
                   <a:ext uri="{FF2B5EF4-FFF2-40B4-BE49-F238E27FC236}">
-                    <a16:creationId xmlns:a16="http://schemas.microsoft.com/office/drawing/2014/main" xmlns="" id="{08A137F5-FA4C-4F3B-B37B-4E10ACFF5472}"/>
+                    <a16:creationId xmlns:a16="http://schemas.microsoft.com/office/drawing/2014/main" id="{08A137F5-FA4C-4F3B-B37B-4E10ACFF5472}"/>
                   </a:ext>
                 </a:extLst>
               </p:cNvPr>
@@ -18933,7 +19461,7 @@
               <p:cNvPr id="98" name="Straight Connector 97">
                 <a:extLst>
                   <a:ext uri="{FF2B5EF4-FFF2-40B4-BE49-F238E27FC236}">
-                    <a16:creationId xmlns:a16="http://schemas.microsoft.com/office/drawing/2014/main" xmlns="" id="{4FAECFAD-E86D-4DE0-83E0-0AA95639170F}"/>
+                    <a16:creationId xmlns:a16="http://schemas.microsoft.com/office/drawing/2014/main" id="{4FAECFAD-E86D-4DE0-83E0-0AA95639170F}"/>
                   </a:ext>
                 </a:extLst>
               </p:cNvPr>
@@ -18976,7 +19504,7 @@
               <p:cNvPr id="99" name="Straight Connector 98">
                 <a:extLst>
                   <a:ext uri="{FF2B5EF4-FFF2-40B4-BE49-F238E27FC236}">
-                    <a16:creationId xmlns:a16="http://schemas.microsoft.com/office/drawing/2014/main" xmlns="" id="{37A049CD-523F-4E0E-BDCB-0D8F4060D88E}"/>
+                    <a16:creationId xmlns:a16="http://schemas.microsoft.com/office/drawing/2014/main" id="{37A049CD-523F-4E0E-BDCB-0D8F4060D88E}"/>
                   </a:ext>
                 </a:extLst>
               </p:cNvPr>
@@ -19019,7 +19547,7 @@
               <p:cNvPr id="14" name="Rectangle 13">
                 <a:extLst>
                   <a:ext uri="{FF2B5EF4-FFF2-40B4-BE49-F238E27FC236}">
-                    <a16:creationId xmlns:a16="http://schemas.microsoft.com/office/drawing/2014/main" xmlns="" id="{F4301EF9-A463-483B-8038-91C7DAD42396}"/>
+                    <a16:creationId xmlns:a16="http://schemas.microsoft.com/office/drawing/2014/main" id="{F4301EF9-A463-483B-8038-91C7DAD42396}"/>
                   </a:ext>
                 </a:extLst>
               </p:cNvPr>
@@ -19076,7 +19604,7 @@
               <p:cNvPr id="177" name="Rectangle 176">
                 <a:extLst>
                   <a:ext uri="{FF2B5EF4-FFF2-40B4-BE49-F238E27FC236}">
-                    <a16:creationId xmlns:a16="http://schemas.microsoft.com/office/drawing/2014/main" xmlns="" id="{2CA50F9A-8554-4EA1-A738-AEDB386057CF}"/>
+                    <a16:creationId xmlns:a16="http://schemas.microsoft.com/office/drawing/2014/main" id="{2CA50F9A-8554-4EA1-A738-AEDB386057CF}"/>
                   </a:ext>
                 </a:extLst>
               </p:cNvPr>
@@ -19137,7 +19665,7 @@
               <p:cNvPr id="179" name="Rectangle 178">
                 <a:extLst>
                   <a:ext uri="{FF2B5EF4-FFF2-40B4-BE49-F238E27FC236}">
-                    <a16:creationId xmlns:a16="http://schemas.microsoft.com/office/drawing/2014/main" xmlns="" id="{9252164B-3074-435F-B8FF-79820E24846F}"/>
+                    <a16:creationId xmlns:a16="http://schemas.microsoft.com/office/drawing/2014/main" id="{9252164B-3074-435F-B8FF-79820E24846F}"/>
                   </a:ext>
                 </a:extLst>
               </p:cNvPr>
@@ -19198,7 +19726,7 @@
               <p:cNvPr id="175" name="Rectangle 174">
                 <a:extLst>
                   <a:ext uri="{FF2B5EF4-FFF2-40B4-BE49-F238E27FC236}">
-                    <a16:creationId xmlns:a16="http://schemas.microsoft.com/office/drawing/2014/main" xmlns="" id="{15A5A695-C1C1-4F11-AF19-44645EA2373A}"/>
+                    <a16:creationId xmlns:a16="http://schemas.microsoft.com/office/drawing/2014/main" id="{15A5A695-C1C1-4F11-AF19-44645EA2373A}"/>
                   </a:ext>
                 </a:extLst>
               </p:cNvPr>
@@ -19255,7 +19783,7 @@
               <p:cNvPr id="103" name="Rectangle 102">
                 <a:extLst>
                   <a:ext uri="{FF2B5EF4-FFF2-40B4-BE49-F238E27FC236}">
-                    <a16:creationId xmlns:a16="http://schemas.microsoft.com/office/drawing/2014/main" xmlns="" id="{030A7595-D640-4E59-B463-AC847EA76C1A}"/>
+                    <a16:creationId xmlns:a16="http://schemas.microsoft.com/office/drawing/2014/main" id="{030A7595-D640-4E59-B463-AC847EA76C1A}"/>
                   </a:ext>
                 </a:extLst>
               </p:cNvPr>
@@ -19310,7 +19838,7 @@
               <p:cNvPr id="169" name="Rectangle 168">
                 <a:extLst>
                   <a:ext uri="{FF2B5EF4-FFF2-40B4-BE49-F238E27FC236}">
-                    <a16:creationId xmlns:a16="http://schemas.microsoft.com/office/drawing/2014/main" xmlns="" id="{58EF8757-308F-409C-86DB-5B7696700D53}"/>
+                    <a16:creationId xmlns:a16="http://schemas.microsoft.com/office/drawing/2014/main" id="{58EF8757-308F-409C-86DB-5B7696700D53}"/>
                   </a:ext>
                 </a:extLst>
               </p:cNvPr>
@@ -19367,7 +19895,7 @@
               <p:cNvPr id="122" name="Rectangle 121">
                 <a:extLst>
                   <a:ext uri="{FF2B5EF4-FFF2-40B4-BE49-F238E27FC236}">
-                    <a16:creationId xmlns:a16="http://schemas.microsoft.com/office/drawing/2014/main" xmlns="" id="{94D814AF-83A7-4E32-9A6C-4546FB2CCA24}"/>
+                    <a16:creationId xmlns:a16="http://schemas.microsoft.com/office/drawing/2014/main" id="{94D814AF-83A7-4E32-9A6C-4546FB2CCA24}"/>
                   </a:ext>
                 </a:extLst>
               </p:cNvPr>
@@ -19424,7 +19952,7 @@
               <p:cNvPr id="126" name="Rectangle 125">
                 <a:extLst>
                   <a:ext uri="{FF2B5EF4-FFF2-40B4-BE49-F238E27FC236}">
-                    <a16:creationId xmlns:a16="http://schemas.microsoft.com/office/drawing/2014/main" xmlns="" id="{94D814AF-83A7-4E32-9A6C-4546FB2CCA24}"/>
+                    <a16:creationId xmlns:a16="http://schemas.microsoft.com/office/drawing/2014/main" id="{94D814AF-83A7-4E32-9A6C-4546FB2CCA24}"/>
                   </a:ext>
                 </a:extLst>
               </p:cNvPr>
@@ -19481,7 +20009,7 @@
               <p:cNvPr id="127" name="Rectangle 126">
                 <a:extLst>
                   <a:ext uri="{FF2B5EF4-FFF2-40B4-BE49-F238E27FC236}">
-                    <a16:creationId xmlns:a16="http://schemas.microsoft.com/office/drawing/2014/main" xmlns="" id="{94D814AF-83A7-4E32-9A6C-4546FB2CCA24}"/>
+                    <a16:creationId xmlns:a16="http://schemas.microsoft.com/office/drawing/2014/main" id="{94D814AF-83A7-4E32-9A6C-4546FB2CCA24}"/>
                   </a:ext>
                 </a:extLst>
               </p:cNvPr>
@@ -19538,7 +20066,7 @@
               <p:cNvPr id="128" name="Rectangle 127">
                 <a:extLst>
                   <a:ext uri="{FF2B5EF4-FFF2-40B4-BE49-F238E27FC236}">
-                    <a16:creationId xmlns:a16="http://schemas.microsoft.com/office/drawing/2014/main" xmlns="" id="{94D814AF-83A7-4E32-9A6C-4546FB2CCA24}"/>
+                    <a16:creationId xmlns:a16="http://schemas.microsoft.com/office/drawing/2014/main" id="{94D814AF-83A7-4E32-9A6C-4546FB2CCA24}"/>
                   </a:ext>
                 </a:extLst>
               </p:cNvPr>
@@ -19595,7 +20123,7 @@
               <p:cNvPr id="129" name="Rectangle 128">
                 <a:extLst>
                   <a:ext uri="{FF2B5EF4-FFF2-40B4-BE49-F238E27FC236}">
-                    <a16:creationId xmlns:a16="http://schemas.microsoft.com/office/drawing/2014/main" xmlns="" id="{94D814AF-83A7-4E32-9A6C-4546FB2CCA24}"/>
+                    <a16:creationId xmlns:a16="http://schemas.microsoft.com/office/drawing/2014/main" id="{94D814AF-83A7-4E32-9A6C-4546FB2CCA24}"/>
                   </a:ext>
                 </a:extLst>
               </p:cNvPr>
@@ -20004,7 +20532,7 @@
               <p:cNvPr id="167" name="Rectangle 166">
                 <a:extLst>
                   <a:ext uri="{FF2B5EF4-FFF2-40B4-BE49-F238E27FC236}">
-                    <a16:creationId xmlns:a16="http://schemas.microsoft.com/office/drawing/2014/main" xmlns="" id="{94D814AF-83A7-4E32-9A6C-4546FB2CCA24}"/>
+                    <a16:creationId xmlns:a16="http://schemas.microsoft.com/office/drawing/2014/main" id="{94D814AF-83A7-4E32-9A6C-4546FB2CCA24}"/>
                   </a:ext>
                 </a:extLst>
               </p:cNvPr>
@@ -20065,7 +20593,7 @@
               <p:cNvPr id="140" name="Rectangle 139">
                 <a:extLst>
                   <a:ext uri="{FF2B5EF4-FFF2-40B4-BE49-F238E27FC236}">
-                    <a16:creationId xmlns:a16="http://schemas.microsoft.com/office/drawing/2014/main" xmlns="" id="{40DEB316-E730-4899-AC10-0C4F4E710769}"/>
+                    <a16:creationId xmlns:a16="http://schemas.microsoft.com/office/drawing/2014/main" id="{40DEB316-E730-4899-AC10-0C4F4E710769}"/>
                   </a:ext>
                 </a:extLst>
               </p:cNvPr>
@@ -20126,7 +20654,7 @@
               <p:cNvPr id="147" name="Rectangle 146">
                 <a:extLst>
                   <a:ext uri="{FF2B5EF4-FFF2-40B4-BE49-F238E27FC236}">
-                    <a16:creationId xmlns:a16="http://schemas.microsoft.com/office/drawing/2014/main" xmlns="" id="{7DCA0DBE-613F-4A74-9D28-A27F2AD8AE03}"/>
+                    <a16:creationId xmlns:a16="http://schemas.microsoft.com/office/drawing/2014/main" id="{7DCA0DBE-613F-4A74-9D28-A27F2AD8AE03}"/>
                   </a:ext>
                 </a:extLst>
               </p:cNvPr>
@@ -20187,7 +20715,7 @@
               <p:cNvPr id="148" name="Rectangle 147">
                 <a:extLst>
                   <a:ext uri="{FF2B5EF4-FFF2-40B4-BE49-F238E27FC236}">
-                    <a16:creationId xmlns:a16="http://schemas.microsoft.com/office/drawing/2014/main" xmlns="" id="{B00EF988-81A5-4CD8-B70A-E26E876AAD0D}"/>
+                    <a16:creationId xmlns:a16="http://schemas.microsoft.com/office/drawing/2014/main" id="{B00EF988-81A5-4CD8-B70A-E26E876AAD0D}"/>
                   </a:ext>
                 </a:extLst>
               </p:cNvPr>
@@ -20248,7 +20776,7 @@
               <p:cNvPr id="149" name="Rectangle 148">
                 <a:extLst>
                   <a:ext uri="{FF2B5EF4-FFF2-40B4-BE49-F238E27FC236}">
-                    <a16:creationId xmlns:a16="http://schemas.microsoft.com/office/drawing/2014/main" xmlns="" id="{40DEB316-E730-4899-AC10-0C4F4E710769}"/>
+                    <a16:creationId xmlns:a16="http://schemas.microsoft.com/office/drawing/2014/main" id="{40DEB316-E730-4899-AC10-0C4F4E710769}"/>
                   </a:ext>
                 </a:extLst>
               </p:cNvPr>
@@ -20310,7 +20838,7 @@
               <p:cNvPr id="258" name="Rectangle 257">
                 <a:extLst>
                   <a:ext uri="{FF2B5EF4-FFF2-40B4-BE49-F238E27FC236}">
-                    <a16:creationId xmlns:a16="http://schemas.microsoft.com/office/drawing/2014/main" xmlns="" id="{56D2F77C-C552-46B2-A723-F8D67927A308}"/>
+                    <a16:creationId xmlns:a16="http://schemas.microsoft.com/office/drawing/2014/main" id="{56D2F77C-C552-46B2-A723-F8D67927A308}"/>
                   </a:ext>
                 </a:extLst>
               </p:cNvPr>
@@ -20365,7 +20893,7 @@
               <p:cNvPr id="23" name="Rectangle 22">
                 <a:extLst>
                   <a:ext uri="{FF2B5EF4-FFF2-40B4-BE49-F238E27FC236}">
-                    <a16:creationId xmlns:a16="http://schemas.microsoft.com/office/drawing/2014/main" xmlns="" id="{A4A583A6-7AF1-4AAA-B02D-8F198CA01423}"/>
+                    <a16:creationId xmlns:a16="http://schemas.microsoft.com/office/drawing/2014/main" id="{A4A583A6-7AF1-4AAA-B02D-8F198CA01423}"/>
                   </a:ext>
                 </a:extLst>
               </p:cNvPr>
@@ -20426,7 +20954,7 @@
               <p:cNvPr id="193" name="Rectangle 192">
                 <a:extLst>
                   <a:ext uri="{FF2B5EF4-FFF2-40B4-BE49-F238E27FC236}">
-                    <a16:creationId xmlns:a16="http://schemas.microsoft.com/office/drawing/2014/main" xmlns="" id="{2CA50F9A-8554-4EA1-A738-AEDB386057CF}"/>
+                    <a16:creationId xmlns:a16="http://schemas.microsoft.com/office/drawing/2014/main" id="{2CA50F9A-8554-4EA1-A738-AEDB386057CF}"/>
                   </a:ext>
                 </a:extLst>
               </p:cNvPr>
@@ -20483,7 +21011,7 @@
               <p:cNvPr id="194" name="Rectangle 193">
                 <a:extLst>
                   <a:ext uri="{FF2B5EF4-FFF2-40B4-BE49-F238E27FC236}">
-                    <a16:creationId xmlns:a16="http://schemas.microsoft.com/office/drawing/2014/main" xmlns="" id="{2CA50F9A-8554-4EA1-A738-AEDB386057CF}"/>
+                    <a16:creationId xmlns:a16="http://schemas.microsoft.com/office/drawing/2014/main" id="{2CA50F9A-8554-4EA1-A738-AEDB386057CF}"/>
                   </a:ext>
                 </a:extLst>
               </p:cNvPr>
@@ -20540,7 +21068,7 @@
               <p:cNvPr id="196" name="Rectangle 195">
                 <a:extLst>
                   <a:ext uri="{FF2B5EF4-FFF2-40B4-BE49-F238E27FC236}">
-                    <a16:creationId xmlns:a16="http://schemas.microsoft.com/office/drawing/2014/main" xmlns="" id="{2CA50F9A-8554-4EA1-A738-AEDB386057CF}"/>
+                    <a16:creationId xmlns:a16="http://schemas.microsoft.com/office/drawing/2014/main" id="{2CA50F9A-8554-4EA1-A738-AEDB386057CF}"/>
                   </a:ext>
                 </a:extLst>
               </p:cNvPr>
@@ -20597,7 +21125,7 @@
               <p:cNvPr id="197" name="Rectangle 196">
                 <a:extLst>
                   <a:ext uri="{FF2B5EF4-FFF2-40B4-BE49-F238E27FC236}">
-                    <a16:creationId xmlns:a16="http://schemas.microsoft.com/office/drawing/2014/main" xmlns="" id="{2CA50F9A-8554-4EA1-A738-AEDB386057CF}"/>
+                    <a16:creationId xmlns:a16="http://schemas.microsoft.com/office/drawing/2014/main" id="{2CA50F9A-8554-4EA1-A738-AEDB386057CF}"/>
                   </a:ext>
                 </a:extLst>
               </p:cNvPr>
@@ -20654,7 +21182,7 @@
               <p:cNvPr id="198" name="Rectangle 197">
                 <a:extLst>
                   <a:ext uri="{FF2B5EF4-FFF2-40B4-BE49-F238E27FC236}">
-                    <a16:creationId xmlns:a16="http://schemas.microsoft.com/office/drawing/2014/main" xmlns="" id="{2CA50F9A-8554-4EA1-A738-AEDB386057CF}"/>
+                    <a16:creationId xmlns:a16="http://schemas.microsoft.com/office/drawing/2014/main" id="{2CA50F9A-8554-4EA1-A738-AEDB386057CF}"/>
                   </a:ext>
                 </a:extLst>
               </p:cNvPr>
@@ -20711,7 +21239,7 @@
               <p:cNvPr id="200" name="Rectangle 199">
                 <a:extLst>
                   <a:ext uri="{FF2B5EF4-FFF2-40B4-BE49-F238E27FC236}">
-                    <a16:creationId xmlns:a16="http://schemas.microsoft.com/office/drawing/2014/main" xmlns="" id="{2CA50F9A-8554-4EA1-A738-AEDB386057CF}"/>
+                    <a16:creationId xmlns:a16="http://schemas.microsoft.com/office/drawing/2014/main" id="{2CA50F9A-8554-4EA1-A738-AEDB386057CF}"/>
                   </a:ext>
                 </a:extLst>
               </p:cNvPr>
@@ -20768,7 +21296,7 @@
               <p:cNvPr id="202" name="Rectangle 201">
                 <a:extLst>
                   <a:ext uri="{FF2B5EF4-FFF2-40B4-BE49-F238E27FC236}">
-                    <a16:creationId xmlns:a16="http://schemas.microsoft.com/office/drawing/2014/main" xmlns="" id="{2CA50F9A-8554-4EA1-A738-AEDB386057CF}"/>
+                    <a16:creationId xmlns:a16="http://schemas.microsoft.com/office/drawing/2014/main" id="{2CA50F9A-8554-4EA1-A738-AEDB386057CF}"/>
                   </a:ext>
                 </a:extLst>
               </p:cNvPr>
@@ -20825,7 +21353,7 @@
               <p:cNvPr id="28" name="Rectangle 27">
                 <a:extLst>
                   <a:ext uri="{FF2B5EF4-FFF2-40B4-BE49-F238E27FC236}">
-                    <a16:creationId xmlns:a16="http://schemas.microsoft.com/office/drawing/2014/main" xmlns="" id="{761A63E8-7F28-4871-B0A9-247484364F74}"/>
+                    <a16:creationId xmlns:a16="http://schemas.microsoft.com/office/drawing/2014/main" id="{761A63E8-7F28-4871-B0A9-247484364F74}"/>
                   </a:ext>
                 </a:extLst>
               </p:cNvPr>
@@ -20880,7 +21408,7 @@
               <p:cNvPr id="29" name="Rectangle 28">
                 <a:extLst>
                   <a:ext uri="{FF2B5EF4-FFF2-40B4-BE49-F238E27FC236}">
-                    <a16:creationId xmlns:a16="http://schemas.microsoft.com/office/drawing/2014/main" xmlns="" id="{6146A208-4E3C-49DF-9229-F82357E8ED5E}"/>
+                    <a16:creationId xmlns:a16="http://schemas.microsoft.com/office/drawing/2014/main" id="{6146A208-4E3C-49DF-9229-F82357E8ED5E}"/>
                   </a:ext>
                 </a:extLst>
               </p:cNvPr>
@@ -20935,7 +21463,7 @@
               <p:cNvPr id="30" name="Rectangle 29">
                 <a:extLst>
                   <a:ext uri="{FF2B5EF4-FFF2-40B4-BE49-F238E27FC236}">
-                    <a16:creationId xmlns:a16="http://schemas.microsoft.com/office/drawing/2014/main" xmlns="" id="{82B7C559-B9D7-4F73-B498-984901FFBAF6}"/>
+                    <a16:creationId xmlns:a16="http://schemas.microsoft.com/office/drawing/2014/main" id="{82B7C559-B9D7-4F73-B498-984901FFBAF6}"/>
                   </a:ext>
                 </a:extLst>
               </p:cNvPr>
@@ -20990,7 +21518,7 @@
               <p:cNvPr id="245" name="Rectangle 244">
                 <a:extLst>
                   <a:ext uri="{FF2B5EF4-FFF2-40B4-BE49-F238E27FC236}">
-                    <a16:creationId xmlns:a16="http://schemas.microsoft.com/office/drawing/2014/main" xmlns="" id="{0824B7BE-E129-4743-8A46-4EDC97B06DB8}"/>
+                    <a16:creationId xmlns:a16="http://schemas.microsoft.com/office/drawing/2014/main" id="{0824B7BE-E129-4743-8A46-4EDC97B06DB8}"/>
                   </a:ext>
                 </a:extLst>
               </p:cNvPr>
@@ -21045,7 +21573,7 @@
               <p:cNvPr id="246" name="Rectangle 245">
                 <a:extLst>
                   <a:ext uri="{FF2B5EF4-FFF2-40B4-BE49-F238E27FC236}">
-                    <a16:creationId xmlns:a16="http://schemas.microsoft.com/office/drawing/2014/main" xmlns="" id="{D8676363-EE86-4893-A51D-E88C4B4BDD32}"/>
+                    <a16:creationId xmlns:a16="http://schemas.microsoft.com/office/drawing/2014/main" id="{D8676363-EE86-4893-A51D-E88C4B4BDD32}"/>
                   </a:ext>
                 </a:extLst>
               </p:cNvPr>
@@ -21100,7 +21628,7 @@
               <p:cNvPr id="247" name="Rectangle 246">
                 <a:extLst>
                   <a:ext uri="{FF2B5EF4-FFF2-40B4-BE49-F238E27FC236}">
-                    <a16:creationId xmlns:a16="http://schemas.microsoft.com/office/drawing/2014/main" xmlns="" id="{F1749F8C-021A-4EF6-8109-4E80598C2D76}"/>
+                    <a16:creationId xmlns:a16="http://schemas.microsoft.com/office/drawing/2014/main" id="{F1749F8C-021A-4EF6-8109-4E80598C2D76}"/>
                   </a:ext>
                 </a:extLst>
               </p:cNvPr>
@@ -21155,7 +21683,7 @@
               <p:cNvPr id="248" name="Rectangle 247">
                 <a:extLst>
                   <a:ext uri="{FF2B5EF4-FFF2-40B4-BE49-F238E27FC236}">
-                    <a16:creationId xmlns:a16="http://schemas.microsoft.com/office/drawing/2014/main" xmlns="" id="{D9CC6CEB-51C5-4B9D-AA0A-6B8606E73D77}"/>
+                    <a16:creationId xmlns:a16="http://schemas.microsoft.com/office/drawing/2014/main" id="{D9CC6CEB-51C5-4B9D-AA0A-6B8606E73D77}"/>
                   </a:ext>
                 </a:extLst>
               </p:cNvPr>
@@ -21210,7 +21738,7 @@
               <p:cNvPr id="27" name="Rectangle 26">
                 <a:extLst>
                   <a:ext uri="{FF2B5EF4-FFF2-40B4-BE49-F238E27FC236}">
-                    <a16:creationId xmlns:a16="http://schemas.microsoft.com/office/drawing/2014/main" xmlns="" id="{B929B1AE-1980-43CE-9118-1CF4ADE54EFD}"/>
+                    <a16:creationId xmlns:a16="http://schemas.microsoft.com/office/drawing/2014/main" id="{B929B1AE-1980-43CE-9118-1CF4ADE54EFD}"/>
                   </a:ext>
                 </a:extLst>
               </p:cNvPr>
@@ -21271,7 +21799,7 @@
               <p:cNvPr id="191" name="Rectangle 190">
                 <a:extLst>
                   <a:ext uri="{FF2B5EF4-FFF2-40B4-BE49-F238E27FC236}">
-                    <a16:creationId xmlns:a16="http://schemas.microsoft.com/office/drawing/2014/main" xmlns="" id="{DCED1CFE-AA27-4B7A-B82E-C5D00B631BEB}"/>
+                    <a16:creationId xmlns:a16="http://schemas.microsoft.com/office/drawing/2014/main" id="{DCED1CFE-AA27-4B7A-B82E-C5D00B631BEB}"/>
                   </a:ext>
                 </a:extLst>
               </p:cNvPr>
@@ -21377,7 +21905,7 @@
               <p:cNvPr id="136" name="Rectangle 135">
                 <a:extLst>
                   <a:ext uri="{FF2B5EF4-FFF2-40B4-BE49-F238E27FC236}">
-                    <a16:creationId xmlns:a16="http://schemas.microsoft.com/office/drawing/2014/main" xmlns="" id="{15A5A695-C1C1-4F11-AF19-44645EA2373A}"/>
+                    <a16:creationId xmlns:a16="http://schemas.microsoft.com/office/drawing/2014/main" id="{15A5A695-C1C1-4F11-AF19-44645EA2373A}"/>
                   </a:ext>
                 </a:extLst>
               </p:cNvPr>
@@ -21431,7 +21959,7 @@
               <p:cNvPr id="137" name="Rectangle 136">
                 <a:extLst>
                   <a:ext uri="{FF2B5EF4-FFF2-40B4-BE49-F238E27FC236}">
-                    <a16:creationId xmlns:a16="http://schemas.microsoft.com/office/drawing/2014/main" xmlns="" id="{15A5A695-C1C1-4F11-AF19-44645EA2373A}"/>
+                    <a16:creationId xmlns:a16="http://schemas.microsoft.com/office/drawing/2014/main" id="{15A5A695-C1C1-4F11-AF19-44645EA2373A}"/>
                   </a:ext>
                 </a:extLst>
               </p:cNvPr>
@@ -21485,7 +22013,7 @@
               <p:cNvPr id="141" name="Rectangle 140">
                 <a:extLst>
                   <a:ext uri="{FF2B5EF4-FFF2-40B4-BE49-F238E27FC236}">
-                    <a16:creationId xmlns:a16="http://schemas.microsoft.com/office/drawing/2014/main" xmlns="" id="{7DCA0DBE-613F-4A74-9D28-A27F2AD8AE03}"/>
+                    <a16:creationId xmlns:a16="http://schemas.microsoft.com/office/drawing/2014/main" id="{7DCA0DBE-613F-4A74-9D28-A27F2AD8AE03}"/>
                   </a:ext>
                 </a:extLst>
               </p:cNvPr>
@@ -21546,7 +22074,7 @@
               <p:cNvPr id="209" name="Rectangle 208">
                 <a:extLst>
                   <a:ext uri="{FF2B5EF4-FFF2-40B4-BE49-F238E27FC236}">
-                    <a16:creationId xmlns:a16="http://schemas.microsoft.com/office/drawing/2014/main" xmlns="" id="{7DCA0DBE-613F-4A74-9D28-A27F2AD8AE03}"/>
+                    <a16:creationId xmlns:a16="http://schemas.microsoft.com/office/drawing/2014/main" id="{7DCA0DBE-613F-4A74-9D28-A27F2AD8AE03}"/>
                   </a:ext>
                 </a:extLst>
               </p:cNvPr>
@@ -21607,7 +22135,7 @@
               <p:cNvPr id="102" name="Rectangle 101">
                 <a:extLst>
                   <a:ext uri="{FF2B5EF4-FFF2-40B4-BE49-F238E27FC236}">
-                    <a16:creationId xmlns:a16="http://schemas.microsoft.com/office/drawing/2014/main" xmlns="" id="{B00EF988-81A5-4CD8-B70A-E26E876AAD0D}"/>
+                    <a16:creationId xmlns:a16="http://schemas.microsoft.com/office/drawing/2014/main" id="{B00EF988-81A5-4CD8-B70A-E26E876AAD0D}"/>
                   </a:ext>
                 </a:extLst>
               </p:cNvPr>
@@ -21668,7 +22196,7 @@
               <p:cNvPr id="207" name="Rectangle 206">
                 <a:extLst>
                   <a:ext uri="{FF2B5EF4-FFF2-40B4-BE49-F238E27FC236}">
-                    <a16:creationId xmlns:a16="http://schemas.microsoft.com/office/drawing/2014/main" xmlns="" id="{40DEB316-E730-4899-AC10-0C4F4E710769}"/>
+                    <a16:creationId xmlns:a16="http://schemas.microsoft.com/office/drawing/2014/main" id="{40DEB316-E730-4899-AC10-0C4F4E710769}"/>
                   </a:ext>
                 </a:extLst>
               </p:cNvPr>
@@ -21723,7 +22251,7 @@
               <p:cNvPr id="145" name="Rectangle 144">
                 <a:extLst>
                   <a:ext uri="{FF2B5EF4-FFF2-40B4-BE49-F238E27FC236}">
-                    <a16:creationId xmlns:a16="http://schemas.microsoft.com/office/drawing/2014/main" xmlns="" id="{40DEB316-E730-4899-AC10-0C4F4E710769}"/>
+                    <a16:creationId xmlns:a16="http://schemas.microsoft.com/office/drawing/2014/main" id="{40DEB316-E730-4899-AC10-0C4F4E710769}"/>
                   </a:ext>
                 </a:extLst>
               </p:cNvPr>
@@ -21795,7 +22323,7 @@
               <p:cNvPr id="146" name="Rectangle 145">
                 <a:extLst>
                   <a:ext uri="{FF2B5EF4-FFF2-40B4-BE49-F238E27FC236}">
-                    <a16:creationId xmlns:a16="http://schemas.microsoft.com/office/drawing/2014/main" xmlns="" id="{40DEB316-E730-4899-AC10-0C4F4E710769}"/>
+                    <a16:creationId xmlns:a16="http://schemas.microsoft.com/office/drawing/2014/main" id="{40DEB316-E730-4899-AC10-0C4F4E710769}"/>
                   </a:ext>
                 </a:extLst>
               </p:cNvPr>
@@ -22735,10 +23263,9 @@
           <a:lstStyle/>
           <a:p>
             <a:r>
-              <a:rPr lang="en-US" sz="700" dirty="0" smtClean="0"/>
+              <a:rPr lang="en-US" sz="700" dirty="0"/>
               <a:t>AU.PRL.032-RJ-003</a:t>
             </a:r>
-            <a:endParaRPr lang="en-US" sz="700" dirty="0"/>
           </a:p>
         </p:txBody>
       </p:sp>
@@ -22801,10 +23328,9 @@
           <a:lstStyle/>
           <a:p>
             <a:r>
-              <a:rPr lang="en-US" sz="700" dirty="0" smtClean="0"/>
+              <a:rPr lang="en-US" sz="700" dirty="0"/>
               <a:t>AU.PRL.032-FL-003</a:t>
             </a:r>
-            <a:endParaRPr lang="en-US" sz="700" dirty="0"/>
           </a:p>
         </p:txBody>
       </p:sp>
@@ -22932,10 +23458,9 @@
           <a:lstStyle/>
           <a:p>
             <a:r>
-              <a:rPr lang="en-US" sz="700" dirty="0" smtClean="0"/>
+              <a:rPr lang="en-US" sz="700" dirty="0"/>
               <a:t>AU.PRL.031-MJ-002</a:t>
             </a:r>
-            <a:endParaRPr lang="en-US" sz="700" dirty="0"/>
           </a:p>
         </p:txBody>
       </p:sp>
@@ -23065,10 +23590,9 @@
           <a:lstStyle/>
           <a:p>
             <a:r>
-              <a:rPr lang="en-US" sz="700" dirty="0" smtClean="0"/>
+              <a:rPr lang="en-US" sz="700" dirty="0"/>
               <a:t>AU.PRL.031-PJ-002</a:t>
             </a:r>
-            <a:endParaRPr lang="en-US" sz="700" dirty="0"/>
           </a:p>
         </p:txBody>
       </p:sp>
@@ -23263,10 +23787,9 @@
           <a:lstStyle/>
           <a:p>
             <a:r>
-              <a:rPr lang="en-US" sz="700" dirty="0" smtClean="0"/>
+              <a:rPr lang="en-US" sz="700" dirty="0"/>
               <a:t>AU.PRL.031-PAP-001</a:t>
             </a:r>
-            <a:endParaRPr lang="en-US" sz="700" dirty="0"/>
           </a:p>
         </p:txBody>
       </p:sp>
@@ -23331,10 +23854,9 @@
           <a:lstStyle/>
           <a:p>
             <a:r>
-              <a:rPr lang="en-US" sz="700" dirty="0" smtClean="0"/>
+              <a:rPr lang="en-US" sz="700" dirty="0"/>
               <a:t>AU.PRL.031-PAP-002</a:t>
             </a:r>
-            <a:endParaRPr lang="en-US" sz="700" dirty="0"/>
           </a:p>
         </p:txBody>
       </p:sp>
@@ -24564,10 +25086,9 @@
           <a:lstStyle/>
           <a:p>
             <a:r>
-              <a:rPr lang="en-US" sz="700" dirty="0" smtClean="0"/>
+              <a:rPr lang="en-US" sz="700" dirty="0"/>
               <a:t>AU.PRL.032-PL-042      339</a:t>
             </a:r>
-            <a:endParaRPr lang="en-US" sz="700" dirty="0"/>
           </a:p>
         </p:txBody>
       </p:sp>
@@ -24630,10 +25151,9 @@
           <a:lstStyle/>
           <a:p>
             <a:r>
-              <a:rPr lang="en-US" sz="700" dirty="0" smtClean="0"/>
+              <a:rPr lang="en-US" sz="700" dirty="0"/>
               <a:t>AU.PRL.032-PL-032     	             327</a:t>
             </a:r>
-            <a:endParaRPr lang="en-US" sz="700" dirty="0"/>
           </a:p>
         </p:txBody>
       </p:sp>
@@ -24696,10 +25216,9 @@
           <a:lstStyle/>
           <a:p>
             <a:r>
-              <a:rPr lang="en-US" sz="700" dirty="0" smtClean="0"/>
+              <a:rPr lang="en-US" sz="700" dirty="0"/>
               <a:t>AU.PRL.032-PL-041	337</a:t>
             </a:r>
-            <a:endParaRPr lang="en-US" sz="700" dirty="0"/>
           </a:p>
         </p:txBody>
       </p:sp>
@@ -24762,10 +25281,9 @@
           <a:lstStyle/>
           <a:p>
             <a:r>
-              <a:rPr lang="en-US" sz="700" dirty="0" smtClean="0"/>
+              <a:rPr lang="en-US" sz="700" dirty="0"/>
               <a:t>AU.PRL.032-BT-031	        325</a:t>
             </a:r>
-            <a:endParaRPr lang="en-US" sz="700" dirty="0"/>
           </a:p>
         </p:txBody>
       </p:sp>
@@ -24828,10 +25346,9 @@
           <a:lstStyle/>
           <a:p>
             <a:r>
-              <a:rPr lang="en-US" sz="700" dirty="0" smtClean="0"/>
+              <a:rPr lang="en-US" sz="700" dirty="0"/>
               <a:t>AU.PRL.031-PL-021	313</a:t>
             </a:r>
-            <a:endParaRPr lang="en-US" sz="700" dirty="0"/>
           </a:p>
         </p:txBody>
       </p:sp>
@@ -24894,10 +25411,9 @@
           <a:lstStyle/>
           <a:p>
             <a:r>
-              <a:rPr lang="en-US" sz="700" dirty="0" smtClean="0"/>
+              <a:rPr lang="en-US" sz="700" dirty="0"/>
               <a:t>AU.PRL.031-PIP-022	709</a:t>
             </a:r>
-            <a:endParaRPr lang="en-US" sz="700" dirty="0"/>
           </a:p>
         </p:txBody>
       </p:sp>
@@ -24960,10 +25476,9 @@
           <a:lstStyle/>
           <a:p>
             <a:r>
-              <a:rPr lang="en-US" sz="700" dirty="0" smtClean="0"/>
+              <a:rPr lang="en-US" sz="700" dirty="0"/>
               <a:t>AU.PRL.031-PL-011	301</a:t>
             </a:r>
-            <a:endParaRPr lang="en-US" sz="700" dirty="0"/>
           </a:p>
         </p:txBody>
       </p:sp>
@@ -25573,9 +26088,12 @@
 </file>
 
 <file path=customXml/item1.xml><?xml version="1.0" encoding="utf-8"?>
-<p:properties xmlns:p="http://schemas.microsoft.com/office/2006/metadata/properties" xmlns:xsi="http://www.w3.org/2001/XMLSchema-instance" xmlns:pc="http://schemas.microsoft.com/office/infopath/2007/PartnerControls">
-  <documentManagement/>
-</p:properties>
+<?mso-contentType ?>
+<FormTemplates xmlns="http://schemas.microsoft.com/sharepoint/v3/contenttype/forms">
+  <Display>DocumentLibraryForm</Display>
+  <Edit>DocumentLibraryForm</Edit>
+  <New>DocumentLibraryForm</New>
+</FormTemplates>
 </file>
 
 <file path=customXml/item2.xml><?xml version="1.0" encoding="utf-8"?>
@@ -25796,27 +26314,15 @@
 </file>
 
 <file path=customXml/item3.xml><?xml version="1.0" encoding="utf-8"?>
-<?mso-contentType ?>
-<FormTemplates xmlns="http://schemas.microsoft.com/sharepoint/v3/contenttype/forms">
-  <Display>DocumentLibraryForm</Display>
-  <Edit>DocumentLibraryForm</Edit>
-  <New>DocumentLibraryForm</New>
-</FormTemplates>
+<p:properties xmlns:p="http://schemas.microsoft.com/office/2006/metadata/properties" xmlns:xsi="http://www.w3.org/2001/XMLSchema-instance" xmlns:pc="http://schemas.microsoft.com/office/infopath/2007/PartnerControls">
+  <documentManagement/>
+</p:properties>
 </file>
 
 <file path=customXml/itemProps1.xml><?xml version="1.0" encoding="utf-8"?>
-<ds:datastoreItem xmlns:ds="http://schemas.openxmlformats.org/officeDocument/2006/customXml" ds:itemID="{CB6EC63C-0767-4A0A-89A8-41CB908343C3}">
+<ds:datastoreItem xmlns:ds="http://schemas.openxmlformats.org/officeDocument/2006/customXml" ds:itemID="{B944D772-9C1B-454C-BE7C-E9E4B9F813B8}">
   <ds:schemaRefs>
-    <ds:schemaRef ds:uri="http://schemas.microsoft.com/office/2006/documentManagement/types"/>
-    <ds:schemaRef ds:uri="http://purl.org/dc/terms/"/>
-    <ds:schemaRef ds:uri="http://www.w3.org/XML/1998/namespace"/>
-    <ds:schemaRef ds:uri="http://purl.org/dc/elements/1.1/"/>
-    <ds:schemaRef ds:uri="http://schemas.microsoft.com/office/infopath/2007/PartnerControls"/>
-    <ds:schemaRef ds:uri="http://schemas.openxmlformats.org/package/2006/metadata/core-properties"/>
-    <ds:schemaRef ds:uri="http://schemas.microsoft.com/office/2006/metadata/properties"/>
-    <ds:schemaRef ds:uri="da635dff-9ad4-4ded-8eac-2720661aa429"/>
-    <ds:schemaRef ds:uri="9921668f-0b8d-4fb6-84a9-1fcd7ff4e3fc"/>
-    <ds:schemaRef ds:uri="http://purl.org/dc/dcmitype/"/>
+    <ds:schemaRef ds:uri="http://schemas.microsoft.com/sharepoint/v3/contenttype/forms"/>
   </ds:schemaRefs>
 </ds:datastoreItem>
 </file>
@@ -25841,9 +26347,18 @@
 </file>
 
 <file path=customXml/itemProps3.xml><?xml version="1.0" encoding="utf-8"?>
-<ds:datastoreItem xmlns:ds="http://schemas.openxmlformats.org/officeDocument/2006/customXml" ds:itemID="{B944D772-9C1B-454C-BE7C-E9E4B9F813B8}">
+<ds:datastoreItem xmlns:ds="http://schemas.openxmlformats.org/officeDocument/2006/customXml" ds:itemID="{CB6EC63C-0767-4A0A-89A8-41CB908343C3}">
   <ds:schemaRefs>
-    <ds:schemaRef ds:uri="http://schemas.microsoft.com/sharepoint/v3/contenttype/forms"/>
+    <ds:schemaRef ds:uri="http://schemas.microsoft.com/office/2006/documentManagement/types"/>
+    <ds:schemaRef ds:uri="http://purl.org/dc/terms/"/>
+    <ds:schemaRef ds:uri="http://www.w3.org/XML/1998/namespace"/>
+    <ds:schemaRef ds:uri="http://purl.org/dc/elements/1.1/"/>
+    <ds:schemaRef ds:uri="http://schemas.microsoft.com/office/infopath/2007/PartnerControls"/>
+    <ds:schemaRef ds:uri="http://schemas.openxmlformats.org/package/2006/metadata/core-properties"/>
+    <ds:schemaRef ds:uri="http://schemas.microsoft.com/office/2006/metadata/properties"/>
+    <ds:schemaRef ds:uri="da635dff-9ad4-4ded-8eac-2720661aa429"/>
+    <ds:schemaRef ds:uri="9921668f-0b8d-4fb6-84a9-1fcd7ff4e3fc"/>
+    <ds:schemaRef ds:uri="http://purl.org/dc/dcmitype/"/>
   </ds:schemaRefs>
 </ds:datastoreItem>
 </file>
</xml_diff>